<commit_message>
update current network configuration
</commit_message>
<xml_diff>
--- a/events/2020.06.Online/plugfestnetwork.pptx
+++ b/events/2020.06.Online/plugfestnetwork.pptx
@@ -208,7 +208,7 @@
           <a:p>
             <a:fld id="{8389B5DD-0274-BF45-B4C5-62E173E8F634}" type="datetimeFigureOut">
               <a:rPr lang="en-US" smtClean="0"/>
-              <a:t>6/15/20</a:t>
+              <a:t>6/16/20</a:t>
             </a:fld>
             <a:endParaRPr lang="en-US"/>
           </a:p>
@@ -824,7 +824,7 @@
           <a:p>
             <a:fld id="{2F93E591-CC8D-C74E-8EED-098A7FB5E64D}" type="datetime1">
               <a:rPr lang="en-CA" smtClean="0"/>
-              <a:t>2020-06-15</a:t>
+              <a:t>2020-06-16</a:t>
             </a:fld>
             <a:endParaRPr lang="en-US"/>
           </a:p>
@@ -1092,7 +1092,7 @@
           <a:p>
             <a:fld id="{2E1BC118-574D-594E-ABEA-A7C82666C9AB}" type="datetime1">
               <a:rPr lang="en-CA" smtClean="0"/>
-              <a:t>2020-06-15</a:t>
+              <a:t>2020-06-16</a:t>
             </a:fld>
             <a:endParaRPr lang="en-US"/>
           </a:p>
@@ -1458,7 +1458,7 @@
           <a:p>
             <a:fld id="{B929AB1E-7FD9-0A40-B7C0-508CCACB3E9A}" type="datetime1">
               <a:rPr lang="en-CA" smtClean="0"/>
-              <a:t>2020-06-15</a:t>
+              <a:t>2020-06-16</a:t>
             </a:fld>
             <a:endParaRPr lang="en-US"/>
           </a:p>
@@ -1690,7 +1690,7 @@
           <a:p>
             <a:fld id="{5AE8723F-57EA-4C47-97B9-92AFDEEF85DC}" type="datetime1">
               <a:rPr lang="en-CA" smtClean="0"/>
-              <a:t>2020-06-15</a:t>
+              <a:t>2020-06-16</a:t>
             </a:fld>
             <a:endParaRPr lang="en-US"/>
           </a:p>
@@ -2020,7 +2020,7 @@
           <a:p>
             <a:fld id="{B2B00E5D-EC04-AA49-8D52-0FCB6E08F63D}" type="datetime1">
               <a:rPr lang="en-CA" smtClean="0"/>
-              <a:t>2020-06-15</a:t>
+              <a:t>2020-06-16</a:t>
             </a:fld>
             <a:endParaRPr lang="en-US"/>
           </a:p>
@@ -2493,7 +2493,7 @@
           <a:p>
             <a:fld id="{FF90905C-10FF-8047-AA7E-6DC7E8B6AF51}" type="datetime1">
               <a:rPr lang="en-CA" smtClean="0"/>
-              <a:t>2020-06-15</a:t>
+              <a:t>2020-06-16</a:t>
             </a:fld>
             <a:endParaRPr lang="en-US"/>
           </a:p>
@@ -2699,7 +2699,7 @@
           <a:p>
             <a:fld id="{D1CE86E2-4400-D342-BEEC-F9C1ADF6F9F7}" type="datetime1">
               <a:rPr lang="en-CA" smtClean="0"/>
-              <a:t>2020-06-15</a:t>
+              <a:t>2020-06-16</a:t>
             </a:fld>
             <a:endParaRPr lang="en-US"/>
           </a:p>
@@ -2869,7 +2869,7 @@
           <a:p>
             <a:fld id="{74358A08-7221-7F45-8378-69D5559861DD}" type="datetime1">
               <a:rPr lang="en-CA" smtClean="0"/>
-              <a:t>2020-06-15</a:t>
+              <a:t>2020-06-16</a:t>
             </a:fld>
             <a:endParaRPr lang="en-US"/>
           </a:p>
@@ -3241,7 +3241,7 @@
           <a:p>
             <a:fld id="{08C20FDB-303D-8A4E-83B7-226DD88B97BD}" type="datetime1">
               <a:rPr lang="en-CA" smtClean="0"/>
-              <a:t>2020-06-15</a:t>
+              <a:t>2020-06-16</a:t>
             </a:fld>
             <a:endParaRPr lang="en-US"/>
           </a:p>
@@ -3593,7 +3593,7 @@
           <a:p>
             <a:fld id="{0A9EBA37-9D18-D34A-A88D-1B00AA06E95C}" type="datetime1">
               <a:rPr lang="en-CA" smtClean="0"/>
-              <a:t>2020-06-15</a:t>
+              <a:t>2020-06-16</a:t>
             </a:fld>
             <a:endParaRPr lang="en-US"/>
           </a:p>
@@ -3933,7 +3933,7 @@
             <a:fld id="{B73A2E78-F38A-E046-ACDB-668F070D1EF6}" type="datetime1">
               <a:rPr lang="en-CA" smtClean="0"/>
               <a:pPr/>
-              <a:t>2020-06-15</a:t>
+              <a:t>2020-06-16</a:t>
             </a:fld>
             <a:endParaRPr lang="en-US" dirty="0"/>
           </a:p>
@@ -4340,7 +4340,7 @@
           <a:p>
             <a:r>
               <a:rPr lang="en-US" dirty="0"/>
-              <a:t>Plugfest network (as of 2020-06-15 0130UTC)</a:t>
+              <a:t>Plugfest network (as of 2020-06-16 0930UTC)</a:t>
             </a:r>
           </a:p>
         </p:txBody>
@@ -4368,7 +4368,7 @@
           <a:p>
             <a:fld id="{BF92DA42-2970-1B4D-9C1F-77F249CD7467}" type="datetime1">
               <a:rPr lang="en-CA" smtClean="0"/>
-              <a:t>2020-06-15</a:t>
+              <a:t>2020-06-16</a:t>
             </a:fld>
             <a:endParaRPr lang="en-US"/>
           </a:p>
@@ -4418,7 +4418,12 @@
             <p:ph type="sldNum" sz="quarter" idx="12"/>
           </p:nvPr>
         </p:nvSpPr>
-        <p:spPr/>
+        <p:spPr>
+          <a:xfrm>
+            <a:off x="8749889" y="6912851"/>
+            <a:ext cx="2743200" cy="365125"/>
+          </a:xfrm>
+        </p:spPr>
         <p:txBody>
           <a:bodyPr/>
           <a:lstStyle/>
@@ -4427,7 +4432,7 @@
               <a:rPr lang="en-US" smtClean="0"/>
               <a:t>1</a:t>
             </a:fld>
-            <a:endParaRPr lang="en-US"/>
+            <a:endParaRPr lang="en-US" dirty="0"/>
           </a:p>
         </p:txBody>
       </p:sp>
@@ -4655,7 +4660,7 @@
         </p:nvSpPr>
         <p:spPr>
           <a:xfrm>
-            <a:off x="6696484" y="5473889"/>
+            <a:off x="10732794" y="2075623"/>
             <a:ext cx="1080000" cy="554142"/>
           </a:xfrm>
           <a:prstGeom prst="rect">
@@ -4727,7 +4732,7 @@
         </p:nvSpPr>
         <p:spPr>
           <a:xfrm>
-            <a:off x="7174546" y="5972804"/>
+            <a:off x="10982490" y="2574538"/>
             <a:ext cx="580608" cy="261610"/>
           </a:xfrm>
           <a:prstGeom prst="rect">
@@ -4741,6 +4746,7 @@
           </a:bodyPr>
           <a:lstStyle/>
           <a:p>
+            <a:pPr algn="ctr"/>
             <a:r>
               <a:rPr lang="en-JP" sz="1100" dirty="0"/>
               <a:t>30.135</a:t>
@@ -4762,7 +4768,7 @@
         </p:nvSpPr>
         <p:spPr>
           <a:xfrm>
-            <a:off x="8139559" y="5473889"/>
+            <a:off x="9297248" y="2070552"/>
             <a:ext cx="1080000" cy="554142"/>
           </a:xfrm>
           <a:prstGeom prst="rect">
@@ -4799,7 +4805,7 @@
                   <a:sysClr val="windowText" lastClr="000000"/>
                 </a:solidFill>
               </a:rPr>
-              <a:t>(bridge)</a:t>
+              <a:t>bridge</a:t>
             </a:r>
           </a:p>
           <a:p>
@@ -4834,7 +4840,7 @@
         </p:nvSpPr>
         <p:spPr>
           <a:xfrm>
-            <a:off x="8617621" y="5972804"/>
+            <a:off x="9546944" y="2569467"/>
             <a:ext cx="580608" cy="261610"/>
           </a:xfrm>
           <a:prstGeom prst="rect">
@@ -4848,6 +4854,7 @@
           </a:bodyPr>
           <a:lstStyle/>
           <a:p>
+            <a:pPr algn="ctr"/>
             <a:r>
               <a:rPr lang="en-JP" sz="1100" dirty="0"/>
               <a:t>30.129</a:t>
@@ -4906,7 +4913,18 @@
                   <a:sysClr val="windowText" lastClr="000000"/>
                 </a:solidFill>
               </a:rPr>
-              <a:t>Digital Twin Sim.</a:t>
+              <a:t>Digital Twin</a:t>
+            </a:r>
+          </a:p>
+          <a:p>
+            <a:pPr algn="ctr"/>
+            <a:r>
+              <a:rPr lang="en-US" sz="1200" dirty="0">
+                <a:solidFill>
+                  <a:sysClr val="windowText" lastClr="000000"/>
+                </a:solidFill>
+              </a:rPr>
+              <a:t>Simulator</a:t>
             </a:r>
           </a:p>
           <a:p>
@@ -5029,7 +5047,18 @@
                   <a:sysClr val="windowText" lastClr="000000"/>
                 </a:solidFill>
               </a:rPr>
-              <a:t> Thing Dir.</a:t>
+              <a:t> </a:t>
+            </a:r>
+          </a:p>
+          <a:p>
+            <a:pPr algn="ctr"/>
+            <a:r>
+              <a:rPr lang="en-US" sz="1200" dirty="0">
+                <a:solidFill>
+                  <a:sysClr val="windowText" lastClr="000000"/>
+                </a:solidFill>
+              </a:rPr>
+              <a:t>Thing Directory</a:t>
             </a:r>
           </a:p>
           <a:p>
@@ -5367,6 +5396,1204 @@
                 <a:sysClr val="windowText" lastClr="000000"/>
               </a:solidFill>
             </a:endParaRPr>
+          </a:p>
+        </p:txBody>
+      </p:sp>
+      <p:sp>
+        <p:nvSpPr>
+          <p:cNvPr id="24" name="Rectangle 23">
+            <a:extLst>
+              <a:ext uri="{FF2B5EF4-FFF2-40B4-BE49-F238E27FC236}">
+                <a16:creationId xmlns:a16="http://schemas.microsoft.com/office/drawing/2014/main" id="{F031B59E-D7FA-A546-8011-B2A95E6D8F08}"/>
+              </a:ext>
+            </a:extLst>
+          </p:cNvPr>
+          <p:cNvSpPr/>
+          <p:nvPr/>
+        </p:nvSpPr>
+        <p:spPr>
+          <a:xfrm>
+            <a:off x="10732794" y="4627243"/>
+            <a:ext cx="1080000" cy="554142"/>
+          </a:xfrm>
+          <a:prstGeom prst="rect">
+            <a:avLst/>
+          </a:prstGeom>
+          <a:solidFill>
+            <a:schemeClr val="bg1"/>
+          </a:solidFill>
+          <a:ln>
+            <a:prstDash val="dash"/>
+          </a:ln>
+        </p:spPr>
+        <p:style>
+          <a:lnRef idx="2">
+            <a:schemeClr val="accent1">
+              <a:shade val="50000"/>
+            </a:schemeClr>
+          </a:lnRef>
+          <a:fillRef idx="1">
+            <a:schemeClr val="accent1"/>
+          </a:fillRef>
+          <a:effectRef idx="0">
+            <a:schemeClr val="accent1"/>
+          </a:effectRef>
+          <a:fontRef idx="minor">
+            <a:schemeClr val="lt1"/>
+          </a:fontRef>
+        </p:style>
+        <p:txBody>
+          <a:bodyPr lIns="0" rIns="0" rtlCol="0" anchor="ctr"/>
+          <a:lstStyle/>
+          <a:p>
+            <a:pPr algn="ctr"/>
+            <a:r>
+              <a:rPr lang="en-US" sz="1200" dirty="0">
+                <a:solidFill>
+                  <a:sysClr val="windowText" lastClr="000000"/>
+                </a:solidFill>
+              </a:rPr>
+              <a:t>(?)</a:t>
+            </a:r>
+          </a:p>
+          <a:p>
+            <a:pPr algn="ctr"/>
+            <a:r>
+              <a:rPr lang="en-US" sz="1200" dirty="0">
+                <a:solidFill>
+                  <a:sysClr val="windowText" lastClr="000000"/>
+                </a:solidFill>
+              </a:rPr>
+              <a:t>(?)</a:t>
+            </a:r>
+            <a:endParaRPr lang="en-JP" sz="1200" dirty="0">
+              <a:solidFill>
+                <a:sysClr val="windowText" lastClr="000000"/>
+              </a:solidFill>
+            </a:endParaRPr>
+          </a:p>
+        </p:txBody>
+      </p:sp>
+      <p:sp>
+        <p:nvSpPr>
+          <p:cNvPr id="32" name="TextBox 31">
+            <a:extLst>
+              <a:ext uri="{FF2B5EF4-FFF2-40B4-BE49-F238E27FC236}">
+                <a16:creationId xmlns:a16="http://schemas.microsoft.com/office/drawing/2014/main" id="{98CF6551-C2D9-3C4D-813D-C5B35436F279}"/>
+              </a:ext>
+            </a:extLst>
+          </p:cNvPr>
+          <p:cNvSpPr txBox="1"/>
+          <p:nvPr/>
+        </p:nvSpPr>
+        <p:spPr>
+          <a:xfrm>
+            <a:off x="10982490" y="5126158"/>
+            <a:ext cx="580608" cy="261610"/>
+          </a:xfrm>
+          <a:prstGeom prst="rect">
+            <a:avLst/>
+          </a:prstGeom>
+          <a:noFill/>
+        </p:spPr>
+        <p:txBody>
+          <a:bodyPr wrap="none" rtlCol="0">
+            <a:spAutoFit/>
+          </a:bodyPr>
+          <a:lstStyle/>
+          <a:p>
+            <a:pPr algn="ctr"/>
+            <a:r>
+              <a:rPr lang="en-JP" sz="1100" dirty="0"/>
+              <a:t>30.138</a:t>
+            </a:r>
+          </a:p>
+        </p:txBody>
+      </p:sp>
+      <p:sp>
+        <p:nvSpPr>
+          <p:cNvPr id="35" name="Rectangle 34">
+            <a:extLst>
+              <a:ext uri="{FF2B5EF4-FFF2-40B4-BE49-F238E27FC236}">
+                <a16:creationId xmlns:a16="http://schemas.microsoft.com/office/drawing/2014/main" id="{98484D3C-A501-8643-89CD-0C186FFCDA8A}"/>
+              </a:ext>
+            </a:extLst>
+          </p:cNvPr>
+          <p:cNvSpPr/>
+          <p:nvPr/>
+        </p:nvSpPr>
+        <p:spPr>
+          <a:xfrm>
+            <a:off x="9297248" y="4606959"/>
+            <a:ext cx="1080000" cy="554142"/>
+          </a:xfrm>
+          <a:prstGeom prst="rect">
+            <a:avLst/>
+          </a:prstGeom>
+          <a:solidFill>
+            <a:schemeClr val="bg1"/>
+          </a:solidFill>
+          <a:ln>
+            <a:prstDash val="dash"/>
+          </a:ln>
+        </p:spPr>
+        <p:style>
+          <a:lnRef idx="2">
+            <a:schemeClr val="accent1">
+              <a:shade val="50000"/>
+            </a:schemeClr>
+          </a:lnRef>
+          <a:fillRef idx="1">
+            <a:schemeClr val="accent1"/>
+          </a:fillRef>
+          <a:effectRef idx="0">
+            <a:schemeClr val="accent1"/>
+          </a:effectRef>
+          <a:fontRef idx="minor">
+            <a:schemeClr val="lt1"/>
+          </a:fontRef>
+        </p:style>
+        <p:txBody>
+          <a:bodyPr lIns="0" rIns="0" rtlCol="0" anchor="ctr"/>
+          <a:lstStyle/>
+          <a:p>
+            <a:pPr algn="ctr"/>
+            <a:r>
+              <a:rPr lang="en-US" sz="1200" dirty="0">
+                <a:solidFill>
+                  <a:sysClr val="windowText" lastClr="000000"/>
+                </a:solidFill>
+              </a:rPr>
+              <a:t>(?)</a:t>
+            </a:r>
+          </a:p>
+          <a:p>
+            <a:pPr algn="ctr"/>
+            <a:r>
+              <a:rPr lang="en-US" sz="1200" dirty="0">
+                <a:solidFill>
+                  <a:sysClr val="windowText" lastClr="000000"/>
+                </a:solidFill>
+              </a:rPr>
+              <a:t>(?)</a:t>
+            </a:r>
+            <a:endParaRPr lang="en-JP" sz="1200" dirty="0">
+              <a:solidFill>
+                <a:sysClr val="windowText" lastClr="000000"/>
+              </a:solidFill>
+            </a:endParaRPr>
+          </a:p>
+        </p:txBody>
+      </p:sp>
+      <p:sp>
+        <p:nvSpPr>
+          <p:cNvPr id="36" name="TextBox 35">
+            <a:extLst>
+              <a:ext uri="{FF2B5EF4-FFF2-40B4-BE49-F238E27FC236}">
+                <a16:creationId xmlns:a16="http://schemas.microsoft.com/office/drawing/2014/main" id="{B943682C-122D-284A-8F0B-ECE0FFAE0097}"/>
+              </a:ext>
+            </a:extLst>
+          </p:cNvPr>
+          <p:cNvSpPr txBox="1"/>
+          <p:nvPr/>
+        </p:nvSpPr>
+        <p:spPr>
+          <a:xfrm>
+            <a:off x="9546944" y="5105874"/>
+            <a:ext cx="580608" cy="261610"/>
+          </a:xfrm>
+          <a:prstGeom prst="rect">
+            <a:avLst/>
+          </a:prstGeom>
+          <a:noFill/>
+        </p:spPr>
+        <p:txBody>
+          <a:bodyPr wrap="none" rtlCol="0">
+            <a:spAutoFit/>
+          </a:bodyPr>
+          <a:lstStyle/>
+          <a:p>
+            <a:pPr algn="ctr"/>
+            <a:r>
+              <a:rPr lang="en-JP" sz="1100" dirty="0"/>
+              <a:t>30.132</a:t>
+            </a:r>
+          </a:p>
+        </p:txBody>
+      </p:sp>
+      <p:sp>
+        <p:nvSpPr>
+          <p:cNvPr id="37" name="Rectangle 36">
+            <a:extLst>
+              <a:ext uri="{FF2B5EF4-FFF2-40B4-BE49-F238E27FC236}">
+                <a16:creationId xmlns:a16="http://schemas.microsoft.com/office/drawing/2014/main" id="{D7125172-F4FC-8E4B-B9B7-64CE46F83E16}"/>
+              </a:ext>
+            </a:extLst>
+          </p:cNvPr>
+          <p:cNvSpPr/>
+          <p:nvPr/>
+        </p:nvSpPr>
+        <p:spPr>
+          <a:xfrm>
+            <a:off x="10732794" y="1225083"/>
+            <a:ext cx="1080000" cy="554142"/>
+          </a:xfrm>
+          <a:prstGeom prst="rect">
+            <a:avLst/>
+          </a:prstGeom>
+          <a:solidFill>
+            <a:schemeClr val="bg1"/>
+          </a:solidFill>
+          <a:ln>
+            <a:prstDash val="dash"/>
+          </a:ln>
+        </p:spPr>
+        <p:style>
+          <a:lnRef idx="2">
+            <a:schemeClr val="accent1">
+              <a:shade val="50000"/>
+            </a:schemeClr>
+          </a:lnRef>
+          <a:fillRef idx="1">
+            <a:schemeClr val="accent1"/>
+          </a:fillRef>
+          <a:effectRef idx="0">
+            <a:schemeClr val="accent1"/>
+          </a:effectRef>
+          <a:fontRef idx="minor">
+            <a:schemeClr val="lt1"/>
+          </a:fontRef>
+        </p:style>
+        <p:txBody>
+          <a:bodyPr lIns="0" rIns="0" rtlCol="0" anchor="ctr"/>
+          <a:lstStyle/>
+          <a:p>
+            <a:pPr algn="ctr"/>
+            <a:r>
+              <a:rPr lang="en-US" sz="1200" dirty="0">
+                <a:solidFill>
+                  <a:sysClr val="windowText" lastClr="000000"/>
+                </a:solidFill>
+              </a:rPr>
+              <a:t>(?)</a:t>
+            </a:r>
+          </a:p>
+          <a:p>
+            <a:pPr algn="ctr"/>
+            <a:r>
+              <a:rPr lang="en-US" sz="1200" dirty="0">
+                <a:solidFill>
+                  <a:sysClr val="windowText" lastClr="000000"/>
+                </a:solidFill>
+              </a:rPr>
+              <a:t>(?)</a:t>
+            </a:r>
+            <a:endParaRPr lang="en-JP" sz="1200" dirty="0">
+              <a:solidFill>
+                <a:sysClr val="windowText" lastClr="000000"/>
+              </a:solidFill>
+            </a:endParaRPr>
+          </a:p>
+        </p:txBody>
+      </p:sp>
+      <p:sp>
+        <p:nvSpPr>
+          <p:cNvPr id="38" name="TextBox 37">
+            <a:extLst>
+              <a:ext uri="{FF2B5EF4-FFF2-40B4-BE49-F238E27FC236}">
+                <a16:creationId xmlns:a16="http://schemas.microsoft.com/office/drawing/2014/main" id="{477F6992-1B92-F24F-A873-AFF4AF5792F0}"/>
+              </a:ext>
+            </a:extLst>
+          </p:cNvPr>
+          <p:cNvSpPr txBox="1"/>
+          <p:nvPr/>
+        </p:nvSpPr>
+        <p:spPr>
+          <a:xfrm>
+            <a:off x="10982490" y="1723998"/>
+            <a:ext cx="580608" cy="261610"/>
+          </a:xfrm>
+          <a:prstGeom prst="rect">
+            <a:avLst/>
+          </a:prstGeom>
+          <a:noFill/>
+        </p:spPr>
+        <p:txBody>
+          <a:bodyPr wrap="none" rtlCol="0">
+            <a:spAutoFit/>
+          </a:bodyPr>
+          <a:lstStyle/>
+          <a:p>
+            <a:pPr algn="ctr"/>
+            <a:r>
+              <a:rPr lang="en-JP" sz="1100" dirty="0"/>
+              <a:t>30.134</a:t>
+            </a:r>
+          </a:p>
+        </p:txBody>
+      </p:sp>
+      <p:sp>
+        <p:nvSpPr>
+          <p:cNvPr id="39" name="Rectangle 38">
+            <a:extLst>
+              <a:ext uri="{FF2B5EF4-FFF2-40B4-BE49-F238E27FC236}">
+                <a16:creationId xmlns:a16="http://schemas.microsoft.com/office/drawing/2014/main" id="{FFBF0D24-9E84-9D4F-936E-A1F71E9E7ABC}"/>
+              </a:ext>
+            </a:extLst>
+          </p:cNvPr>
+          <p:cNvSpPr/>
+          <p:nvPr/>
+        </p:nvSpPr>
+        <p:spPr>
+          <a:xfrm>
+            <a:off x="9297248" y="2916021"/>
+            <a:ext cx="1080000" cy="554142"/>
+          </a:xfrm>
+          <a:prstGeom prst="rect">
+            <a:avLst/>
+          </a:prstGeom>
+          <a:solidFill>
+            <a:schemeClr val="bg1"/>
+          </a:solidFill>
+          <a:ln>
+            <a:prstDash val="dash"/>
+          </a:ln>
+        </p:spPr>
+        <p:style>
+          <a:lnRef idx="2">
+            <a:schemeClr val="accent1">
+              <a:shade val="50000"/>
+            </a:schemeClr>
+          </a:lnRef>
+          <a:fillRef idx="1">
+            <a:schemeClr val="accent1"/>
+          </a:fillRef>
+          <a:effectRef idx="0">
+            <a:schemeClr val="accent1"/>
+          </a:effectRef>
+          <a:fontRef idx="minor">
+            <a:schemeClr val="lt1"/>
+          </a:fontRef>
+        </p:style>
+        <p:txBody>
+          <a:bodyPr lIns="0" rIns="0" rtlCol="0" anchor="ctr"/>
+          <a:lstStyle/>
+          <a:p>
+            <a:pPr algn="ctr"/>
+            <a:r>
+              <a:rPr lang="en-US" sz="1200" dirty="0">
+                <a:solidFill>
+                  <a:sysClr val="windowText" lastClr="000000"/>
+                </a:solidFill>
+              </a:rPr>
+              <a:t>(?)</a:t>
+            </a:r>
+          </a:p>
+          <a:p>
+            <a:pPr algn="ctr"/>
+            <a:r>
+              <a:rPr lang="en-US" sz="1200" dirty="0">
+                <a:solidFill>
+                  <a:sysClr val="windowText" lastClr="000000"/>
+                </a:solidFill>
+              </a:rPr>
+              <a:t>(?)</a:t>
+            </a:r>
+            <a:endParaRPr lang="en-JP" sz="1200" dirty="0">
+              <a:solidFill>
+                <a:sysClr val="windowText" lastClr="000000"/>
+              </a:solidFill>
+            </a:endParaRPr>
+          </a:p>
+        </p:txBody>
+      </p:sp>
+      <p:sp>
+        <p:nvSpPr>
+          <p:cNvPr id="40" name="TextBox 39">
+            <a:extLst>
+              <a:ext uri="{FF2B5EF4-FFF2-40B4-BE49-F238E27FC236}">
+                <a16:creationId xmlns:a16="http://schemas.microsoft.com/office/drawing/2014/main" id="{8D002389-5382-914B-A751-8A7B7B9EDAA4}"/>
+              </a:ext>
+            </a:extLst>
+          </p:cNvPr>
+          <p:cNvSpPr txBox="1"/>
+          <p:nvPr/>
+        </p:nvSpPr>
+        <p:spPr>
+          <a:xfrm>
+            <a:off x="9546944" y="3414936"/>
+            <a:ext cx="580608" cy="261610"/>
+          </a:xfrm>
+          <a:prstGeom prst="rect">
+            <a:avLst/>
+          </a:prstGeom>
+          <a:noFill/>
+        </p:spPr>
+        <p:txBody>
+          <a:bodyPr wrap="none" rtlCol="0">
+            <a:spAutoFit/>
+          </a:bodyPr>
+          <a:lstStyle/>
+          <a:p>
+            <a:pPr algn="ctr"/>
+            <a:r>
+              <a:rPr lang="en-JP" sz="1100" dirty="0"/>
+              <a:t>30.130</a:t>
+            </a:r>
+          </a:p>
+        </p:txBody>
+      </p:sp>
+      <p:sp>
+        <p:nvSpPr>
+          <p:cNvPr id="41" name="Rectangle 40">
+            <a:extLst>
+              <a:ext uri="{FF2B5EF4-FFF2-40B4-BE49-F238E27FC236}">
+                <a16:creationId xmlns:a16="http://schemas.microsoft.com/office/drawing/2014/main" id="{05324F03-95F1-F040-99E7-D50A72E4C587}"/>
+              </a:ext>
+            </a:extLst>
+          </p:cNvPr>
+          <p:cNvSpPr/>
+          <p:nvPr/>
+        </p:nvSpPr>
+        <p:spPr>
+          <a:xfrm>
+            <a:off x="10732794" y="2926163"/>
+            <a:ext cx="1080000" cy="554142"/>
+          </a:xfrm>
+          <a:prstGeom prst="rect">
+            <a:avLst/>
+          </a:prstGeom>
+          <a:solidFill>
+            <a:schemeClr val="bg1"/>
+          </a:solidFill>
+          <a:ln>
+            <a:prstDash val="dash"/>
+          </a:ln>
+        </p:spPr>
+        <p:style>
+          <a:lnRef idx="2">
+            <a:schemeClr val="accent1">
+              <a:shade val="50000"/>
+            </a:schemeClr>
+          </a:lnRef>
+          <a:fillRef idx="1">
+            <a:schemeClr val="accent1"/>
+          </a:fillRef>
+          <a:effectRef idx="0">
+            <a:schemeClr val="accent1"/>
+          </a:effectRef>
+          <a:fontRef idx="minor">
+            <a:schemeClr val="lt1"/>
+          </a:fontRef>
+        </p:style>
+        <p:txBody>
+          <a:bodyPr lIns="0" rIns="0" rtlCol="0" anchor="ctr"/>
+          <a:lstStyle/>
+          <a:p>
+            <a:pPr algn="ctr"/>
+            <a:r>
+              <a:rPr lang="en-US" sz="1200" dirty="0">
+                <a:solidFill>
+                  <a:sysClr val="windowText" lastClr="000000"/>
+                </a:solidFill>
+              </a:rPr>
+              <a:t>(?)</a:t>
+            </a:r>
+          </a:p>
+          <a:p>
+            <a:pPr algn="ctr"/>
+            <a:r>
+              <a:rPr lang="en-US" sz="1200" dirty="0">
+                <a:solidFill>
+                  <a:sysClr val="windowText" lastClr="000000"/>
+                </a:solidFill>
+              </a:rPr>
+              <a:t>(?)</a:t>
+            </a:r>
+            <a:endParaRPr lang="en-JP" sz="1200" dirty="0">
+              <a:solidFill>
+                <a:sysClr val="windowText" lastClr="000000"/>
+              </a:solidFill>
+            </a:endParaRPr>
+          </a:p>
+        </p:txBody>
+      </p:sp>
+      <p:sp>
+        <p:nvSpPr>
+          <p:cNvPr id="42" name="TextBox 41">
+            <a:extLst>
+              <a:ext uri="{FF2B5EF4-FFF2-40B4-BE49-F238E27FC236}">
+                <a16:creationId xmlns:a16="http://schemas.microsoft.com/office/drawing/2014/main" id="{96A0A645-9117-424F-8C91-1B610C632864}"/>
+              </a:ext>
+            </a:extLst>
+          </p:cNvPr>
+          <p:cNvSpPr txBox="1"/>
+          <p:nvPr/>
+        </p:nvSpPr>
+        <p:spPr>
+          <a:xfrm>
+            <a:off x="10982490" y="3425078"/>
+            <a:ext cx="580608" cy="261610"/>
+          </a:xfrm>
+          <a:prstGeom prst="rect">
+            <a:avLst/>
+          </a:prstGeom>
+          <a:noFill/>
+        </p:spPr>
+        <p:txBody>
+          <a:bodyPr wrap="none" rtlCol="0">
+            <a:spAutoFit/>
+          </a:bodyPr>
+          <a:lstStyle/>
+          <a:p>
+            <a:pPr algn="ctr"/>
+            <a:r>
+              <a:rPr lang="en-JP" sz="1100" dirty="0"/>
+              <a:t>30.136</a:t>
+            </a:r>
+          </a:p>
+        </p:txBody>
+      </p:sp>
+      <p:sp>
+        <p:nvSpPr>
+          <p:cNvPr id="43" name="Rectangle 42">
+            <a:extLst>
+              <a:ext uri="{FF2B5EF4-FFF2-40B4-BE49-F238E27FC236}">
+                <a16:creationId xmlns:a16="http://schemas.microsoft.com/office/drawing/2014/main" id="{D349E228-A45F-C548-A256-61E7D3E6C1A4}"/>
+              </a:ext>
+            </a:extLst>
+          </p:cNvPr>
+          <p:cNvSpPr/>
+          <p:nvPr/>
+        </p:nvSpPr>
+        <p:spPr>
+          <a:xfrm>
+            <a:off x="10732794" y="3776703"/>
+            <a:ext cx="1080000" cy="554142"/>
+          </a:xfrm>
+          <a:prstGeom prst="rect">
+            <a:avLst/>
+          </a:prstGeom>
+          <a:solidFill>
+            <a:schemeClr val="bg1"/>
+          </a:solidFill>
+          <a:ln>
+            <a:prstDash val="dash"/>
+          </a:ln>
+        </p:spPr>
+        <p:style>
+          <a:lnRef idx="2">
+            <a:schemeClr val="accent1">
+              <a:shade val="50000"/>
+            </a:schemeClr>
+          </a:lnRef>
+          <a:fillRef idx="1">
+            <a:schemeClr val="accent1"/>
+          </a:fillRef>
+          <a:effectRef idx="0">
+            <a:schemeClr val="accent1"/>
+          </a:effectRef>
+          <a:fontRef idx="minor">
+            <a:schemeClr val="lt1"/>
+          </a:fontRef>
+        </p:style>
+        <p:txBody>
+          <a:bodyPr lIns="0" rIns="0" rtlCol="0" anchor="ctr"/>
+          <a:lstStyle/>
+          <a:p>
+            <a:pPr algn="ctr"/>
+            <a:r>
+              <a:rPr lang="en-US" sz="1200" dirty="0">
+                <a:solidFill>
+                  <a:sysClr val="windowText" lastClr="000000"/>
+                </a:solidFill>
+              </a:rPr>
+              <a:t>(?)</a:t>
+            </a:r>
+          </a:p>
+          <a:p>
+            <a:pPr algn="ctr"/>
+            <a:r>
+              <a:rPr lang="en-US" sz="1200" dirty="0">
+                <a:solidFill>
+                  <a:sysClr val="windowText" lastClr="000000"/>
+                </a:solidFill>
+              </a:rPr>
+              <a:t>(?)</a:t>
+            </a:r>
+            <a:endParaRPr lang="en-JP" sz="1200" dirty="0">
+              <a:solidFill>
+                <a:sysClr val="windowText" lastClr="000000"/>
+              </a:solidFill>
+            </a:endParaRPr>
+          </a:p>
+        </p:txBody>
+      </p:sp>
+      <p:sp>
+        <p:nvSpPr>
+          <p:cNvPr id="44" name="TextBox 43">
+            <a:extLst>
+              <a:ext uri="{FF2B5EF4-FFF2-40B4-BE49-F238E27FC236}">
+                <a16:creationId xmlns:a16="http://schemas.microsoft.com/office/drawing/2014/main" id="{1FF14569-A871-7D41-B2AA-F01543D7E0EE}"/>
+              </a:ext>
+            </a:extLst>
+          </p:cNvPr>
+          <p:cNvSpPr txBox="1"/>
+          <p:nvPr/>
+        </p:nvSpPr>
+        <p:spPr>
+          <a:xfrm>
+            <a:off x="10982490" y="4275618"/>
+            <a:ext cx="580608" cy="261610"/>
+          </a:xfrm>
+          <a:prstGeom prst="rect">
+            <a:avLst/>
+          </a:prstGeom>
+          <a:noFill/>
+        </p:spPr>
+        <p:txBody>
+          <a:bodyPr wrap="none" rtlCol="0">
+            <a:spAutoFit/>
+          </a:bodyPr>
+          <a:lstStyle/>
+          <a:p>
+            <a:pPr algn="ctr"/>
+            <a:r>
+              <a:rPr lang="en-JP" sz="1100" dirty="0"/>
+              <a:t>30.137</a:t>
+            </a:r>
+          </a:p>
+        </p:txBody>
+      </p:sp>
+      <p:sp>
+        <p:nvSpPr>
+          <p:cNvPr id="45" name="Rectangle 44">
+            <a:extLst>
+              <a:ext uri="{FF2B5EF4-FFF2-40B4-BE49-F238E27FC236}">
+                <a16:creationId xmlns:a16="http://schemas.microsoft.com/office/drawing/2014/main" id="{A98E6801-A142-754B-9CB1-D0DB74253750}"/>
+              </a:ext>
+            </a:extLst>
+          </p:cNvPr>
+          <p:cNvSpPr/>
+          <p:nvPr/>
+        </p:nvSpPr>
+        <p:spPr>
+          <a:xfrm>
+            <a:off x="9297248" y="1225083"/>
+            <a:ext cx="1080000" cy="554142"/>
+          </a:xfrm>
+          <a:prstGeom prst="rect">
+            <a:avLst/>
+          </a:prstGeom>
+          <a:solidFill>
+            <a:schemeClr val="bg1"/>
+          </a:solidFill>
+          <a:ln>
+            <a:prstDash val="dash"/>
+          </a:ln>
+        </p:spPr>
+        <p:style>
+          <a:lnRef idx="2">
+            <a:schemeClr val="accent1">
+              <a:shade val="50000"/>
+            </a:schemeClr>
+          </a:lnRef>
+          <a:fillRef idx="1">
+            <a:schemeClr val="accent1"/>
+          </a:fillRef>
+          <a:effectRef idx="0">
+            <a:schemeClr val="accent1"/>
+          </a:effectRef>
+          <a:fontRef idx="minor">
+            <a:schemeClr val="lt1"/>
+          </a:fontRef>
+        </p:style>
+        <p:txBody>
+          <a:bodyPr lIns="0" rIns="0" rtlCol="0" anchor="ctr"/>
+          <a:lstStyle/>
+          <a:p>
+            <a:pPr algn="ctr"/>
+            <a:r>
+              <a:rPr lang="en-US" sz="1200" dirty="0">
+                <a:solidFill>
+                  <a:sysClr val="windowText" lastClr="000000"/>
+                </a:solidFill>
+              </a:rPr>
+              <a:t>(?)</a:t>
+            </a:r>
+          </a:p>
+          <a:p>
+            <a:pPr algn="ctr"/>
+            <a:r>
+              <a:rPr lang="en-US" sz="1200" dirty="0">
+                <a:solidFill>
+                  <a:sysClr val="windowText" lastClr="000000"/>
+                </a:solidFill>
+              </a:rPr>
+              <a:t>(?)</a:t>
+            </a:r>
+            <a:endParaRPr lang="en-JP" sz="1200" dirty="0">
+              <a:solidFill>
+                <a:sysClr val="windowText" lastClr="000000"/>
+              </a:solidFill>
+            </a:endParaRPr>
+          </a:p>
+        </p:txBody>
+      </p:sp>
+      <p:sp>
+        <p:nvSpPr>
+          <p:cNvPr id="46" name="TextBox 45">
+            <a:extLst>
+              <a:ext uri="{FF2B5EF4-FFF2-40B4-BE49-F238E27FC236}">
+                <a16:creationId xmlns:a16="http://schemas.microsoft.com/office/drawing/2014/main" id="{D3676FB1-24F6-6245-9945-B7906A49CE54}"/>
+              </a:ext>
+            </a:extLst>
+          </p:cNvPr>
+          <p:cNvSpPr txBox="1"/>
+          <p:nvPr/>
+        </p:nvSpPr>
+        <p:spPr>
+          <a:xfrm>
+            <a:off x="9546944" y="1723998"/>
+            <a:ext cx="580608" cy="261610"/>
+          </a:xfrm>
+          <a:prstGeom prst="rect">
+            <a:avLst/>
+          </a:prstGeom>
+          <a:noFill/>
+        </p:spPr>
+        <p:txBody>
+          <a:bodyPr wrap="none" rtlCol="0">
+            <a:spAutoFit/>
+          </a:bodyPr>
+          <a:lstStyle/>
+          <a:p>
+            <a:pPr algn="ctr"/>
+            <a:r>
+              <a:rPr lang="en-JP" sz="1100" dirty="0"/>
+              <a:t>30.128</a:t>
+            </a:r>
+          </a:p>
+        </p:txBody>
+      </p:sp>
+      <p:sp>
+        <p:nvSpPr>
+          <p:cNvPr id="47" name="Rectangle 46">
+            <a:extLst>
+              <a:ext uri="{FF2B5EF4-FFF2-40B4-BE49-F238E27FC236}">
+                <a16:creationId xmlns:a16="http://schemas.microsoft.com/office/drawing/2014/main" id="{DBA2935F-9F22-9B43-8EF3-47DFCC93BDD7}"/>
+              </a:ext>
+            </a:extLst>
+          </p:cNvPr>
+          <p:cNvSpPr/>
+          <p:nvPr/>
+        </p:nvSpPr>
+        <p:spPr>
+          <a:xfrm>
+            <a:off x="9297248" y="5452427"/>
+            <a:ext cx="1080000" cy="554142"/>
+          </a:xfrm>
+          <a:prstGeom prst="rect">
+            <a:avLst/>
+          </a:prstGeom>
+          <a:solidFill>
+            <a:schemeClr val="bg1"/>
+          </a:solidFill>
+          <a:ln>
+            <a:prstDash val="dash"/>
+          </a:ln>
+        </p:spPr>
+        <p:style>
+          <a:lnRef idx="2">
+            <a:schemeClr val="accent1">
+              <a:shade val="50000"/>
+            </a:schemeClr>
+          </a:lnRef>
+          <a:fillRef idx="1">
+            <a:schemeClr val="accent1"/>
+          </a:fillRef>
+          <a:effectRef idx="0">
+            <a:schemeClr val="accent1"/>
+          </a:effectRef>
+          <a:fontRef idx="minor">
+            <a:schemeClr val="lt1"/>
+          </a:fontRef>
+        </p:style>
+        <p:txBody>
+          <a:bodyPr lIns="0" rIns="0" rtlCol="0" anchor="ctr"/>
+          <a:lstStyle/>
+          <a:p>
+            <a:pPr algn="ctr"/>
+            <a:r>
+              <a:rPr lang="en-US" sz="1200" dirty="0">
+                <a:solidFill>
+                  <a:sysClr val="windowText" lastClr="000000"/>
+                </a:solidFill>
+              </a:rPr>
+              <a:t>(?)</a:t>
+            </a:r>
+          </a:p>
+          <a:p>
+            <a:pPr algn="ctr"/>
+            <a:r>
+              <a:rPr lang="en-US" sz="1200" dirty="0">
+                <a:solidFill>
+                  <a:sysClr val="windowText" lastClr="000000"/>
+                </a:solidFill>
+              </a:rPr>
+              <a:t>(?)</a:t>
+            </a:r>
+            <a:endParaRPr lang="en-JP" sz="1200" dirty="0">
+              <a:solidFill>
+                <a:sysClr val="windowText" lastClr="000000"/>
+              </a:solidFill>
+            </a:endParaRPr>
+          </a:p>
+        </p:txBody>
+      </p:sp>
+      <p:sp>
+        <p:nvSpPr>
+          <p:cNvPr id="48" name="TextBox 47">
+            <a:extLst>
+              <a:ext uri="{FF2B5EF4-FFF2-40B4-BE49-F238E27FC236}">
+                <a16:creationId xmlns:a16="http://schemas.microsoft.com/office/drawing/2014/main" id="{FB8CB0BA-C508-FD44-9494-4F12939397AA}"/>
+              </a:ext>
+            </a:extLst>
+          </p:cNvPr>
+          <p:cNvSpPr txBox="1"/>
+          <p:nvPr/>
+        </p:nvSpPr>
+        <p:spPr>
+          <a:xfrm>
+            <a:off x="9546944" y="5951342"/>
+            <a:ext cx="580608" cy="261610"/>
+          </a:xfrm>
+          <a:prstGeom prst="rect">
+            <a:avLst/>
+          </a:prstGeom>
+          <a:noFill/>
+        </p:spPr>
+        <p:txBody>
+          <a:bodyPr wrap="none" rtlCol="0">
+            <a:spAutoFit/>
+          </a:bodyPr>
+          <a:lstStyle/>
+          <a:p>
+            <a:pPr algn="ctr"/>
+            <a:r>
+              <a:rPr lang="en-JP" sz="1100" dirty="0"/>
+              <a:t>30.133</a:t>
+            </a:r>
+          </a:p>
+        </p:txBody>
+      </p:sp>
+      <p:sp>
+        <p:nvSpPr>
+          <p:cNvPr id="49" name="Rectangle 48">
+            <a:extLst>
+              <a:ext uri="{FF2B5EF4-FFF2-40B4-BE49-F238E27FC236}">
+                <a16:creationId xmlns:a16="http://schemas.microsoft.com/office/drawing/2014/main" id="{F124F1B1-D195-1F4C-9381-F106664662F7}"/>
+              </a:ext>
+            </a:extLst>
+          </p:cNvPr>
+          <p:cNvSpPr/>
+          <p:nvPr/>
+        </p:nvSpPr>
+        <p:spPr>
+          <a:xfrm>
+            <a:off x="10732794" y="5477782"/>
+            <a:ext cx="1080000" cy="554142"/>
+          </a:xfrm>
+          <a:prstGeom prst="rect">
+            <a:avLst/>
+          </a:prstGeom>
+          <a:solidFill>
+            <a:schemeClr val="bg1"/>
+          </a:solidFill>
+        </p:spPr>
+        <p:style>
+          <a:lnRef idx="2">
+            <a:schemeClr val="accent1">
+              <a:shade val="50000"/>
+            </a:schemeClr>
+          </a:lnRef>
+          <a:fillRef idx="1">
+            <a:schemeClr val="accent1"/>
+          </a:fillRef>
+          <a:effectRef idx="0">
+            <a:schemeClr val="accent1"/>
+          </a:effectRef>
+          <a:fontRef idx="minor">
+            <a:schemeClr val="lt1"/>
+          </a:fontRef>
+        </p:style>
+        <p:txBody>
+          <a:bodyPr lIns="0" rIns="0" rtlCol="0" anchor="ctr"/>
+          <a:lstStyle/>
+          <a:p>
+            <a:pPr algn="ctr"/>
+            <a:r>
+              <a:rPr lang="en-US" sz="1200" dirty="0">
+                <a:solidFill>
+                  <a:sysClr val="windowText" lastClr="000000"/>
+                </a:solidFill>
+              </a:rPr>
+              <a:t>(?)</a:t>
+            </a:r>
+          </a:p>
+          <a:p>
+            <a:pPr algn="ctr"/>
+            <a:r>
+              <a:rPr lang="en-US" sz="1200" dirty="0">
+                <a:solidFill>
+                  <a:sysClr val="windowText" lastClr="000000"/>
+                </a:solidFill>
+              </a:rPr>
+              <a:t>(?)</a:t>
+            </a:r>
+            <a:endParaRPr lang="en-JP" sz="1200" dirty="0">
+              <a:solidFill>
+                <a:sysClr val="windowText" lastClr="000000"/>
+              </a:solidFill>
+            </a:endParaRPr>
+          </a:p>
+        </p:txBody>
+      </p:sp>
+      <p:sp>
+        <p:nvSpPr>
+          <p:cNvPr id="50" name="TextBox 49">
+            <a:extLst>
+              <a:ext uri="{FF2B5EF4-FFF2-40B4-BE49-F238E27FC236}">
+                <a16:creationId xmlns:a16="http://schemas.microsoft.com/office/drawing/2014/main" id="{60064178-338F-5C4D-9D86-012D28620A60}"/>
+              </a:ext>
+            </a:extLst>
+          </p:cNvPr>
+          <p:cNvSpPr txBox="1"/>
+          <p:nvPr/>
+        </p:nvSpPr>
+        <p:spPr>
+          <a:xfrm>
+            <a:off x="10982490" y="5976697"/>
+            <a:ext cx="580608" cy="261610"/>
+          </a:xfrm>
+          <a:prstGeom prst="rect">
+            <a:avLst/>
+          </a:prstGeom>
+          <a:noFill/>
+        </p:spPr>
+        <p:txBody>
+          <a:bodyPr wrap="none" rtlCol="0">
+            <a:spAutoFit/>
+          </a:bodyPr>
+          <a:lstStyle/>
+          <a:p>
+            <a:pPr algn="ctr"/>
+            <a:r>
+              <a:rPr lang="en-JP" sz="1100" dirty="0"/>
+              <a:t>30.139</a:t>
+            </a:r>
+          </a:p>
+        </p:txBody>
+      </p:sp>
+      <p:sp>
+        <p:nvSpPr>
+          <p:cNvPr id="51" name="Rectangle 50">
+            <a:extLst>
+              <a:ext uri="{FF2B5EF4-FFF2-40B4-BE49-F238E27FC236}">
+                <a16:creationId xmlns:a16="http://schemas.microsoft.com/office/drawing/2014/main" id="{14A6D950-8D07-8940-A592-4059FB77DD8A}"/>
+              </a:ext>
+            </a:extLst>
+          </p:cNvPr>
+          <p:cNvSpPr/>
+          <p:nvPr/>
+        </p:nvSpPr>
+        <p:spPr>
+          <a:xfrm>
+            <a:off x="9297248" y="3761490"/>
+            <a:ext cx="1080000" cy="554142"/>
+          </a:xfrm>
+          <a:prstGeom prst="rect">
+            <a:avLst/>
+          </a:prstGeom>
+          <a:solidFill>
+            <a:schemeClr val="bg1"/>
+          </a:solidFill>
+          <a:ln>
+            <a:prstDash val="dash"/>
+          </a:ln>
+        </p:spPr>
+        <p:style>
+          <a:lnRef idx="2">
+            <a:schemeClr val="accent1">
+              <a:shade val="50000"/>
+            </a:schemeClr>
+          </a:lnRef>
+          <a:fillRef idx="1">
+            <a:schemeClr val="accent1"/>
+          </a:fillRef>
+          <a:effectRef idx="0">
+            <a:schemeClr val="accent1"/>
+          </a:effectRef>
+          <a:fontRef idx="minor">
+            <a:schemeClr val="lt1"/>
+          </a:fontRef>
+        </p:style>
+        <p:txBody>
+          <a:bodyPr lIns="0" rIns="0" rtlCol="0" anchor="ctr"/>
+          <a:lstStyle/>
+          <a:p>
+            <a:pPr algn="ctr"/>
+            <a:r>
+              <a:rPr lang="en-US" sz="1200" dirty="0">
+                <a:solidFill>
+                  <a:sysClr val="windowText" lastClr="000000"/>
+                </a:solidFill>
+              </a:rPr>
+              <a:t>(?)</a:t>
+            </a:r>
+          </a:p>
+          <a:p>
+            <a:pPr algn="ctr"/>
+            <a:r>
+              <a:rPr lang="en-US" sz="1200" dirty="0">
+                <a:solidFill>
+                  <a:sysClr val="windowText" lastClr="000000"/>
+                </a:solidFill>
+              </a:rPr>
+              <a:t>(?)</a:t>
+            </a:r>
+            <a:endParaRPr lang="en-JP" sz="1200" dirty="0">
+              <a:solidFill>
+                <a:sysClr val="windowText" lastClr="000000"/>
+              </a:solidFill>
+            </a:endParaRPr>
+          </a:p>
+        </p:txBody>
+      </p:sp>
+      <p:sp>
+        <p:nvSpPr>
+          <p:cNvPr id="52" name="TextBox 51">
+            <a:extLst>
+              <a:ext uri="{FF2B5EF4-FFF2-40B4-BE49-F238E27FC236}">
+                <a16:creationId xmlns:a16="http://schemas.microsoft.com/office/drawing/2014/main" id="{411DF97D-2D5D-7A46-BA62-4C65E0164185}"/>
+              </a:ext>
+            </a:extLst>
+          </p:cNvPr>
+          <p:cNvSpPr txBox="1"/>
+          <p:nvPr/>
+        </p:nvSpPr>
+        <p:spPr>
+          <a:xfrm>
+            <a:off x="9546944" y="4260405"/>
+            <a:ext cx="580608" cy="261610"/>
+          </a:xfrm>
+          <a:prstGeom prst="rect">
+            <a:avLst/>
+          </a:prstGeom>
+          <a:noFill/>
+        </p:spPr>
+        <p:txBody>
+          <a:bodyPr wrap="none" rtlCol="0">
+            <a:spAutoFit/>
+          </a:bodyPr>
+          <a:lstStyle/>
+          <a:p>
+            <a:pPr algn="ctr"/>
+            <a:r>
+              <a:rPr lang="en-JP" sz="1100" dirty="0"/>
+              <a:t>30.131</a:t>
+            </a:r>
+          </a:p>
+        </p:txBody>
+      </p:sp>
+      <p:sp>
+        <p:nvSpPr>
+          <p:cNvPr id="53" name="Rectangle 52">
+            <a:extLst>
+              <a:ext uri="{FF2B5EF4-FFF2-40B4-BE49-F238E27FC236}">
+                <a16:creationId xmlns:a16="http://schemas.microsoft.com/office/drawing/2014/main" id="{0B9C857C-5939-AE40-BC17-C74785939DB4}"/>
+              </a:ext>
+            </a:extLst>
+          </p:cNvPr>
+          <p:cNvSpPr/>
+          <p:nvPr/>
+        </p:nvSpPr>
+        <p:spPr>
+          <a:xfrm flipV="1">
+            <a:off x="7914556" y="6449409"/>
+            <a:ext cx="268446" cy="225737"/>
+          </a:xfrm>
+          <a:prstGeom prst="rect">
+            <a:avLst/>
+          </a:prstGeom>
+          <a:solidFill>
+            <a:schemeClr val="bg1"/>
+          </a:solidFill>
+          <a:ln>
+            <a:prstDash val="dash"/>
+          </a:ln>
+        </p:spPr>
+        <p:style>
+          <a:lnRef idx="2">
+            <a:schemeClr val="accent1">
+              <a:shade val="50000"/>
+            </a:schemeClr>
+          </a:lnRef>
+          <a:fillRef idx="1">
+            <a:schemeClr val="accent1"/>
+          </a:fillRef>
+          <a:effectRef idx="0">
+            <a:schemeClr val="accent1"/>
+          </a:effectRef>
+          <a:fontRef idx="minor">
+            <a:schemeClr val="lt1"/>
+          </a:fontRef>
+        </p:style>
+        <p:txBody>
+          <a:bodyPr lIns="0" rIns="0" rtlCol="0" anchor="ctr"/>
+          <a:lstStyle/>
+          <a:p>
+            <a:pPr algn="ctr"/>
+            <a:endParaRPr lang="en-JP" sz="1200" dirty="0">
+              <a:solidFill>
+                <a:sysClr val="windowText" lastClr="000000"/>
+              </a:solidFill>
+            </a:endParaRPr>
+          </a:p>
+        </p:txBody>
+      </p:sp>
+      <p:sp>
+        <p:nvSpPr>
+          <p:cNvPr id="54" name="TextBox 53">
+            <a:extLst>
+              <a:ext uri="{FF2B5EF4-FFF2-40B4-BE49-F238E27FC236}">
+                <a16:creationId xmlns:a16="http://schemas.microsoft.com/office/drawing/2014/main" id="{64B42FA6-B8FF-A546-8B3A-89180EFE2C22}"/>
+              </a:ext>
+            </a:extLst>
+          </p:cNvPr>
+          <p:cNvSpPr txBox="1"/>
+          <p:nvPr/>
+        </p:nvSpPr>
+        <p:spPr>
+          <a:xfrm>
+            <a:off x="8153400" y="6438718"/>
+            <a:ext cx="2694969" cy="261610"/>
+          </a:xfrm>
+          <a:prstGeom prst="rect">
+            <a:avLst/>
+          </a:prstGeom>
+          <a:noFill/>
+        </p:spPr>
+        <p:txBody>
+          <a:bodyPr wrap="none" rtlCol="0">
+            <a:spAutoFit/>
+          </a:bodyPr>
+          <a:lstStyle/>
+          <a:p>
+            <a:r>
+              <a:rPr lang="en-JP" sz="1100" dirty="0"/>
+              <a:t>: has DHCP lease, but don’t respond to ping.</a:t>
+            </a:r>
           </a:p>
         </p:txBody>
       </p:sp>

</xml_diff>

<commit_message>
update plugfest network diagram
</commit_message>
<xml_diff>
--- a/events/2020.06.Online/plugfestnetwork.pptx
+++ b/events/2020.06.Online/plugfestnetwork.pptx
@@ -5,10 +5,11 @@
     <p:sldMasterId id="2147483648" r:id="rId1"/>
   </p:sldMasterIdLst>
   <p:notesMasterIdLst>
-    <p:notesMasterId r:id="rId3"/>
+    <p:notesMasterId r:id="rId4"/>
   </p:notesMasterIdLst>
   <p:sldIdLst>
     <p:sldId id="257" r:id="rId2"/>
+    <p:sldId id="258" r:id="rId3"/>
   </p:sldIdLst>
   <p:sldSz cx="12192000" cy="6858000"/>
   <p:notesSz cx="6858000" cy="9144000"/>
@@ -208,7 +209,7 @@
           <a:p>
             <a:fld id="{8389B5DD-0274-BF45-B4C5-62E173E8F634}" type="datetimeFigureOut">
               <a:rPr lang="en-US" smtClean="0"/>
-              <a:t>6/16/20</a:t>
+              <a:t>6/17/20</a:t>
             </a:fld>
             <a:endParaRPr lang="en-US"/>
           </a:p>
@@ -824,7 +825,7 @@
           <a:p>
             <a:fld id="{2F93E591-CC8D-C74E-8EED-098A7FB5E64D}" type="datetime1">
               <a:rPr lang="en-CA" smtClean="0"/>
-              <a:t>2020-06-16</a:t>
+              <a:t>2020-06-17</a:t>
             </a:fld>
             <a:endParaRPr lang="en-US"/>
           </a:p>
@@ -1092,7 +1093,7 @@
           <a:p>
             <a:fld id="{2E1BC118-574D-594E-ABEA-A7C82666C9AB}" type="datetime1">
               <a:rPr lang="en-CA" smtClean="0"/>
-              <a:t>2020-06-16</a:t>
+              <a:t>2020-06-17</a:t>
             </a:fld>
             <a:endParaRPr lang="en-US"/>
           </a:p>
@@ -1458,7 +1459,7 @@
           <a:p>
             <a:fld id="{B929AB1E-7FD9-0A40-B7C0-508CCACB3E9A}" type="datetime1">
               <a:rPr lang="en-CA" smtClean="0"/>
-              <a:t>2020-06-16</a:t>
+              <a:t>2020-06-17</a:t>
             </a:fld>
             <a:endParaRPr lang="en-US"/>
           </a:p>
@@ -1690,7 +1691,7 @@
           <a:p>
             <a:fld id="{5AE8723F-57EA-4C47-97B9-92AFDEEF85DC}" type="datetime1">
               <a:rPr lang="en-CA" smtClean="0"/>
-              <a:t>2020-06-16</a:t>
+              <a:t>2020-06-17</a:t>
             </a:fld>
             <a:endParaRPr lang="en-US"/>
           </a:p>
@@ -2020,7 +2021,7 @@
           <a:p>
             <a:fld id="{B2B00E5D-EC04-AA49-8D52-0FCB6E08F63D}" type="datetime1">
               <a:rPr lang="en-CA" smtClean="0"/>
-              <a:t>2020-06-16</a:t>
+              <a:t>2020-06-17</a:t>
             </a:fld>
             <a:endParaRPr lang="en-US"/>
           </a:p>
@@ -2493,7 +2494,7 @@
           <a:p>
             <a:fld id="{FF90905C-10FF-8047-AA7E-6DC7E8B6AF51}" type="datetime1">
               <a:rPr lang="en-CA" smtClean="0"/>
-              <a:t>2020-06-16</a:t>
+              <a:t>2020-06-17</a:t>
             </a:fld>
             <a:endParaRPr lang="en-US"/>
           </a:p>
@@ -2699,7 +2700,7 @@
           <a:p>
             <a:fld id="{D1CE86E2-4400-D342-BEEC-F9C1ADF6F9F7}" type="datetime1">
               <a:rPr lang="en-CA" smtClean="0"/>
-              <a:t>2020-06-16</a:t>
+              <a:t>2020-06-17</a:t>
             </a:fld>
             <a:endParaRPr lang="en-US"/>
           </a:p>
@@ -2869,7 +2870,7 @@
           <a:p>
             <a:fld id="{74358A08-7221-7F45-8378-69D5559861DD}" type="datetime1">
               <a:rPr lang="en-CA" smtClean="0"/>
-              <a:t>2020-06-16</a:t>
+              <a:t>2020-06-17</a:t>
             </a:fld>
             <a:endParaRPr lang="en-US"/>
           </a:p>
@@ -3241,7 +3242,7 @@
           <a:p>
             <a:fld id="{08C20FDB-303D-8A4E-83B7-226DD88B97BD}" type="datetime1">
               <a:rPr lang="en-CA" smtClean="0"/>
-              <a:t>2020-06-16</a:t>
+              <a:t>2020-06-17</a:t>
             </a:fld>
             <a:endParaRPr lang="en-US"/>
           </a:p>
@@ -3593,7 +3594,7 @@
           <a:p>
             <a:fld id="{0A9EBA37-9D18-D34A-A88D-1B00AA06E95C}" type="datetime1">
               <a:rPr lang="en-CA" smtClean="0"/>
-              <a:t>2020-06-16</a:t>
+              <a:t>2020-06-17</a:t>
             </a:fld>
             <a:endParaRPr lang="en-US"/>
           </a:p>
@@ -3933,7 +3934,7 @@
             <a:fld id="{B73A2E78-F38A-E046-ACDB-668F070D1EF6}" type="datetime1">
               <a:rPr lang="en-CA" smtClean="0"/>
               <a:pPr/>
-              <a:t>2020-06-16</a:t>
+              <a:t>2020-06-17</a:t>
             </a:fld>
             <a:endParaRPr lang="en-US" dirty="0"/>
           </a:p>
@@ -4340,7 +4341,7 @@
           <a:p>
             <a:r>
               <a:rPr lang="en-US" dirty="0"/>
-              <a:t>Plugfest network (as of 2020-06-16 1200UTC)</a:t>
+              <a:t>Plugfest network (as of 2020-06-17 1100UTC)</a:t>
             </a:r>
           </a:p>
         </p:txBody>
@@ -4368,7 +4369,7 @@
           <a:p>
             <a:fld id="{BF92DA42-2970-1B4D-9C1F-77F249CD7467}" type="datetime1">
               <a:rPr lang="en-CA" smtClean="0"/>
-              <a:t>2020-06-16</a:t>
+              <a:t>2020-06-17</a:t>
             </a:fld>
             <a:endParaRPr lang="en-US"/>
           </a:p>
@@ -4420,7 +4421,7 @@
         </p:nvSpPr>
         <p:spPr>
           <a:xfrm>
-            <a:off x="8749889" y="6912851"/>
+            <a:off x="8749889" y="7073162"/>
             <a:ext cx="2743200" cy="365125"/>
           </a:xfrm>
         </p:spPr>
@@ -4450,8 +4451,8 @@
         </p:nvSpPr>
         <p:spPr>
           <a:xfrm>
-            <a:off x="6095999" y="1107040"/>
-            <a:ext cx="5899935" cy="5249310"/>
+            <a:off x="6095999" y="1084813"/>
+            <a:ext cx="5899935" cy="5400234"/>
           </a:xfrm>
           <a:prstGeom prst="roundRect">
             <a:avLst>
@@ -4734,8 +4735,8 @@
         </p:nvSpPr>
         <p:spPr>
           <a:xfrm>
-            <a:off x="9751852" y="2657514"/>
-            <a:ext cx="580608" cy="261610"/>
+            <a:off x="9630025" y="2657514"/>
+            <a:ext cx="824264" cy="430887"/>
           </a:xfrm>
           <a:prstGeom prst="rect">
             <a:avLst/>
@@ -4751,6 +4752,13 @@
             <a:pPr algn="ctr"/>
             <a:r>
               <a:rPr lang="en-JP" sz="1100" dirty="0"/>
+              <a:t>ktorpi.local</a:t>
+            </a:r>
+          </a:p>
+          <a:p>
+            <a:pPr algn="ctr"/>
+            <a:r>
+              <a:rPr lang="en-JP" sz="1100" dirty="0"/>
               <a:t>30.135</a:t>
             </a:r>
           </a:p>
@@ -4779,6 +4787,9 @@
           <a:solidFill>
             <a:schemeClr val="bg1"/>
           </a:solidFill>
+          <a:ln>
+            <a:prstDash val="dash"/>
+          </a:ln>
         </p:spPr>
         <p:style>
           <a:lnRef idx="2">
@@ -4843,7 +4854,7 @@
         <p:spPr>
           <a:xfrm>
             <a:off x="8316306" y="2652443"/>
-            <a:ext cx="580608" cy="261610"/>
+            <a:ext cx="580607" cy="430887"/>
           </a:xfrm>
           <a:prstGeom prst="rect">
             <a:avLst/>
@@ -4855,6 +4866,13 @@
             <a:spAutoFit/>
           </a:bodyPr>
           <a:lstStyle/>
+          <a:p>
+            <a:pPr algn="ctr"/>
+            <a:r>
+              <a:rPr lang="en-JP" sz="1100" dirty="0"/>
+              <a:t>(jv)</a:t>
+            </a:r>
+          </a:p>
           <a:p>
             <a:pPr algn="ctr"/>
             <a:r>
@@ -5431,7 +5449,7 @@
             <a:schemeClr val="bg1"/>
           </a:solidFill>
           <a:ln>
-            <a:prstDash val="dash"/>
+            <a:prstDash val="solid"/>
           </a:ln>
         </p:spPr>
         <p:style>
@@ -5496,8 +5514,8 @@
         </p:nvSpPr>
         <p:spPr>
           <a:xfrm>
-            <a:off x="9751852" y="5209134"/>
-            <a:ext cx="580608" cy="261610"/>
+            <a:off x="9215651" y="5209134"/>
+            <a:ext cx="1653017" cy="430887"/>
           </a:xfrm>
           <a:prstGeom prst="rect">
             <a:avLst/>
@@ -5509,6 +5527,13 @@
             <a:spAutoFit/>
           </a:bodyPr>
           <a:lstStyle/>
+          <a:p>
+            <a:pPr algn="ctr"/>
+            <a:r>
+              <a:rPr lang="en-JP" sz="1100" dirty="0"/>
+              <a:t>esp32-3c71bf428efc.local</a:t>
+            </a:r>
+          </a:p>
           <a:p>
             <a:pPr algn="ctr"/>
             <a:r>
@@ -5626,8 +5651,8 @@
         </p:nvSpPr>
         <p:spPr>
           <a:xfrm>
-            <a:off x="8316306" y="5188850"/>
-            <a:ext cx="580608" cy="261610"/>
+            <a:off x="7816973" y="5188850"/>
+            <a:ext cx="1579279" cy="430887"/>
           </a:xfrm>
           <a:prstGeom prst="rect">
             <a:avLst/>
@@ -5639,6 +5664,14 @@
             <a:spAutoFit/>
           </a:bodyPr>
           <a:lstStyle/>
+          <a:p>
+            <a:pPr algn="ctr"/>
+            <a:r>
+              <a:rPr lang="en-US" sz="1100" dirty="0" err="1"/>
+              <a:t>iot-linksmart-white.local</a:t>
+            </a:r>
+            <a:endParaRPr lang="en-JP" sz="1100" dirty="0"/>
+          </a:p>
           <a:p>
             <a:pPr algn="ctr"/>
             <a:r>
@@ -5737,8 +5770,8 @@
         </p:nvSpPr>
         <p:spPr>
           <a:xfrm>
-            <a:off x="9751852" y="1806974"/>
-            <a:ext cx="580608" cy="261610"/>
+            <a:off x="9603574" y="1806974"/>
+            <a:ext cx="877164" cy="430887"/>
           </a:xfrm>
           <a:prstGeom prst="rect">
             <a:avLst/>
@@ -5750,6 +5783,21 @@
             <a:spAutoFit/>
           </a:bodyPr>
           <a:lstStyle/>
+          <a:p>
+            <a:pPr algn="ctr"/>
+            <a:r>
+              <a:rPr lang="en-JP" sz="1100" dirty="0"/>
+              <a:t>(</a:t>
+            </a:r>
+            <a:r>
+              <a:rPr lang="en-US" sz="1100" dirty="0"/>
+              <a:t>ryuichi-pi4</a:t>
+            </a:r>
+            <a:r>
+              <a:rPr lang="en-JP" sz="1100" dirty="0"/>
+              <a:t>)</a:t>
+            </a:r>
+          </a:p>
           <a:p>
             <a:pPr algn="ctr"/>
             <a:r>
@@ -5848,8 +5896,8 @@
         </p:nvSpPr>
         <p:spPr>
           <a:xfrm>
-            <a:off x="8316306" y="3497912"/>
-            <a:ext cx="580608" cy="261610"/>
+            <a:off x="7996507" y="3497912"/>
+            <a:ext cx="1220206" cy="430887"/>
           </a:xfrm>
           <a:prstGeom prst="rect">
             <a:avLst/>
@@ -5861,6 +5909,21 @@
             <a:spAutoFit/>
           </a:bodyPr>
           <a:lstStyle/>
+          <a:p>
+            <a:pPr algn="ctr"/>
+            <a:r>
+              <a:rPr lang="en-JP" sz="1100" dirty="0"/>
+              <a:t>(</a:t>
+            </a:r>
+            <a:r>
+              <a:rPr lang="en-US" sz="1100" dirty="0"/>
+              <a:t>mmccool-mac03</a:t>
+            </a:r>
+            <a:r>
+              <a:rPr lang="en-JP" sz="1100" dirty="0"/>
+              <a:t>)</a:t>
+            </a:r>
+          </a:p>
           <a:p>
             <a:pPr algn="ctr"/>
             <a:r>
@@ -5959,8 +6022,8 @@
         </p:nvSpPr>
         <p:spPr>
           <a:xfrm>
-            <a:off x="9751852" y="3508054"/>
-            <a:ext cx="580608" cy="261610"/>
+            <a:off x="9451294" y="3508054"/>
+            <a:ext cx="1181734" cy="430887"/>
           </a:xfrm>
           <a:prstGeom prst="rect">
             <a:avLst/>
@@ -5972,6 +6035,13 @@
             <a:spAutoFit/>
           </a:bodyPr>
           <a:lstStyle/>
+          <a:p>
+            <a:pPr algn="ctr"/>
+            <a:r>
+              <a:rPr lang="en-JP" sz="1100" dirty="0"/>
+              <a:t>fj-vpnbridge.local</a:t>
+            </a:r>
+          </a:p>
           <a:p>
             <a:pPr algn="ctr"/>
             <a:r>
@@ -6337,6 +6407,9 @@
           <a:solidFill>
             <a:schemeClr val="bg1"/>
           </a:solidFill>
+          <a:ln>
+            <a:prstDash val="dash"/>
+          </a:ln>
         </p:spPr>
         <p:style>
           <a:lnRef idx="2">
@@ -6400,8 +6473,8 @@
         </p:nvSpPr>
         <p:spPr>
           <a:xfrm>
-            <a:off x="9751852" y="6059673"/>
-            <a:ext cx="580608" cy="261610"/>
+            <a:off x="9731814" y="6059673"/>
+            <a:ext cx="620684" cy="430887"/>
           </a:xfrm>
           <a:prstGeom prst="rect">
             <a:avLst/>
@@ -6413,6 +6486,13 @@
             <a:spAutoFit/>
           </a:bodyPr>
           <a:lstStyle/>
+          <a:p>
+            <a:pPr algn="ctr"/>
+            <a:r>
+              <a:rPr lang="en-JP" sz="1100" dirty="0"/>
+              <a:t>(raspi2)</a:t>
+            </a:r>
+          </a:p>
           <a:p>
             <a:pPr algn="ctr"/>
             <a:r>
@@ -6511,8 +6591,8 @@
         </p:nvSpPr>
         <p:spPr>
           <a:xfrm>
-            <a:off x="8316306" y="4343381"/>
-            <a:ext cx="580608" cy="261610"/>
+            <a:off x="8130358" y="4343381"/>
+            <a:ext cx="952505" cy="430887"/>
           </a:xfrm>
           <a:prstGeom prst="rect">
             <a:avLst/>
@@ -6528,6 +6608,18 @@
             <a:pPr algn="ctr"/>
             <a:r>
               <a:rPr lang="en-JP" sz="1100" dirty="0"/>
+              <a:t>(</a:t>
+            </a:r>
+            <a:r>
+              <a:rPr lang="en-US" sz="1100" dirty="0"/>
+              <a:t>TL-WR702N)</a:t>
+            </a:r>
+            <a:endParaRPr lang="en-JP" sz="1100" dirty="0"/>
+          </a:p>
+          <a:p>
+            <a:pPr algn="ctr"/>
+            <a:r>
+              <a:rPr lang="en-JP" sz="1100" dirty="0"/>
               <a:t>30.131</a:t>
             </a:r>
           </a:p>
@@ -6547,7 +6639,7 @@
         </p:nvSpPr>
         <p:spPr>
           <a:xfrm flipV="1">
-            <a:off x="7914556" y="6449409"/>
+            <a:off x="7914556" y="6609720"/>
             <a:ext cx="268446" cy="225737"/>
           </a:xfrm>
           <a:prstGeom prst="rect">
@@ -6603,7 +6695,7 @@
         </p:nvSpPr>
         <p:spPr>
           <a:xfrm>
-            <a:off x="8153400" y="6438718"/>
+            <a:off x="8153400" y="6599029"/>
             <a:ext cx="2694969" cy="261610"/>
           </a:xfrm>
           <a:prstGeom prst="rect">
@@ -6716,8 +6808,8 @@
         </p:nvSpPr>
         <p:spPr>
           <a:xfrm>
-            <a:off x="11081547" y="1806974"/>
-            <a:ext cx="580608" cy="261610"/>
+            <a:off x="10786596" y="1806974"/>
+            <a:ext cx="1170513" cy="430887"/>
           </a:xfrm>
           <a:prstGeom prst="rect">
             <a:avLst/>
@@ -6729,6 +6821,17 @@
             <a:spAutoFit/>
           </a:bodyPr>
           <a:lstStyle/>
+          <a:p>
+            <a:pPr algn="ctr"/>
+            <a:r>
+              <a:rPr lang="en-US" sz="1100" dirty="0" err="1"/>
+              <a:t>raspberrypi</a:t>
+            </a:r>
+            <a:r>
+              <a:rPr lang="en-JP" sz="1100" dirty="0"/>
+              <a:t>.local</a:t>
+            </a:r>
+          </a:p>
           <a:p>
             <a:pPr algn="ctr"/>
             <a:r>
@@ -6893,10 +6996,2995 @@
           </a:p>
         </p:txBody>
       </p:sp>
+      <p:sp>
+        <p:nvSpPr>
+          <p:cNvPr id="59" name="Rectangle 58">
+            <a:extLst>
+              <a:ext uri="{FF2B5EF4-FFF2-40B4-BE49-F238E27FC236}">
+                <a16:creationId xmlns:a16="http://schemas.microsoft.com/office/drawing/2014/main" id="{76CCA81A-4150-C744-A44C-92DDDEF1C91C}"/>
+              </a:ext>
+            </a:extLst>
+          </p:cNvPr>
+          <p:cNvSpPr/>
+          <p:nvPr/>
+        </p:nvSpPr>
+        <p:spPr>
+          <a:xfrm>
+            <a:off x="10827943" y="2173313"/>
+            <a:ext cx="1080000" cy="554142"/>
+          </a:xfrm>
+          <a:prstGeom prst="rect">
+            <a:avLst/>
+          </a:prstGeom>
+          <a:solidFill>
+            <a:schemeClr val="bg1"/>
+          </a:solidFill>
+          <a:ln>
+            <a:solidFill>
+              <a:schemeClr val="accent1"/>
+            </a:solidFill>
+            <a:prstDash val="solid"/>
+          </a:ln>
+        </p:spPr>
+        <p:style>
+          <a:lnRef idx="2">
+            <a:schemeClr val="accent1">
+              <a:shade val="50000"/>
+            </a:schemeClr>
+          </a:lnRef>
+          <a:fillRef idx="1">
+            <a:schemeClr val="accent1"/>
+          </a:fillRef>
+          <a:effectRef idx="0">
+            <a:schemeClr val="accent1"/>
+          </a:effectRef>
+          <a:fontRef idx="minor">
+            <a:schemeClr val="lt1"/>
+          </a:fontRef>
+        </p:style>
+        <p:txBody>
+          <a:bodyPr lIns="0" rIns="0" rtlCol="0" anchor="ctr"/>
+          <a:lstStyle/>
+          <a:p>
+            <a:pPr algn="ctr"/>
+            <a:r>
+              <a:rPr lang="en-US" sz="1200" dirty="0">
+                <a:solidFill>
+                  <a:sysClr val="windowText" lastClr="000000"/>
+                </a:solidFill>
+              </a:rPr>
+              <a:t>(?)</a:t>
+            </a:r>
+          </a:p>
+          <a:p>
+            <a:pPr algn="ctr"/>
+            <a:r>
+              <a:rPr lang="en-US" sz="1200" dirty="0">
+                <a:solidFill>
+                  <a:sysClr val="windowText" lastClr="000000"/>
+                </a:solidFill>
+              </a:rPr>
+              <a:t>(?)</a:t>
+            </a:r>
+            <a:endParaRPr lang="en-JP" sz="1200" dirty="0">
+              <a:solidFill>
+                <a:sysClr val="windowText" lastClr="000000"/>
+              </a:solidFill>
+            </a:endParaRPr>
+          </a:p>
+        </p:txBody>
+      </p:sp>
+      <p:sp>
+        <p:nvSpPr>
+          <p:cNvPr id="60" name="TextBox 59">
+            <a:extLst>
+              <a:ext uri="{FF2B5EF4-FFF2-40B4-BE49-F238E27FC236}">
+                <a16:creationId xmlns:a16="http://schemas.microsoft.com/office/drawing/2014/main" id="{CCF4E001-584A-CD4B-B7B1-E449886E4043}"/>
+              </a:ext>
+            </a:extLst>
+          </p:cNvPr>
+          <p:cNvSpPr txBox="1"/>
+          <p:nvPr/>
+        </p:nvSpPr>
+        <p:spPr>
+          <a:xfrm>
+            <a:off x="10673682" y="2672228"/>
+            <a:ext cx="1388522" cy="430887"/>
+          </a:xfrm>
+          <a:prstGeom prst="rect">
+            <a:avLst/>
+          </a:prstGeom>
+          <a:noFill/>
+        </p:spPr>
+        <p:txBody>
+          <a:bodyPr wrap="none" rtlCol="0">
+            <a:spAutoFit/>
+          </a:bodyPr>
+          <a:lstStyle/>
+          <a:p>
+            <a:pPr algn="ctr"/>
+            <a:r>
+              <a:rPr lang="en-JP" sz="1100" dirty="0"/>
+              <a:t>(</a:t>
+            </a:r>
+            <a:r>
+              <a:rPr lang="en-US" sz="1100" dirty="0"/>
+              <a:t>GL-MT300N-V2-b7f)</a:t>
+            </a:r>
+          </a:p>
+          <a:p>
+            <a:pPr algn="ctr"/>
+            <a:r>
+              <a:rPr lang="en-JP" sz="1100" dirty="0"/>
+              <a:t>30.141</a:t>
+            </a:r>
+          </a:p>
+        </p:txBody>
+      </p:sp>
+      <p:sp>
+        <p:nvSpPr>
+          <p:cNvPr id="61" name="Rectangle 60">
+            <a:extLst>
+              <a:ext uri="{FF2B5EF4-FFF2-40B4-BE49-F238E27FC236}">
+                <a16:creationId xmlns:a16="http://schemas.microsoft.com/office/drawing/2014/main" id="{45466266-6FDB-2744-871E-E0FA1EA3CA3A}"/>
+              </a:ext>
+            </a:extLst>
+          </p:cNvPr>
+          <p:cNvSpPr/>
+          <p:nvPr/>
+        </p:nvSpPr>
+        <p:spPr>
+          <a:xfrm>
+            <a:off x="10827943" y="3011446"/>
+            <a:ext cx="1080000" cy="554142"/>
+          </a:xfrm>
+          <a:prstGeom prst="rect">
+            <a:avLst/>
+          </a:prstGeom>
+          <a:solidFill>
+            <a:schemeClr val="bg1"/>
+          </a:solidFill>
+          <a:ln>
+            <a:solidFill>
+              <a:schemeClr val="accent1"/>
+            </a:solidFill>
+            <a:prstDash val="dash"/>
+          </a:ln>
+        </p:spPr>
+        <p:style>
+          <a:lnRef idx="2">
+            <a:schemeClr val="accent1">
+              <a:shade val="50000"/>
+            </a:schemeClr>
+          </a:lnRef>
+          <a:fillRef idx="1">
+            <a:schemeClr val="accent1"/>
+          </a:fillRef>
+          <a:effectRef idx="0">
+            <a:schemeClr val="accent1"/>
+          </a:effectRef>
+          <a:fontRef idx="minor">
+            <a:schemeClr val="lt1"/>
+          </a:fontRef>
+        </p:style>
+        <p:txBody>
+          <a:bodyPr lIns="0" rIns="0" rtlCol="0" anchor="ctr"/>
+          <a:lstStyle/>
+          <a:p>
+            <a:pPr algn="ctr"/>
+            <a:r>
+              <a:rPr lang="en-US" sz="1200" dirty="0">
+                <a:solidFill>
+                  <a:sysClr val="windowText" lastClr="000000"/>
+                </a:solidFill>
+              </a:rPr>
+              <a:t>(?)</a:t>
+            </a:r>
+          </a:p>
+          <a:p>
+            <a:pPr algn="ctr"/>
+            <a:r>
+              <a:rPr lang="en-US" sz="1200" dirty="0">
+                <a:solidFill>
+                  <a:sysClr val="windowText" lastClr="000000"/>
+                </a:solidFill>
+              </a:rPr>
+              <a:t>(?)</a:t>
+            </a:r>
+            <a:endParaRPr lang="en-JP" sz="1200" dirty="0">
+              <a:solidFill>
+                <a:sysClr val="windowText" lastClr="000000"/>
+              </a:solidFill>
+            </a:endParaRPr>
+          </a:p>
+        </p:txBody>
+      </p:sp>
+      <p:sp>
+        <p:nvSpPr>
+          <p:cNvPr id="62" name="TextBox 61">
+            <a:extLst>
+              <a:ext uri="{FF2B5EF4-FFF2-40B4-BE49-F238E27FC236}">
+                <a16:creationId xmlns:a16="http://schemas.microsoft.com/office/drawing/2014/main" id="{22239E42-C020-3445-A946-90D2AEB9B7C5}"/>
+              </a:ext>
+            </a:extLst>
+          </p:cNvPr>
+          <p:cNvSpPr txBox="1"/>
+          <p:nvPr/>
+        </p:nvSpPr>
+        <p:spPr>
+          <a:xfrm>
+            <a:off x="10980657" y="3510361"/>
+            <a:ext cx="774572" cy="430887"/>
+          </a:xfrm>
+          <a:prstGeom prst="rect">
+            <a:avLst/>
+          </a:prstGeom>
+          <a:noFill/>
+        </p:spPr>
+        <p:txBody>
+          <a:bodyPr wrap="none" rtlCol="0">
+            <a:spAutoFit/>
+          </a:bodyPr>
+          <a:lstStyle/>
+          <a:p>
+            <a:pPr algn="ctr"/>
+            <a:r>
+              <a:rPr lang="en-JP" sz="1100" dirty="0"/>
+              <a:t>(espressif)</a:t>
+            </a:r>
+          </a:p>
+          <a:p>
+            <a:pPr algn="ctr"/>
+            <a:r>
+              <a:rPr lang="en-JP" sz="1100" dirty="0"/>
+              <a:t>30.142</a:t>
+            </a:r>
+          </a:p>
+        </p:txBody>
+      </p:sp>
+      <p:sp>
+        <p:nvSpPr>
+          <p:cNvPr id="64" name="Rectangle 63">
+            <a:extLst>
+              <a:ext uri="{FF2B5EF4-FFF2-40B4-BE49-F238E27FC236}">
+                <a16:creationId xmlns:a16="http://schemas.microsoft.com/office/drawing/2014/main" id="{F02F6428-8CAF-E748-80C7-99D72C3ECACC}"/>
+              </a:ext>
+            </a:extLst>
+          </p:cNvPr>
+          <p:cNvSpPr/>
+          <p:nvPr/>
+        </p:nvSpPr>
+        <p:spPr>
+          <a:xfrm>
+            <a:off x="6378726" y="1299351"/>
+            <a:ext cx="1080000" cy="554142"/>
+          </a:xfrm>
+          <a:prstGeom prst="rect">
+            <a:avLst/>
+          </a:prstGeom>
+          <a:solidFill>
+            <a:schemeClr val="bg1"/>
+          </a:solidFill>
+          <a:ln>
+            <a:solidFill>
+              <a:schemeClr val="accent1"/>
+            </a:solidFill>
+            <a:prstDash val="solid"/>
+          </a:ln>
+        </p:spPr>
+        <p:style>
+          <a:lnRef idx="2">
+            <a:schemeClr val="accent1">
+              <a:shade val="50000"/>
+            </a:schemeClr>
+          </a:lnRef>
+          <a:fillRef idx="1">
+            <a:schemeClr val="accent1"/>
+          </a:fillRef>
+          <a:effectRef idx="0">
+            <a:schemeClr val="accent1"/>
+          </a:effectRef>
+          <a:fontRef idx="minor">
+            <a:schemeClr val="lt1"/>
+          </a:fontRef>
+        </p:style>
+        <p:txBody>
+          <a:bodyPr lIns="0" rIns="0" rtlCol="0" anchor="ctr"/>
+          <a:lstStyle/>
+          <a:p>
+            <a:pPr algn="ctr"/>
+            <a:r>
+              <a:rPr lang="en-US" sz="1200" dirty="0">
+                <a:solidFill>
+                  <a:sysClr val="windowText" lastClr="000000"/>
+                </a:solidFill>
+              </a:rPr>
+              <a:t>(Local Proxy?)</a:t>
+            </a:r>
+          </a:p>
+          <a:p>
+            <a:pPr algn="ctr"/>
+            <a:r>
+              <a:rPr lang="en-US" sz="1200" dirty="0">
+                <a:solidFill>
+                  <a:sysClr val="windowText" lastClr="000000"/>
+                </a:solidFill>
+              </a:rPr>
+              <a:t>(Fujitsu)</a:t>
+            </a:r>
+            <a:endParaRPr lang="en-JP" sz="1200" dirty="0">
+              <a:solidFill>
+                <a:sysClr val="windowText" lastClr="000000"/>
+              </a:solidFill>
+            </a:endParaRPr>
+          </a:p>
+        </p:txBody>
+      </p:sp>
+      <p:sp>
+        <p:nvSpPr>
+          <p:cNvPr id="65" name="TextBox 64">
+            <a:extLst>
+              <a:ext uri="{FF2B5EF4-FFF2-40B4-BE49-F238E27FC236}">
+                <a16:creationId xmlns:a16="http://schemas.microsoft.com/office/drawing/2014/main" id="{62B0D57B-2049-6D4A-8C5A-8E2FF4C11EC8}"/>
+              </a:ext>
+            </a:extLst>
+          </p:cNvPr>
+          <p:cNvSpPr txBox="1"/>
+          <p:nvPr/>
+        </p:nvSpPr>
+        <p:spPr>
+          <a:xfrm>
+            <a:off x="6404806" y="1798266"/>
+            <a:ext cx="1027845" cy="430887"/>
+          </a:xfrm>
+          <a:prstGeom prst="rect">
+            <a:avLst/>
+          </a:prstGeom>
+          <a:noFill/>
+        </p:spPr>
+        <p:txBody>
+          <a:bodyPr wrap="none" rtlCol="0">
+            <a:spAutoFit/>
+          </a:bodyPr>
+          <a:lstStyle/>
+          <a:p>
+            <a:pPr algn="ctr"/>
+            <a:r>
+              <a:rPr lang="en-US" sz="1100" dirty="0"/>
+              <a:t>fj-</a:t>
+            </a:r>
+            <a:r>
+              <a:rPr lang="en-US" sz="1100" dirty="0" err="1"/>
+              <a:t>wotgw.local</a:t>
+            </a:r>
+            <a:endParaRPr lang="en-JP" sz="1100" dirty="0"/>
+          </a:p>
+          <a:p>
+            <a:pPr algn="ctr"/>
+            <a:r>
+              <a:rPr lang="en-JP" sz="1100" dirty="0"/>
+              <a:t>30.10</a:t>
+            </a:r>
+          </a:p>
+        </p:txBody>
+      </p:sp>
     </p:spTree>
     <p:extLst>
       <p:ext uri="{BB962C8B-B14F-4D97-AF65-F5344CB8AC3E}">
         <p14:creationId xmlns:p14="http://schemas.microsoft.com/office/powerpoint/2010/main" val="2239956326"/>
+      </p:ext>
+    </p:extLst>
+  </p:cSld>
+  <p:clrMapOvr>
+    <a:masterClrMapping/>
+  </p:clrMapOvr>
+</p:sld>
+</file>
+
+<file path=ppt/slides/slide2.xml><?xml version="1.0" encoding="utf-8"?>
+<p:sld xmlns:a="http://schemas.openxmlformats.org/drawingml/2006/main" xmlns:r="http://schemas.openxmlformats.org/officeDocument/2006/relationships" xmlns:p="http://schemas.openxmlformats.org/presentationml/2006/main">
+  <p:cSld>
+    <p:spTree>
+      <p:nvGrpSpPr>
+        <p:cNvPr id="1" name=""/>
+        <p:cNvGrpSpPr/>
+        <p:nvPr/>
+      </p:nvGrpSpPr>
+      <p:grpSpPr>
+        <a:xfrm>
+          <a:off x="0" y="0"/>
+          <a:ext cx="0" cy="0"/>
+          <a:chOff x="0" y="0"/>
+          <a:chExt cx="0" cy="0"/>
+        </a:xfrm>
+      </p:grpSpPr>
+      <p:sp>
+        <p:nvSpPr>
+          <p:cNvPr id="2" name="Title 1">
+            <a:extLst>
+              <a:ext uri="{FF2B5EF4-FFF2-40B4-BE49-F238E27FC236}">
+                <a16:creationId xmlns:a16="http://schemas.microsoft.com/office/drawing/2014/main" id="{85BC194C-11B4-DF4D-BD5B-07A74B9C6240}"/>
+              </a:ext>
+            </a:extLst>
+          </p:cNvPr>
+          <p:cNvSpPr>
+            <a:spLocks noGrp="1"/>
+          </p:cNvSpPr>
+          <p:nvPr>
+            <p:ph type="title"/>
+          </p:nvPr>
+        </p:nvSpPr>
+        <p:spPr>
+          <a:xfrm>
+            <a:off x="838200" y="365125"/>
+            <a:ext cx="10515600" cy="611219"/>
+          </a:xfrm>
+        </p:spPr>
+        <p:txBody>
+          <a:bodyPr>
+            <a:normAutofit fontScale="90000"/>
+          </a:bodyPr>
+          <a:lstStyle/>
+          <a:p>
+            <a:r>
+              <a:rPr lang="en-US" dirty="0"/>
+              <a:t>Plugfest network (as of 2020-06-16 1200UTC)</a:t>
+            </a:r>
+          </a:p>
+        </p:txBody>
+      </p:sp>
+      <p:sp>
+        <p:nvSpPr>
+          <p:cNvPr id="5" name="Date Placeholder 4">
+            <a:extLst>
+              <a:ext uri="{FF2B5EF4-FFF2-40B4-BE49-F238E27FC236}">
+                <a16:creationId xmlns:a16="http://schemas.microsoft.com/office/drawing/2014/main" id="{5763E547-66FF-8D41-A445-B9D23F2D3AC3}"/>
+              </a:ext>
+            </a:extLst>
+          </p:cNvPr>
+          <p:cNvSpPr>
+            <a:spLocks noGrp="1"/>
+          </p:cNvSpPr>
+          <p:nvPr>
+            <p:ph type="dt" sz="half" idx="10"/>
+          </p:nvPr>
+        </p:nvSpPr>
+        <p:spPr/>
+        <p:txBody>
+          <a:bodyPr/>
+          <a:lstStyle/>
+          <a:p>
+            <a:fld id="{BF92DA42-2970-1B4D-9C1F-77F249CD7467}" type="datetime1">
+              <a:rPr lang="en-CA" smtClean="0"/>
+              <a:t>2020-06-17</a:t>
+            </a:fld>
+            <a:endParaRPr lang="en-US"/>
+          </a:p>
+        </p:txBody>
+      </p:sp>
+      <p:sp>
+        <p:nvSpPr>
+          <p:cNvPr id="6" name="Footer Placeholder 5">
+            <a:extLst>
+              <a:ext uri="{FF2B5EF4-FFF2-40B4-BE49-F238E27FC236}">
+                <a16:creationId xmlns:a16="http://schemas.microsoft.com/office/drawing/2014/main" id="{C403CDDC-3456-C849-BC93-92466B8AD9BE}"/>
+              </a:ext>
+            </a:extLst>
+          </p:cNvPr>
+          <p:cNvSpPr>
+            <a:spLocks noGrp="1"/>
+          </p:cNvSpPr>
+          <p:nvPr>
+            <p:ph type="ftr" sz="quarter" idx="11"/>
+          </p:nvPr>
+        </p:nvSpPr>
+        <p:spPr/>
+        <p:txBody>
+          <a:bodyPr/>
+          <a:lstStyle/>
+          <a:p>
+            <a:r>
+              <a:rPr lang="en-US"/>
+              <a:t>W3C Web of Things (WoT) WG/IG</a:t>
+            </a:r>
+          </a:p>
+        </p:txBody>
+      </p:sp>
+      <p:sp>
+        <p:nvSpPr>
+          <p:cNvPr id="7" name="Slide Number Placeholder 6">
+            <a:extLst>
+              <a:ext uri="{FF2B5EF4-FFF2-40B4-BE49-F238E27FC236}">
+                <a16:creationId xmlns:a16="http://schemas.microsoft.com/office/drawing/2014/main" id="{B2AB2D99-10F9-7144-B8A4-C7301A569FCB}"/>
+              </a:ext>
+            </a:extLst>
+          </p:cNvPr>
+          <p:cNvSpPr>
+            <a:spLocks noGrp="1"/>
+          </p:cNvSpPr>
+          <p:nvPr>
+            <p:ph type="sldNum" sz="quarter" idx="12"/>
+          </p:nvPr>
+        </p:nvSpPr>
+        <p:spPr>
+          <a:xfrm>
+            <a:off x="8749889" y="6912851"/>
+            <a:ext cx="2743200" cy="365125"/>
+          </a:xfrm>
+        </p:spPr>
+        <p:txBody>
+          <a:bodyPr/>
+          <a:lstStyle/>
+          <a:p>
+            <a:fld id="{055BDE2E-7167-1944-9FEE-E44668D91CB6}" type="slidenum">
+              <a:rPr lang="en-US" smtClean="0"/>
+              <a:t>2</a:t>
+            </a:fld>
+            <a:endParaRPr lang="en-US" dirty="0"/>
+          </a:p>
+        </p:txBody>
+      </p:sp>
+      <p:sp>
+        <p:nvSpPr>
+          <p:cNvPr id="9" name="Rounded Rectangle 8">
+            <a:extLst>
+              <a:ext uri="{FF2B5EF4-FFF2-40B4-BE49-F238E27FC236}">
+                <a16:creationId xmlns:a16="http://schemas.microsoft.com/office/drawing/2014/main" id="{A3F51D4E-022A-4C4F-A2AF-97C99BE38226}"/>
+              </a:ext>
+            </a:extLst>
+          </p:cNvPr>
+          <p:cNvSpPr/>
+          <p:nvPr/>
+        </p:nvSpPr>
+        <p:spPr>
+          <a:xfrm>
+            <a:off x="6095999" y="1107040"/>
+            <a:ext cx="5899935" cy="5249310"/>
+          </a:xfrm>
+          <a:prstGeom prst="roundRect">
+            <a:avLst>
+              <a:gd name="adj" fmla="val 3289"/>
+            </a:avLst>
+          </a:prstGeom>
+          <a:noFill/>
+        </p:spPr>
+        <p:style>
+          <a:lnRef idx="2">
+            <a:schemeClr val="accent1">
+              <a:shade val="50000"/>
+            </a:schemeClr>
+          </a:lnRef>
+          <a:fillRef idx="1">
+            <a:schemeClr val="accent1"/>
+          </a:fillRef>
+          <a:effectRef idx="0">
+            <a:schemeClr val="accent1"/>
+          </a:effectRef>
+          <a:fontRef idx="minor">
+            <a:schemeClr val="lt1"/>
+          </a:fontRef>
+        </p:style>
+        <p:txBody>
+          <a:bodyPr rtlCol="0" anchor="ctr"/>
+          <a:lstStyle/>
+          <a:p>
+            <a:pPr algn="ctr"/>
+            <a:endParaRPr lang="en-JP"/>
+          </a:p>
+        </p:txBody>
+      </p:sp>
+      <p:sp>
+        <p:nvSpPr>
+          <p:cNvPr id="10" name="Rectangle 9">
+            <a:extLst>
+              <a:ext uri="{FF2B5EF4-FFF2-40B4-BE49-F238E27FC236}">
+                <a16:creationId xmlns:a16="http://schemas.microsoft.com/office/drawing/2014/main" id="{D272043F-2AC2-444B-B81D-0B011FC88867}"/>
+              </a:ext>
+            </a:extLst>
+          </p:cNvPr>
+          <p:cNvSpPr/>
+          <p:nvPr/>
+        </p:nvSpPr>
+        <p:spPr>
+          <a:xfrm>
+            <a:off x="5638800" y="2971800"/>
+            <a:ext cx="914400" cy="914400"/>
+          </a:xfrm>
+          <a:prstGeom prst="rect">
+            <a:avLst/>
+          </a:prstGeom>
+          <a:solidFill>
+            <a:schemeClr val="bg1"/>
+          </a:solidFill>
+        </p:spPr>
+        <p:style>
+          <a:lnRef idx="2">
+            <a:schemeClr val="accent1">
+              <a:shade val="50000"/>
+            </a:schemeClr>
+          </a:lnRef>
+          <a:fillRef idx="1">
+            <a:schemeClr val="accent1"/>
+          </a:fillRef>
+          <a:effectRef idx="0">
+            <a:schemeClr val="accent1"/>
+          </a:effectRef>
+          <a:fontRef idx="minor">
+            <a:schemeClr val="lt1"/>
+          </a:fontRef>
+        </p:style>
+        <p:txBody>
+          <a:bodyPr rtlCol="0" anchor="ctr"/>
+          <a:lstStyle/>
+          <a:p>
+            <a:pPr algn="ctr"/>
+            <a:r>
+              <a:rPr lang="en-JP" dirty="0">
+                <a:solidFill>
+                  <a:sysClr val="windowText" lastClr="000000"/>
+                </a:solidFill>
+              </a:rPr>
+              <a:t>NAT</a:t>
+            </a:r>
+          </a:p>
+        </p:txBody>
+      </p:sp>
+      <p:sp>
+        <p:nvSpPr>
+          <p:cNvPr id="11" name="TextBox 10">
+            <a:extLst>
+              <a:ext uri="{FF2B5EF4-FFF2-40B4-BE49-F238E27FC236}">
+                <a16:creationId xmlns:a16="http://schemas.microsoft.com/office/drawing/2014/main" id="{3988D6D3-1E9A-664D-8695-137E08350F39}"/>
+              </a:ext>
+            </a:extLst>
+          </p:cNvPr>
+          <p:cNvSpPr txBox="1"/>
+          <p:nvPr/>
+        </p:nvSpPr>
+        <p:spPr>
+          <a:xfrm>
+            <a:off x="6159374" y="928997"/>
+            <a:ext cx="2363147" cy="369332"/>
+          </a:xfrm>
+          <a:prstGeom prst="rect">
+            <a:avLst/>
+          </a:prstGeom>
+          <a:solidFill>
+            <a:schemeClr val="bg1"/>
+          </a:solidFill>
+        </p:spPr>
+        <p:txBody>
+          <a:bodyPr wrap="none" rtlCol="0">
+            <a:spAutoFit/>
+          </a:bodyPr>
+          <a:lstStyle/>
+          <a:p>
+            <a:r>
+              <a:rPr lang="en-JP" b="1" dirty="0"/>
+              <a:t>VPN (192.168.30.0/24)</a:t>
+            </a:r>
+          </a:p>
+        </p:txBody>
+      </p:sp>
+      <p:sp>
+        <p:nvSpPr>
+          <p:cNvPr id="12" name="TextBox 11">
+            <a:extLst>
+              <a:ext uri="{FF2B5EF4-FFF2-40B4-BE49-F238E27FC236}">
+                <a16:creationId xmlns:a16="http://schemas.microsoft.com/office/drawing/2014/main" id="{EFF495A7-AE17-2D42-A657-1CCE7FEAE770}"/>
+              </a:ext>
+            </a:extLst>
+          </p:cNvPr>
+          <p:cNvSpPr txBox="1"/>
+          <p:nvPr/>
+        </p:nvSpPr>
+        <p:spPr>
+          <a:xfrm>
+            <a:off x="347609" y="1107040"/>
+            <a:ext cx="958789" cy="369332"/>
+          </a:xfrm>
+          <a:prstGeom prst="rect">
+            <a:avLst/>
+          </a:prstGeom>
+          <a:noFill/>
+        </p:spPr>
+        <p:txBody>
+          <a:bodyPr wrap="none" rtlCol="0">
+            <a:spAutoFit/>
+          </a:bodyPr>
+          <a:lstStyle/>
+          <a:p>
+            <a:r>
+              <a:rPr lang="en-JP" b="1" dirty="0"/>
+              <a:t>Internet</a:t>
+            </a:r>
+          </a:p>
+        </p:txBody>
+      </p:sp>
+      <p:sp>
+        <p:nvSpPr>
+          <p:cNvPr id="13" name="TextBox 12">
+            <a:extLst>
+              <a:ext uri="{FF2B5EF4-FFF2-40B4-BE49-F238E27FC236}">
+                <a16:creationId xmlns:a16="http://schemas.microsoft.com/office/drawing/2014/main" id="{2FD638C0-40F4-DA4C-817D-BBD7D2D6AEA8}"/>
+              </a:ext>
+            </a:extLst>
+          </p:cNvPr>
+          <p:cNvSpPr txBox="1"/>
+          <p:nvPr/>
+        </p:nvSpPr>
+        <p:spPr>
+          <a:xfrm>
+            <a:off x="6073738" y="3791506"/>
+            <a:ext cx="593432" cy="369332"/>
+          </a:xfrm>
+          <a:prstGeom prst="rect">
+            <a:avLst/>
+          </a:prstGeom>
+          <a:noFill/>
+        </p:spPr>
+        <p:txBody>
+          <a:bodyPr wrap="none" rtlCol="0">
+            <a:spAutoFit/>
+          </a:bodyPr>
+          <a:lstStyle/>
+          <a:p>
+            <a:r>
+              <a:rPr lang="en-JP" dirty="0"/>
+              <a:t>30.1</a:t>
+            </a:r>
+          </a:p>
+        </p:txBody>
+      </p:sp>
+      <p:sp>
+        <p:nvSpPr>
+          <p:cNvPr id="14" name="Rectangle 13">
+            <a:extLst>
+              <a:ext uri="{FF2B5EF4-FFF2-40B4-BE49-F238E27FC236}">
+                <a16:creationId xmlns:a16="http://schemas.microsoft.com/office/drawing/2014/main" id="{297267FF-956E-4543-B1A7-229017725022}"/>
+              </a:ext>
+            </a:extLst>
+          </p:cNvPr>
+          <p:cNvSpPr/>
+          <p:nvPr/>
+        </p:nvSpPr>
+        <p:spPr>
+          <a:xfrm>
+            <a:off x="9502156" y="2158599"/>
+            <a:ext cx="1080000" cy="554142"/>
+          </a:xfrm>
+          <a:prstGeom prst="rect">
+            <a:avLst/>
+          </a:prstGeom>
+          <a:solidFill>
+            <a:schemeClr val="bg1"/>
+          </a:solidFill>
+        </p:spPr>
+        <p:style>
+          <a:lnRef idx="2">
+            <a:schemeClr val="accent1">
+              <a:shade val="50000"/>
+            </a:schemeClr>
+          </a:lnRef>
+          <a:fillRef idx="1">
+            <a:schemeClr val="accent1"/>
+          </a:fillRef>
+          <a:effectRef idx="0">
+            <a:schemeClr val="accent1"/>
+          </a:effectRef>
+          <a:fontRef idx="minor">
+            <a:schemeClr val="lt1"/>
+          </a:fontRef>
+        </p:style>
+        <p:txBody>
+          <a:bodyPr lIns="0" rIns="0" rtlCol="0" anchor="ctr"/>
+          <a:lstStyle/>
+          <a:p>
+            <a:pPr algn="ctr"/>
+            <a:r>
+              <a:rPr lang="en-US" sz="1200" dirty="0">
+                <a:solidFill>
+                  <a:sysClr val="windowText" lastClr="000000"/>
+                </a:solidFill>
+              </a:rPr>
+              <a:t>Simple LED</a:t>
+            </a:r>
+          </a:p>
+          <a:p>
+            <a:pPr algn="ctr"/>
+            <a:r>
+              <a:rPr lang="en-US" sz="1200" dirty="0">
+                <a:solidFill>
+                  <a:sysClr val="windowText" lastClr="000000"/>
+                </a:solidFill>
+              </a:rPr>
+              <a:t>(Hitachi)</a:t>
+            </a:r>
+            <a:endParaRPr lang="en-JP" sz="1200" dirty="0">
+              <a:solidFill>
+                <a:sysClr val="windowText" lastClr="000000"/>
+              </a:solidFill>
+            </a:endParaRPr>
+          </a:p>
+        </p:txBody>
+      </p:sp>
+      <p:sp>
+        <p:nvSpPr>
+          <p:cNvPr id="15" name="TextBox 14">
+            <a:extLst>
+              <a:ext uri="{FF2B5EF4-FFF2-40B4-BE49-F238E27FC236}">
+                <a16:creationId xmlns:a16="http://schemas.microsoft.com/office/drawing/2014/main" id="{372B0EBC-7332-AD4C-9760-A395467C0058}"/>
+              </a:ext>
+            </a:extLst>
+          </p:cNvPr>
+          <p:cNvSpPr txBox="1"/>
+          <p:nvPr/>
+        </p:nvSpPr>
+        <p:spPr>
+          <a:xfrm>
+            <a:off x="9751852" y="2657514"/>
+            <a:ext cx="580608" cy="261610"/>
+          </a:xfrm>
+          <a:prstGeom prst="rect">
+            <a:avLst/>
+          </a:prstGeom>
+          <a:noFill/>
+        </p:spPr>
+        <p:txBody>
+          <a:bodyPr wrap="none" rtlCol="0">
+            <a:spAutoFit/>
+          </a:bodyPr>
+          <a:lstStyle/>
+          <a:p>
+            <a:pPr algn="ctr"/>
+            <a:r>
+              <a:rPr lang="en-JP" sz="1100" dirty="0"/>
+              <a:t>30.135</a:t>
+            </a:r>
+          </a:p>
+        </p:txBody>
+      </p:sp>
+      <p:sp>
+        <p:nvSpPr>
+          <p:cNvPr id="16" name="Rectangle 15">
+            <a:extLst>
+              <a:ext uri="{FF2B5EF4-FFF2-40B4-BE49-F238E27FC236}">
+                <a16:creationId xmlns:a16="http://schemas.microsoft.com/office/drawing/2014/main" id="{1D891C5A-4135-8347-B73F-7659B46258F5}"/>
+              </a:ext>
+            </a:extLst>
+          </p:cNvPr>
+          <p:cNvSpPr/>
+          <p:nvPr/>
+        </p:nvSpPr>
+        <p:spPr>
+          <a:xfrm>
+            <a:off x="8066610" y="2153528"/>
+            <a:ext cx="1080000" cy="554142"/>
+          </a:xfrm>
+          <a:prstGeom prst="rect">
+            <a:avLst/>
+          </a:prstGeom>
+          <a:solidFill>
+            <a:schemeClr val="bg1"/>
+          </a:solidFill>
+        </p:spPr>
+        <p:style>
+          <a:lnRef idx="2">
+            <a:schemeClr val="accent1">
+              <a:shade val="50000"/>
+            </a:schemeClr>
+          </a:lnRef>
+          <a:fillRef idx="1">
+            <a:schemeClr val="accent1"/>
+          </a:fillRef>
+          <a:effectRef idx="0">
+            <a:schemeClr val="accent1"/>
+          </a:effectRef>
+          <a:fontRef idx="minor">
+            <a:schemeClr val="lt1"/>
+          </a:fontRef>
+        </p:style>
+        <p:txBody>
+          <a:bodyPr lIns="0" rIns="0" rtlCol="0" anchor="ctr"/>
+          <a:lstStyle/>
+          <a:p>
+            <a:pPr algn="ctr"/>
+            <a:r>
+              <a:rPr lang="en-US" sz="1200" dirty="0">
+                <a:solidFill>
+                  <a:sysClr val="windowText" lastClr="000000"/>
+                </a:solidFill>
+              </a:rPr>
+              <a:t>bridge</a:t>
+            </a:r>
+          </a:p>
+          <a:p>
+            <a:pPr algn="ctr"/>
+            <a:r>
+              <a:rPr lang="en-US" sz="1200" dirty="0">
+                <a:solidFill>
+                  <a:sysClr val="windowText" lastClr="000000"/>
+                </a:solidFill>
+              </a:rPr>
+              <a:t>(Intel)</a:t>
+            </a:r>
+            <a:endParaRPr lang="en-JP" sz="1200" dirty="0">
+              <a:solidFill>
+                <a:sysClr val="windowText" lastClr="000000"/>
+              </a:solidFill>
+            </a:endParaRPr>
+          </a:p>
+        </p:txBody>
+      </p:sp>
+      <p:sp>
+        <p:nvSpPr>
+          <p:cNvPr id="17" name="TextBox 16">
+            <a:extLst>
+              <a:ext uri="{FF2B5EF4-FFF2-40B4-BE49-F238E27FC236}">
+                <a16:creationId xmlns:a16="http://schemas.microsoft.com/office/drawing/2014/main" id="{9C1490FD-353D-DD43-BB0D-ACF7A805D458}"/>
+              </a:ext>
+            </a:extLst>
+          </p:cNvPr>
+          <p:cNvSpPr txBox="1"/>
+          <p:nvPr/>
+        </p:nvSpPr>
+        <p:spPr>
+          <a:xfrm>
+            <a:off x="8316306" y="2652443"/>
+            <a:ext cx="580608" cy="261610"/>
+          </a:xfrm>
+          <a:prstGeom prst="rect">
+            <a:avLst/>
+          </a:prstGeom>
+          <a:noFill/>
+        </p:spPr>
+        <p:txBody>
+          <a:bodyPr wrap="none" rtlCol="0">
+            <a:spAutoFit/>
+          </a:bodyPr>
+          <a:lstStyle/>
+          <a:p>
+            <a:pPr algn="ctr"/>
+            <a:r>
+              <a:rPr lang="en-JP" sz="1100" dirty="0"/>
+              <a:t>30.129</a:t>
+            </a:r>
+          </a:p>
+        </p:txBody>
+      </p:sp>
+      <p:sp>
+        <p:nvSpPr>
+          <p:cNvPr id="23" name="Rectangle 22">
+            <a:extLst>
+              <a:ext uri="{FF2B5EF4-FFF2-40B4-BE49-F238E27FC236}">
+                <a16:creationId xmlns:a16="http://schemas.microsoft.com/office/drawing/2014/main" id="{0685DCF1-F22C-164D-A8A0-B343E281BE69}"/>
+              </a:ext>
+            </a:extLst>
+          </p:cNvPr>
+          <p:cNvSpPr/>
+          <p:nvPr/>
+        </p:nvSpPr>
+        <p:spPr>
+          <a:xfrm>
+            <a:off x="713093" y="1476372"/>
+            <a:ext cx="1080000" cy="554142"/>
+          </a:xfrm>
+          <a:prstGeom prst="rect">
+            <a:avLst/>
+          </a:prstGeom>
+          <a:solidFill>
+            <a:schemeClr val="bg1"/>
+          </a:solidFill>
+        </p:spPr>
+        <p:style>
+          <a:lnRef idx="2">
+            <a:schemeClr val="accent1">
+              <a:shade val="50000"/>
+            </a:schemeClr>
+          </a:lnRef>
+          <a:fillRef idx="1">
+            <a:schemeClr val="accent1"/>
+          </a:fillRef>
+          <a:effectRef idx="0">
+            <a:schemeClr val="accent1"/>
+          </a:effectRef>
+          <a:fontRef idx="minor">
+            <a:schemeClr val="lt1"/>
+          </a:fontRef>
+        </p:style>
+        <p:txBody>
+          <a:bodyPr lIns="0" rIns="0" rtlCol="0" anchor="ctr"/>
+          <a:lstStyle/>
+          <a:p>
+            <a:pPr algn="ctr"/>
+            <a:r>
+              <a:rPr lang="en-US" sz="1200" dirty="0">
+                <a:solidFill>
+                  <a:sysClr val="windowText" lastClr="000000"/>
+                </a:solidFill>
+              </a:rPr>
+              <a:t>Digital Twin</a:t>
+            </a:r>
+          </a:p>
+          <a:p>
+            <a:pPr algn="ctr"/>
+            <a:r>
+              <a:rPr lang="en-US" sz="1200" dirty="0">
+                <a:solidFill>
+                  <a:sysClr val="windowText" lastClr="000000"/>
+                </a:solidFill>
+              </a:rPr>
+              <a:t>Simulator</a:t>
+            </a:r>
+          </a:p>
+          <a:p>
+            <a:pPr algn="ctr"/>
+            <a:r>
+              <a:rPr lang="en-US" sz="1200" dirty="0">
+                <a:solidFill>
+                  <a:sysClr val="windowText" lastClr="000000"/>
+                </a:solidFill>
+              </a:rPr>
+              <a:t>(Oracle)</a:t>
+            </a:r>
+            <a:endParaRPr lang="en-JP" sz="1200" dirty="0">
+              <a:solidFill>
+                <a:sysClr val="windowText" lastClr="000000"/>
+              </a:solidFill>
+            </a:endParaRPr>
+          </a:p>
+        </p:txBody>
+      </p:sp>
+      <p:sp>
+        <p:nvSpPr>
+          <p:cNvPr id="25" name="Rectangle 24">
+            <a:extLst>
+              <a:ext uri="{FF2B5EF4-FFF2-40B4-BE49-F238E27FC236}">
+                <a16:creationId xmlns:a16="http://schemas.microsoft.com/office/drawing/2014/main" id="{41F39B12-C514-3846-99D6-F32E342EA089}"/>
+              </a:ext>
+            </a:extLst>
+          </p:cNvPr>
+          <p:cNvSpPr/>
+          <p:nvPr/>
+        </p:nvSpPr>
+        <p:spPr>
+          <a:xfrm>
+            <a:off x="29040" y="2014562"/>
+            <a:ext cx="2448106" cy="246221"/>
+          </a:xfrm>
+          <a:prstGeom prst="rect">
+            <a:avLst/>
+          </a:prstGeom>
+        </p:spPr>
+        <p:txBody>
+          <a:bodyPr wrap="none">
+            <a:spAutoFit/>
+          </a:bodyPr>
+          <a:lstStyle/>
+          <a:p>
+            <a:pPr algn="ctr"/>
+            <a:r>
+              <a:rPr lang="en-US" sz="1000" dirty="0">
+                <a:solidFill>
+                  <a:sysClr val="windowText" lastClr="000000"/>
+                </a:solidFill>
+              </a:rPr>
+              <a:t>w3cpoc-dev.frapoc.iot.ocs.oraclecloud.com</a:t>
+            </a:r>
+            <a:endParaRPr lang="en-JP" sz="1000" dirty="0">
+              <a:solidFill>
+                <a:sysClr val="windowText" lastClr="000000"/>
+              </a:solidFill>
+            </a:endParaRPr>
+          </a:p>
+        </p:txBody>
+      </p:sp>
+      <p:sp>
+        <p:nvSpPr>
+          <p:cNvPr id="26" name="Rectangle 25">
+            <a:extLst>
+              <a:ext uri="{FF2B5EF4-FFF2-40B4-BE49-F238E27FC236}">
+                <a16:creationId xmlns:a16="http://schemas.microsoft.com/office/drawing/2014/main" id="{9D8A4905-59F5-4C41-807A-9E571ED2764D}"/>
+              </a:ext>
+            </a:extLst>
+          </p:cNvPr>
+          <p:cNvSpPr/>
+          <p:nvPr/>
+        </p:nvSpPr>
+        <p:spPr>
+          <a:xfrm>
+            <a:off x="713093" y="2357323"/>
+            <a:ext cx="1080000" cy="554142"/>
+          </a:xfrm>
+          <a:prstGeom prst="rect">
+            <a:avLst/>
+          </a:prstGeom>
+          <a:solidFill>
+            <a:schemeClr val="bg1"/>
+          </a:solidFill>
+        </p:spPr>
+        <p:style>
+          <a:lnRef idx="2">
+            <a:schemeClr val="accent1">
+              <a:shade val="50000"/>
+            </a:schemeClr>
+          </a:lnRef>
+          <a:fillRef idx="1">
+            <a:schemeClr val="accent1"/>
+          </a:fillRef>
+          <a:effectRef idx="0">
+            <a:schemeClr val="accent1"/>
+          </a:effectRef>
+          <a:fontRef idx="minor">
+            <a:schemeClr val="lt1"/>
+          </a:fontRef>
+        </p:style>
+        <p:txBody>
+          <a:bodyPr lIns="0" rIns="0" rtlCol="0" anchor="ctr"/>
+          <a:lstStyle/>
+          <a:p>
+            <a:pPr algn="ctr"/>
+            <a:r>
+              <a:rPr lang="en-US" sz="1200" dirty="0" err="1">
+                <a:solidFill>
+                  <a:sysClr val="windowText" lastClr="000000"/>
+                </a:solidFill>
+              </a:rPr>
+              <a:t>LinkSmart</a:t>
+            </a:r>
+            <a:r>
+              <a:rPr lang="en-US" sz="1200" dirty="0">
+                <a:solidFill>
+                  <a:sysClr val="windowText" lastClr="000000"/>
+                </a:solidFill>
+              </a:rPr>
+              <a:t> </a:t>
+            </a:r>
+          </a:p>
+          <a:p>
+            <a:pPr algn="ctr"/>
+            <a:r>
+              <a:rPr lang="en-US" sz="1200" dirty="0">
+                <a:solidFill>
+                  <a:sysClr val="windowText" lastClr="000000"/>
+                </a:solidFill>
+              </a:rPr>
+              <a:t>Thing Directory</a:t>
+            </a:r>
+          </a:p>
+          <a:p>
+            <a:pPr algn="ctr"/>
+            <a:r>
+              <a:rPr lang="en-US" sz="1200" dirty="0">
+                <a:solidFill>
+                  <a:sysClr val="windowText" lastClr="000000"/>
+                </a:solidFill>
+              </a:rPr>
+              <a:t>(Fraunhofer)</a:t>
+            </a:r>
+            <a:endParaRPr lang="en-JP" sz="1200" dirty="0">
+              <a:solidFill>
+                <a:sysClr val="windowText" lastClr="000000"/>
+              </a:solidFill>
+            </a:endParaRPr>
+          </a:p>
+        </p:txBody>
+      </p:sp>
+      <p:sp>
+        <p:nvSpPr>
+          <p:cNvPr id="27" name="Rectangle 26">
+            <a:extLst>
+              <a:ext uri="{FF2B5EF4-FFF2-40B4-BE49-F238E27FC236}">
+                <a16:creationId xmlns:a16="http://schemas.microsoft.com/office/drawing/2014/main" id="{6C72DE93-0503-0E42-8160-1D9F111E435D}"/>
+              </a:ext>
+            </a:extLst>
+          </p:cNvPr>
+          <p:cNvSpPr/>
+          <p:nvPr/>
+        </p:nvSpPr>
+        <p:spPr>
+          <a:xfrm>
+            <a:off x="670241" y="2879560"/>
+            <a:ext cx="1165704" cy="246221"/>
+          </a:xfrm>
+          <a:prstGeom prst="rect">
+            <a:avLst/>
+          </a:prstGeom>
+        </p:spPr>
+        <p:txBody>
+          <a:bodyPr wrap="none">
+            <a:spAutoFit/>
+          </a:bodyPr>
+          <a:lstStyle/>
+          <a:p>
+            <a:pPr algn="ctr"/>
+            <a:r>
+              <a:rPr lang="en-US" sz="1000" dirty="0" err="1">
+                <a:solidFill>
+                  <a:sysClr val="windowText" lastClr="000000"/>
+                </a:solidFill>
+              </a:rPr>
+              <a:t>demo.linksmart.eu</a:t>
+            </a:r>
+            <a:endParaRPr lang="en-JP" sz="1000" dirty="0">
+              <a:solidFill>
+                <a:sysClr val="windowText" lastClr="000000"/>
+              </a:solidFill>
+            </a:endParaRPr>
+          </a:p>
+        </p:txBody>
+      </p:sp>
+      <p:sp>
+        <p:nvSpPr>
+          <p:cNvPr id="28" name="Rectangle 27">
+            <a:extLst>
+              <a:ext uri="{FF2B5EF4-FFF2-40B4-BE49-F238E27FC236}">
+                <a16:creationId xmlns:a16="http://schemas.microsoft.com/office/drawing/2014/main" id="{BC5C649C-7C9E-B34D-9C5E-ABA897802D21}"/>
+              </a:ext>
+            </a:extLst>
+          </p:cNvPr>
+          <p:cNvSpPr/>
+          <p:nvPr/>
+        </p:nvSpPr>
+        <p:spPr>
+          <a:xfrm>
+            <a:off x="713093" y="3300807"/>
+            <a:ext cx="1080000" cy="554142"/>
+          </a:xfrm>
+          <a:prstGeom prst="rect">
+            <a:avLst/>
+          </a:prstGeom>
+          <a:solidFill>
+            <a:schemeClr val="bg1"/>
+          </a:solidFill>
+        </p:spPr>
+        <p:style>
+          <a:lnRef idx="2">
+            <a:schemeClr val="accent1">
+              <a:shade val="50000"/>
+            </a:schemeClr>
+          </a:lnRef>
+          <a:fillRef idx="1">
+            <a:schemeClr val="accent1"/>
+          </a:fillRef>
+          <a:effectRef idx="0">
+            <a:schemeClr val="accent1"/>
+          </a:effectRef>
+          <a:fontRef idx="minor">
+            <a:schemeClr val="lt1"/>
+          </a:fontRef>
+        </p:style>
+        <p:txBody>
+          <a:bodyPr lIns="0" rIns="0" rtlCol="0" anchor="ctr"/>
+          <a:lstStyle/>
+          <a:p>
+            <a:pPr algn="ctr"/>
+            <a:r>
+              <a:rPr lang="en-US" sz="1200" dirty="0">
+                <a:solidFill>
+                  <a:sysClr val="windowText" lastClr="000000"/>
+                </a:solidFill>
+              </a:rPr>
+              <a:t>Simple Web</a:t>
+            </a:r>
+          </a:p>
+          <a:p>
+            <a:pPr algn="ctr"/>
+            <a:r>
+              <a:rPr lang="en-US" sz="1200" dirty="0">
+                <a:solidFill>
+                  <a:sysClr val="windowText" lastClr="000000"/>
+                </a:solidFill>
+              </a:rPr>
+              <a:t>Camera</a:t>
+            </a:r>
+          </a:p>
+          <a:p>
+            <a:pPr algn="ctr"/>
+            <a:r>
+              <a:rPr lang="en-US" sz="1200" dirty="0">
+                <a:solidFill>
+                  <a:sysClr val="windowText" lastClr="000000"/>
+                </a:solidFill>
+              </a:rPr>
+              <a:t>(Intel)</a:t>
+            </a:r>
+            <a:endParaRPr lang="en-JP" sz="1200" dirty="0">
+              <a:solidFill>
+                <a:sysClr val="windowText" lastClr="000000"/>
+              </a:solidFill>
+            </a:endParaRPr>
+          </a:p>
+        </p:txBody>
+      </p:sp>
+      <p:sp>
+        <p:nvSpPr>
+          <p:cNvPr id="29" name="Rectangle 28">
+            <a:extLst>
+              <a:ext uri="{FF2B5EF4-FFF2-40B4-BE49-F238E27FC236}">
+                <a16:creationId xmlns:a16="http://schemas.microsoft.com/office/drawing/2014/main" id="{795A62AC-41E5-9E40-87AF-6090D47C8EA0}"/>
+              </a:ext>
+            </a:extLst>
+          </p:cNvPr>
+          <p:cNvSpPr/>
+          <p:nvPr/>
+        </p:nvSpPr>
+        <p:spPr>
+          <a:xfrm>
+            <a:off x="629365" y="3823044"/>
+            <a:ext cx="1247457" cy="400110"/>
+          </a:xfrm>
+          <a:prstGeom prst="rect">
+            <a:avLst/>
+          </a:prstGeom>
+        </p:spPr>
+        <p:txBody>
+          <a:bodyPr wrap="none">
+            <a:spAutoFit/>
+          </a:bodyPr>
+          <a:lstStyle/>
+          <a:p>
+            <a:pPr algn="ctr"/>
+            <a:r>
+              <a:rPr lang="en-US" sz="1000" dirty="0" err="1">
+                <a:solidFill>
+                  <a:sysClr val="windowText" lastClr="000000"/>
+                </a:solidFill>
+              </a:rPr>
+              <a:t>tiktok.mmccool.org</a:t>
+            </a:r>
+            <a:r>
+              <a:rPr lang="en-US" sz="1000" dirty="0">
+                <a:solidFill>
+                  <a:sysClr val="windowText" lastClr="000000"/>
+                </a:solidFill>
+              </a:rPr>
+              <a:t>/</a:t>
+            </a:r>
+          </a:p>
+          <a:p>
+            <a:pPr algn="ctr"/>
+            <a:r>
+              <a:rPr lang="en-US" sz="1000" dirty="0" err="1">
+                <a:solidFill>
+                  <a:sysClr val="windowText" lastClr="000000"/>
+                </a:solidFill>
+              </a:rPr>
+              <a:t>portal.mmccool.net</a:t>
+            </a:r>
+            <a:endParaRPr lang="en-JP" sz="1000" dirty="0">
+              <a:solidFill>
+                <a:sysClr val="windowText" lastClr="000000"/>
+              </a:solidFill>
+            </a:endParaRPr>
+          </a:p>
+        </p:txBody>
+      </p:sp>
+      <p:sp>
+        <p:nvSpPr>
+          <p:cNvPr id="30" name="Rectangle 29">
+            <a:extLst>
+              <a:ext uri="{FF2B5EF4-FFF2-40B4-BE49-F238E27FC236}">
+                <a16:creationId xmlns:a16="http://schemas.microsoft.com/office/drawing/2014/main" id="{B278623F-AAD6-CC49-A622-043DBDDD048F}"/>
+              </a:ext>
+            </a:extLst>
+          </p:cNvPr>
+          <p:cNvSpPr/>
+          <p:nvPr/>
+        </p:nvSpPr>
+        <p:spPr>
+          <a:xfrm>
+            <a:off x="713093" y="4330719"/>
+            <a:ext cx="1080000" cy="554142"/>
+          </a:xfrm>
+          <a:prstGeom prst="rect">
+            <a:avLst/>
+          </a:prstGeom>
+          <a:solidFill>
+            <a:schemeClr val="bg1"/>
+          </a:solidFill>
+        </p:spPr>
+        <p:style>
+          <a:lnRef idx="2">
+            <a:schemeClr val="accent1">
+              <a:shade val="50000"/>
+            </a:schemeClr>
+          </a:lnRef>
+          <a:fillRef idx="1">
+            <a:schemeClr val="accent1"/>
+          </a:fillRef>
+          <a:effectRef idx="0">
+            <a:schemeClr val="accent1"/>
+          </a:effectRef>
+          <a:fontRef idx="minor">
+            <a:schemeClr val="lt1"/>
+          </a:fontRef>
+        </p:style>
+        <p:txBody>
+          <a:bodyPr lIns="0" rIns="0" rtlCol="0" anchor="ctr"/>
+          <a:lstStyle/>
+          <a:p>
+            <a:pPr algn="ctr"/>
+            <a:r>
+              <a:rPr lang="en-US" sz="1200" dirty="0">
+                <a:solidFill>
+                  <a:sysClr val="windowText" lastClr="000000"/>
+                </a:solidFill>
+              </a:rPr>
+              <a:t>Simple Speech Synth.</a:t>
+            </a:r>
+          </a:p>
+          <a:p>
+            <a:pPr algn="ctr"/>
+            <a:r>
+              <a:rPr lang="en-US" sz="1200" dirty="0">
+                <a:solidFill>
+                  <a:sysClr val="windowText" lastClr="000000"/>
+                </a:solidFill>
+              </a:rPr>
+              <a:t>(Intel)</a:t>
+            </a:r>
+            <a:endParaRPr lang="en-JP" sz="1200" dirty="0">
+              <a:solidFill>
+                <a:sysClr val="windowText" lastClr="000000"/>
+              </a:solidFill>
+            </a:endParaRPr>
+          </a:p>
+        </p:txBody>
+      </p:sp>
+      <p:sp>
+        <p:nvSpPr>
+          <p:cNvPr id="31" name="Rectangle 30">
+            <a:extLst>
+              <a:ext uri="{FF2B5EF4-FFF2-40B4-BE49-F238E27FC236}">
+                <a16:creationId xmlns:a16="http://schemas.microsoft.com/office/drawing/2014/main" id="{C0984831-25AE-7B44-9CFD-B90C112C6F7B}"/>
+              </a:ext>
+            </a:extLst>
+          </p:cNvPr>
+          <p:cNvSpPr/>
+          <p:nvPr/>
+        </p:nvSpPr>
+        <p:spPr>
+          <a:xfrm>
+            <a:off x="629365" y="4852956"/>
+            <a:ext cx="1247457" cy="400110"/>
+          </a:xfrm>
+          <a:prstGeom prst="rect">
+            <a:avLst/>
+          </a:prstGeom>
+        </p:spPr>
+        <p:txBody>
+          <a:bodyPr wrap="none">
+            <a:spAutoFit/>
+          </a:bodyPr>
+          <a:lstStyle/>
+          <a:p>
+            <a:pPr algn="ctr"/>
+            <a:r>
+              <a:rPr lang="en-US" sz="1000" dirty="0" err="1">
+                <a:solidFill>
+                  <a:sysClr val="windowText" lastClr="000000"/>
+                </a:solidFill>
+              </a:rPr>
+              <a:t>tiktok.mmccool.org</a:t>
+            </a:r>
+            <a:r>
+              <a:rPr lang="en-US" sz="1000" dirty="0">
+                <a:solidFill>
+                  <a:sysClr val="windowText" lastClr="000000"/>
+                </a:solidFill>
+              </a:rPr>
+              <a:t>/</a:t>
+            </a:r>
+          </a:p>
+          <a:p>
+            <a:pPr algn="ctr"/>
+            <a:r>
+              <a:rPr lang="en-US" sz="1000" dirty="0" err="1">
+                <a:solidFill>
+                  <a:sysClr val="windowText" lastClr="000000"/>
+                </a:solidFill>
+              </a:rPr>
+              <a:t>portal.mmccool.net</a:t>
+            </a:r>
+            <a:endParaRPr lang="en-JP" sz="1000" dirty="0">
+              <a:solidFill>
+                <a:sysClr val="windowText" lastClr="000000"/>
+              </a:solidFill>
+            </a:endParaRPr>
+          </a:p>
+        </p:txBody>
+      </p:sp>
+      <p:sp>
+        <p:nvSpPr>
+          <p:cNvPr id="24" name="Rectangle 23">
+            <a:extLst>
+              <a:ext uri="{FF2B5EF4-FFF2-40B4-BE49-F238E27FC236}">
+                <a16:creationId xmlns:a16="http://schemas.microsoft.com/office/drawing/2014/main" id="{F031B59E-D7FA-A546-8011-B2A95E6D8F08}"/>
+              </a:ext>
+            </a:extLst>
+          </p:cNvPr>
+          <p:cNvSpPr/>
+          <p:nvPr/>
+        </p:nvSpPr>
+        <p:spPr>
+          <a:xfrm>
+            <a:off x="9502156" y="4710219"/>
+            <a:ext cx="1080000" cy="554142"/>
+          </a:xfrm>
+          <a:prstGeom prst="rect">
+            <a:avLst/>
+          </a:prstGeom>
+          <a:solidFill>
+            <a:schemeClr val="bg1"/>
+          </a:solidFill>
+          <a:ln>
+            <a:prstDash val="dash"/>
+          </a:ln>
+        </p:spPr>
+        <p:style>
+          <a:lnRef idx="2">
+            <a:schemeClr val="accent1">
+              <a:shade val="50000"/>
+            </a:schemeClr>
+          </a:lnRef>
+          <a:fillRef idx="1">
+            <a:schemeClr val="accent1"/>
+          </a:fillRef>
+          <a:effectRef idx="0">
+            <a:schemeClr val="accent1"/>
+          </a:effectRef>
+          <a:fontRef idx="minor">
+            <a:schemeClr val="lt1"/>
+          </a:fontRef>
+        </p:style>
+        <p:txBody>
+          <a:bodyPr lIns="0" rIns="0" rtlCol="0" anchor="ctr"/>
+          <a:lstStyle/>
+          <a:p>
+            <a:pPr algn="ctr"/>
+            <a:r>
+              <a:rPr lang="en-US" sz="1200" dirty="0">
+                <a:solidFill>
+                  <a:sysClr val="windowText" lastClr="000000"/>
+                </a:solidFill>
+              </a:rPr>
+              <a:t>(?)</a:t>
+            </a:r>
+          </a:p>
+          <a:p>
+            <a:pPr algn="ctr"/>
+            <a:r>
+              <a:rPr lang="en-US" sz="1200" dirty="0">
+                <a:solidFill>
+                  <a:sysClr val="windowText" lastClr="000000"/>
+                </a:solidFill>
+              </a:rPr>
+              <a:t>(?)</a:t>
+            </a:r>
+            <a:endParaRPr lang="en-JP" sz="1200" dirty="0">
+              <a:solidFill>
+                <a:sysClr val="windowText" lastClr="000000"/>
+              </a:solidFill>
+            </a:endParaRPr>
+          </a:p>
+        </p:txBody>
+      </p:sp>
+      <p:sp>
+        <p:nvSpPr>
+          <p:cNvPr id="32" name="TextBox 31">
+            <a:extLst>
+              <a:ext uri="{FF2B5EF4-FFF2-40B4-BE49-F238E27FC236}">
+                <a16:creationId xmlns:a16="http://schemas.microsoft.com/office/drawing/2014/main" id="{98CF6551-C2D9-3C4D-813D-C5B35436F279}"/>
+              </a:ext>
+            </a:extLst>
+          </p:cNvPr>
+          <p:cNvSpPr txBox="1"/>
+          <p:nvPr/>
+        </p:nvSpPr>
+        <p:spPr>
+          <a:xfrm>
+            <a:off x="9751852" y="5209134"/>
+            <a:ext cx="580608" cy="261610"/>
+          </a:xfrm>
+          <a:prstGeom prst="rect">
+            <a:avLst/>
+          </a:prstGeom>
+          <a:noFill/>
+        </p:spPr>
+        <p:txBody>
+          <a:bodyPr wrap="none" rtlCol="0">
+            <a:spAutoFit/>
+          </a:bodyPr>
+          <a:lstStyle/>
+          <a:p>
+            <a:pPr algn="ctr"/>
+            <a:r>
+              <a:rPr lang="en-JP" sz="1100" dirty="0"/>
+              <a:t>30.138</a:t>
+            </a:r>
+          </a:p>
+        </p:txBody>
+      </p:sp>
+      <p:sp>
+        <p:nvSpPr>
+          <p:cNvPr id="35" name="Rectangle 34">
+            <a:extLst>
+              <a:ext uri="{FF2B5EF4-FFF2-40B4-BE49-F238E27FC236}">
+                <a16:creationId xmlns:a16="http://schemas.microsoft.com/office/drawing/2014/main" id="{98484D3C-A501-8643-89CD-0C186FFCDA8A}"/>
+              </a:ext>
+            </a:extLst>
+          </p:cNvPr>
+          <p:cNvSpPr/>
+          <p:nvPr/>
+        </p:nvSpPr>
+        <p:spPr>
+          <a:xfrm>
+            <a:off x="8066610" y="4689935"/>
+            <a:ext cx="1080000" cy="554142"/>
+          </a:xfrm>
+          <a:prstGeom prst="rect">
+            <a:avLst/>
+          </a:prstGeom>
+          <a:solidFill>
+            <a:schemeClr val="bg1"/>
+          </a:solidFill>
+          <a:ln>
+            <a:prstDash val="solid"/>
+          </a:ln>
+        </p:spPr>
+        <p:style>
+          <a:lnRef idx="2">
+            <a:schemeClr val="accent1">
+              <a:shade val="50000"/>
+            </a:schemeClr>
+          </a:lnRef>
+          <a:fillRef idx="1">
+            <a:schemeClr val="accent1"/>
+          </a:fillRef>
+          <a:effectRef idx="0">
+            <a:schemeClr val="accent1"/>
+          </a:effectRef>
+          <a:fontRef idx="minor">
+            <a:schemeClr val="lt1"/>
+          </a:fontRef>
+        </p:style>
+        <p:txBody>
+          <a:bodyPr lIns="0" rIns="0" rtlCol="0" anchor="ctr"/>
+          <a:lstStyle/>
+          <a:p>
+            <a:pPr algn="ctr"/>
+            <a:r>
+              <a:rPr lang="en-US" sz="1200" dirty="0" err="1">
+                <a:solidFill>
+                  <a:sysClr val="windowText" lastClr="000000"/>
+                </a:solidFill>
+              </a:rPr>
+              <a:t>LinkSmart</a:t>
+            </a:r>
+            <a:r>
+              <a:rPr lang="en-US" sz="1200" dirty="0">
+                <a:solidFill>
+                  <a:sysClr val="windowText" lastClr="000000"/>
+                </a:solidFill>
+              </a:rPr>
+              <a:t> </a:t>
+            </a:r>
+          </a:p>
+          <a:p>
+            <a:pPr algn="ctr"/>
+            <a:r>
+              <a:rPr lang="en-US" sz="1200" dirty="0">
+                <a:solidFill>
+                  <a:sysClr val="windowText" lastClr="000000"/>
+                </a:solidFill>
+              </a:rPr>
+              <a:t>Thing Directory</a:t>
+            </a:r>
+          </a:p>
+          <a:p>
+            <a:pPr algn="ctr"/>
+            <a:r>
+              <a:rPr lang="en-US" sz="1200" dirty="0">
+                <a:solidFill>
+                  <a:sysClr val="windowText" lastClr="000000"/>
+                </a:solidFill>
+              </a:rPr>
+              <a:t>(Fraunhofer)</a:t>
+            </a:r>
+            <a:endParaRPr lang="en-JP" sz="1200" dirty="0">
+              <a:solidFill>
+                <a:sysClr val="windowText" lastClr="000000"/>
+              </a:solidFill>
+            </a:endParaRPr>
+          </a:p>
+        </p:txBody>
+      </p:sp>
+      <p:sp>
+        <p:nvSpPr>
+          <p:cNvPr id="36" name="TextBox 35">
+            <a:extLst>
+              <a:ext uri="{FF2B5EF4-FFF2-40B4-BE49-F238E27FC236}">
+                <a16:creationId xmlns:a16="http://schemas.microsoft.com/office/drawing/2014/main" id="{B943682C-122D-284A-8F0B-ECE0FFAE0097}"/>
+              </a:ext>
+            </a:extLst>
+          </p:cNvPr>
+          <p:cNvSpPr txBox="1"/>
+          <p:nvPr/>
+        </p:nvSpPr>
+        <p:spPr>
+          <a:xfrm>
+            <a:off x="8316306" y="5188850"/>
+            <a:ext cx="580608" cy="261610"/>
+          </a:xfrm>
+          <a:prstGeom prst="rect">
+            <a:avLst/>
+          </a:prstGeom>
+          <a:noFill/>
+        </p:spPr>
+        <p:txBody>
+          <a:bodyPr wrap="none" rtlCol="0">
+            <a:spAutoFit/>
+          </a:bodyPr>
+          <a:lstStyle/>
+          <a:p>
+            <a:pPr algn="ctr"/>
+            <a:r>
+              <a:rPr lang="en-JP" sz="1100" dirty="0"/>
+              <a:t>30.132</a:t>
+            </a:r>
+          </a:p>
+        </p:txBody>
+      </p:sp>
+      <p:sp>
+        <p:nvSpPr>
+          <p:cNvPr id="37" name="Rectangle 36">
+            <a:extLst>
+              <a:ext uri="{FF2B5EF4-FFF2-40B4-BE49-F238E27FC236}">
+                <a16:creationId xmlns:a16="http://schemas.microsoft.com/office/drawing/2014/main" id="{D7125172-F4FC-8E4B-B9B7-64CE46F83E16}"/>
+              </a:ext>
+            </a:extLst>
+          </p:cNvPr>
+          <p:cNvSpPr/>
+          <p:nvPr/>
+        </p:nvSpPr>
+        <p:spPr>
+          <a:xfrm>
+            <a:off x="9502156" y="1308059"/>
+            <a:ext cx="1080000" cy="554142"/>
+          </a:xfrm>
+          <a:prstGeom prst="rect">
+            <a:avLst/>
+          </a:prstGeom>
+          <a:solidFill>
+            <a:schemeClr val="bg1"/>
+          </a:solidFill>
+          <a:ln>
+            <a:prstDash val="dash"/>
+          </a:ln>
+        </p:spPr>
+        <p:style>
+          <a:lnRef idx="2">
+            <a:schemeClr val="accent1">
+              <a:shade val="50000"/>
+            </a:schemeClr>
+          </a:lnRef>
+          <a:fillRef idx="1">
+            <a:schemeClr val="accent1"/>
+          </a:fillRef>
+          <a:effectRef idx="0">
+            <a:schemeClr val="accent1"/>
+          </a:effectRef>
+          <a:fontRef idx="minor">
+            <a:schemeClr val="lt1"/>
+          </a:fontRef>
+        </p:style>
+        <p:txBody>
+          <a:bodyPr lIns="0" rIns="0" rtlCol="0" anchor="ctr"/>
+          <a:lstStyle/>
+          <a:p>
+            <a:pPr algn="ctr"/>
+            <a:r>
+              <a:rPr lang="en-US" sz="1200" dirty="0">
+                <a:solidFill>
+                  <a:sysClr val="windowText" lastClr="000000"/>
+                </a:solidFill>
+              </a:rPr>
+              <a:t>(?)</a:t>
+            </a:r>
+          </a:p>
+          <a:p>
+            <a:pPr algn="ctr"/>
+            <a:r>
+              <a:rPr lang="en-US" sz="1200" dirty="0">
+                <a:solidFill>
+                  <a:sysClr val="windowText" lastClr="000000"/>
+                </a:solidFill>
+              </a:rPr>
+              <a:t>(?)</a:t>
+            </a:r>
+            <a:endParaRPr lang="en-JP" sz="1200" dirty="0">
+              <a:solidFill>
+                <a:sysClr val="windowText" lastClr="000000"/>
+              </a:solidFill>
+            </a:endParaRPr>
+          </a:p>
+        </p:txBody>
+      </p:sp>
+      <p:sp>
+        <p:nvSpPr>
+          <p:cNvPr id="38" name="TextBox 37">
+            <a:extLst>
+              <a:ext uri="{FF2B5EF4-FFF2-40B4-BE49-F238E27FC236}">
+                <a16:creationId xmlns:a16="http://schemas.microsoft.com/office/drawing/2014/main" id="{477F6992-1B92-F24F-A873-AFF4AF5792F0}"/>
+              </a:ext>
+            </a:extLst>
+          </p:cNvPr>
+          <p:cNvSpPr txBox="1"/>
+          <p:nvPr/>
+        </p:nvSpPr>
+        <p:spPr>
+          <a:xfrm>
+            <a:off x="9751852" y="1806974"/>
+            <a:ext cx="580608" cy="261610"/>
+          </a:xfrm>
+          <a:prstGeom prst="rect">
+            <a:avLst/>
+          </a:prstGeom>
+          <a:noFill/>
+        </p:spPr>
+        <p:txBody>
+          <a:bodyPr wrap="none" rtlCol="0">
+            <a:spAutoFit/>
+          </a:bodyPr>
+          <a:lstStyle/>
+          <a:p>
+            <a:pPr algn="ctr"/>
+            <a:r>
+              <a:rPr lang="en-JP" sz="1100" dirty="0"/>
+              <a:t>30.134</a:t>
+            </a:r>
+          </a:p>
+        </p:txBody>
+      </p:sp>
+      <p:sp>
+        <p:nvSpPr>
+          <p:cNvPr id="39" name="Rectangle 38">
+            <a:extLst>
+              <a:ext uri="{FF2B5EF4-FFF2-40B4-BE49-F238E27FC236}">
+                <a16:creationId xmlns:a16="http://schemas.microsoft.com/office/drawing/2014/main" id="{FFBF0D24-9E84-9D4F-936E-A1F71E9E7ABC}"/>
+              </a:ext>
+            </a:extLst>
+          </p:cNvPr>
+          <p:cNvSpPr/>
+          <p:nvPr/>
+        </p:nvSpPr>
+        <p:spPr>
+          <a:xfrm>
+            <a:off x="8066610" y="2998997"/>
+            <a:ext cx="1080000" cy="554142"/>
+          </a:xfrm>
+          <a:prstGeom prst="rect">
+            <a:avLst/>
+          </a:prstGeom>
+          <a:solidFill>
+            <a:schemeClr val="bg1"/>
+          </a:solidFill>
+          <a:ln>
+            <a:prstDash val="dash"/>
+          </a:ln>
+        </p:spPr>
+        <p:style>
+          <a:lnRef idx="2">
+            <a:schemeClr val="accent1">
+              <a:shade val="50000"/>
+            </a:schemeClr>
+          </a:lnRef>
+          <a:fillRef idx="1">
+            <a:schemeClr val="accent1"/>
+          </a:fillRef>
+          <a:effectRef idx="0">
+            <a:schemeClr val="accent1"/>
+          </a:effectRef>
+          <a:fontRef idx="minor">
+            <a:schemeClr val="lt1"/>
+          </a:fontRef>
+        </p:style>
+        <p:txBody>
+          <a:bodyPr lIns="0" rIns="0" rtlCol="0" anchor="ctr"/>
+          <a:lstStyle/>
+          <a:p>
+            <a:pPr algn="ctr"/>
+            <a:r>
+              <a:rPr lang="en-US" sz="1200" dirty="0">
+                <a:solidFill>
+                  <a:sysClr val="windowText" lastClr="000000"/>
+                </a:solidFill>
+              </a:rPr>
+              <a:t>(?)</a:t>
+            </a:r>
+          </a:p>
+          <a:p>
+            <a:pPr algn="ctr"/>
+            <a:r>
+              <a:rPr lang="en-US" sz="1200" dirty="0">
+                <a:solidFill>
+                  <a:sysClr val="windowText" lastClr="000000"/>
+                </a:solidFill>
+              </a:rPr>
+              <a:t>(?)</a:t>
+            </a:r>
+            <a:endParaRPr lang="en-JP" sz="1200" dirty="0">
+              <a:solidFill>
+                <a:sysClr val="windowText" lastClr="000000"/>
+              </a:solidFill>
+            </a:endParaRPr>
+          </a:p>
+        </p:txBody>
+      </p:sp>
+      <p:sp>
+        <p:nvSpPr>
+          <p:cNvPr id="40" name="TextBox 39">
+            <a:extLst>
+              <a:ext uri="{FF2B5EF4-FFF2-40B4-BE49-F238E27FC236}">
+                <a16:creationId xmlns:a16="http://schemas.microsoft.com/office/drawing/2014/main" id="{8D002389-5382-914B-A751-8A7B7B9EDAA4}"/>
+              </a:ext>
+            </a:extLst>
+          </p:cNvPr>
+          <p:cNvSpPr txBox="1"/>
+          <p:nvPr/>
+        </p:nvSpPr>
+        <p:spPr>
+          <a:xfrm>
+            <a:off x="8316306" y="3497912"/>
+            <a:ext cx="580608" cy="261610"/>
+          </a:xfrm>
+          <a:prstGeom prst="rect">
+            <a:avLst/>
+          </a:prstGeom>
+          <a:noFill/>
+        </p:spPr>
+        <p:txBody>
+          <a:bodyPr wrap="none" rtlCol="0">
+            <a:spAutoFit/>
+          </a:bodyPr>
+          <a:lstStyle/>
+          <a:p>
+            <a:pPr algn="ctr"/>
+            <a:r>
+              <a:rPr lang="en-JP" sz="1100" dirty="0"/>
+              <a:t>30.130</a:t>
+            </a:r>
+          </a:p>
+        </p:txBody>
+      </p:sp>
+      <p:sp>
+        <p:nvSpPr>
+          <p:cNvPr id="41" name="Rectangle 40">
+            <a:extLst>
+              <a:ext uri="{FF2B5EF4-FFF2-40B4-BE49-F238E27FC236}">
+                <a16:creationId xmlns:a16="http://schemas.microsoft.com/office/drawing/2014/main" id="{05324F03-95F1-F040-99E7-D50A72E4C587}"/>
+              </a:ext>
+            </a:extLst>
+          </p:cNvPr>
+          <p:cNvSpPr/>
+          <p:nvPr/>
+        </p:nvSpPr>
+        <p:spPr>
+          <a:xfrm>
+            <a:off x="9502156" y="3009139"/>
+            <a:ext cx="1080000" cy="554142"/>
+          </a:xfrm>
+          <a:prstGeom prst="rect">
+            <a:avLst/>
+          </a:prstGeom>
+          <a:solidFill>
+            <a:schemeClr val="bg1"/>
+          </a:solidFill>
+          <a:ln>
+            <a:prstDash val="dash"/>
+          </a:ln>
+        </p:spPr>
+        <p:style>
+          <a:lnRef idx="2">
+            <a:schemeClr val="accent1">
+              <a:shade val="50000"/>
+            </a:schemeClr>
+          </a:lnRef>
+          <a:fillRef idx="1">
+            <a:schemeClr val="accent1"/>
+          </a:fillRef>
+          <a:effectRef idx="0">
+            <a:schemeClr val="accent1"/>
+          </a:effectRef>
+          <a:fontRef idx="minor">
+            <a:schemeClr val="lt1"/>
+          </a:fontRef>
+        </p:style>
+        <p:txBody>
+          <a:bodyPr lIns="0" rIns="0" rtlCol="0" anchor="ctr"/>
+          <a:lstStyle/>
+          <a:p>
+            <a:pPr algn="ctr"/>
+            <a:r>
+              <a:rPr lang="en-US" sz="1200" dirty="0">
+                <a:solidFill>
+                  <a:sysClr val="windowText" lastClr="000000"/>
+                </a:solidFill>
+              </a:rPr>
+              <a:t>(?)</a:t>
+            </a:r>
+          </a:p>
+          <a:p>
+            <a:pPr algn="ctr"/>
+            <a:r>
+              <a:rPr lang="en-US" sz="1200" dirty="0">
+                <a:solidFill>
+                  <a:sysClr val="windowText" lastClr="000000"/>
+                </a:solidFill>
+              </a:rPr>
+              <a:t>(?)</a:t>
+            </a:r>
+            <a:endParaRPr lang="en-JP" sz="1200" dirty="0">
+              <a:solidFill>
+                <a:sysClr val="windowText" lastClr="000000"/>
+              </a:solidFill>
+            </a:endParaRPr>
+          </a:p>
+        </p:txBody>
+      </p:sp>
+      <p:sp>
+        <p:nvSpPr>
+          <p:cNvPr id="42" name="TextBox 41">
+            <a:extLst>
+              <a:ext uri="{FF2B5EF4-FFF2-40B4-BE49-F238E27FC236}">
+                <a16:creationId xmlns:a16="http://schemas.microsoft.com/office/drawing/2014/main" id="{96A0A645-9117-424F-8C91-1B610C632864}"/>
+              </a:ext>
+            </a:extLst>
+          </p:cNvPr>
+          <p:cNvSpPr txBox="1"/>
+          <p:nvPr/>
+        </p:nvSpPr>
+        <p:spPr>
+          <a:xfrm>
+            <a:off x="9751852" y="3508054"/>
+            <a:ext cx="580608" cy="261610"/>
+          </a:xfrm>
+          <a:prstGeom prst="rect">
+            <a:avLst/>
+          </a:prstGeom>
+          <a:noFill/>
+        </p:spPr>
+        <p:txBody>
+          <a:bodyPr wrap="none" rtlCol="0">
+            <a:spAutoFit/>
+          </a:bodyPr>
+          <a:lstStyle/>
+          <a:p>
+            <a:pPr algn="ctr"/>
+            <a:r>
+              <a:rPr lang="en-JP" sz="1100" dirty="0"/>
+              <a:t>30.136</a:t>
+            </a:r>
+          </a:p>
+        </p:txBody>
+      </p:sp>
+      <p:sp>
+        <p:nvSpPr>
+          <p:cNvPr id="43" name="Rectangle 42">
+            <a:extLst>
+              <a:ext uri="{FF2B5EF4-FFF2-40B4-BE49-F238E27FC236}">
+                <a16:creationId xmlns:a16="http://schemas.microsoft.com/office/drawing/2014/main" id="{D349E228-A45F-C548-A256-61E7D3E6C1A4}"/>
+              </a:ext>
+            </a:extLst>
+          </p:cNvPr>
+          <p:cNvSpPr/>
+          <p:nvPr/>
+        </p:nvSpPr>
+        <p:spPr>
+          <a:xfrm>
+            <a:off x="9502156" y="3859679"/>
+            <a:ext cx="1080000" cy="554142"/>
+          </a:xfrm>
+          <a:prstGeom prst="rect">
+            <a:avLst/>
+          </a:prstGeom>
+          <a:solidFill>
+            <a:schemeClr val="bg1"/>
+          </a:solidFill>
+          <a:ln>
+            <a:prstDash val="dash"/>
+          </a:ln>
+        </p:spPr>
+        <p:style>
+          <a:lnRef idx="2">
+            <a:schemeClr val="accent1">
+              <a:shade val="50000"/>
+            </a:schemeClr>
+          </a:lnRef>
+          <a:fillRef idx="1">
+            <a:schemeClr val="accent1"/>
+          </a:fillRef>
+          <a:effectRef idx="0">
+            <a:schemeClr val="accent1"/>
+          </a:effectRef>
+          <a:fontRef idx="minor">
+            <a:schemeClr val="lt1"/>
+          </a:fontRef>
+        </p:style>
+        <p:txBody>
+          <a:bodyPr lIns="0" rIns="0" rtlCol="0" anchor="ctr"/>
+          <a:lstStyle/>
+          <a:p>
+            <a:pPr algn="ctr"/>
+            <a:r>
+              <a:rPr lang="en-US" sz="1200" dirty="0">
+                <a:solidFill>
+                  <a:sysClr val="windowText" lastClr="000000"/>
+                </a:solidFill>
+              </a:rPr>
+              <a:t>(?)</a:t>
+            </a:r>
+          </a:p>
+          <a:p>
+            <a:pPr algn="ctr"/>
+            <a:r>
+              <a:rPr lang="en-US" sz="1200" dirty="0">
+                <a:solidFill>
+                  <a:sysClr val="windowText" lastClr="000000"/>
+                </a:solidFill>
+              </a:rPr>
+              <a:t>(?)</a:t>
+            </a:r>
+            <a:endParaRPr lang="en-JP" sz="1200" dirty="0">
+              <a:solidFill>
+                <a:sysClr val="windowText" lastClr="000000"/>
+              </a:solidFill>
+            </a:endParaRPr>
+          </a:p>
+        </p:txBody>
+      </p:sp>
+      <p:sp>
+        <p:nvSpPr>
+          <p:cNvPr id="44" name="TextBox 43">
+            <a:extLst>
+              <a:ext uri="{FF2B5EF4-FFF2-40B4-BE49-F238E27FC236}">
+                <a16:creationId xmlns:a16="http://schemas.microsoft.com/office/drawing/2014/main" id="{1FF14569-A871-7D41-B2AA-F01543D7E0EE}"/>
+              </a:ext>
+            </a:extLst>
+          </p:cNvPr>
+          <p:cNvSpPr txBox="1"/>
+          <p:nvPr/>
+        </p:nvSpPr>
+        <p:spPr>
+          <a:xfrm>
+            <a:off x="9751852" y="4358594"/>
+            <a:ext cx="580608" cy="261610"/>
+          </a:xfrm>
+          <a:prstGeom prst="rect">
+            <a:avLst/>
+          </a:prstGeom>
+          <a:noFill/>
+        </p:spPr>
+        <p:txBody>
+          <a:bodyPr wrap="none" rtlCol="0">
+            <a:spAutoFit/>
+          </a:bodyPr>
+          <a:lstStyle/>
+          <a:p>
+            <a:pPr algn="ctr"/>
+            <a:r>
+              <a:rPr lang="en-JP" sz="1100" dirty="0"/>
+              <a:t>30.137</a:t>
+            </a:r>
+          </a:p>
+        </p:txBody>
+      </p:sp>
+      <p:sp>
+        <p:nvSpPr>
+          <p:cNvPr id="45" name="Rectangle 44">
+            <a:extLst>
+              <a:ext uri="{FF2B5EF4-FFF2-40B4-BE49-F238E27FC236}">
+                <a16:creationId xmlns:a16="http://schemas.microsoft.com/office/drawing/2014/main" id="{A98E6801-A142-754B-9CB1-D0DB74253750}"/>
+              </a:ext>
+            </a:extLst>
+          </p:cNvPr>
+          <p:cNvSpPr/>
+          <p:nvPr/>
+        </p:nvSpPr>
+        <p:spPr>
+          <a:xfrm>
+            <a:off x="8066610" y="1308059"/>
+            <a:ext cx="1080000" cy="554142"/>
+          </a:xfrm>
+          <a:prstGeom prst="rect">
+            <a:avLst/>
+          </a:prstGeom>
+          <a:solidFill>
+            <a:schemeClr val="bg1"/>
+          </a:solidFill>
+          <a:ln>
+            <a:prstDash val="dash"/>
+          </a:ln>
+        </p:spPr>
+        <p:style>
+          <a:lnRef idx="2">
+            <a:schemeClr val="accent1">
+              <a:shade val="50000"/>
+            </a:schemeClr>
+          </a:lnRef>
+          <a:fillRef idx="1">
+            <a:schemeClr val="accent1"/>
+          </a:fillRef>
+          <a:effectRef idx="0">
+            <a:schemeClr val="accent1"/>
+          </a:effectRef>
+          <a:fontRef idx="minor">
+            <a:schemeClr val="lt1"/>
+          </a:fontRef>
+        </p:style>
+        <p:txBody>
+          <a:bodyPr lIns="0" rIns="0" rtlCol="0" anchor="ctr"/>
+          <a:lstStyle/>
+          <a:p>
+            <a:pPr algn="ctr"/>
+            <a:r>
+              <a:rPr lang="en-US" sz="1200" dirty="0">
+                <a:solidFill>
+                  <a:sysClr val="windowText" lastClr="000000"/>
+                </a:solidFill>
+              </a:rPr>
+              <a:t>(?)</a:t>
+            </a:r>
+          </a:p>
+          <a:p>
+            <a:pPr algn="ctr"/>
+            <a:r>
+              <a:rPr lang="en-US" sz="1200" dirty="0">
+                <a:solidFill>
+                  <a:sysClr val="windowText" lastClr="000000"/>
+                </a:solidFill>
+              </a:rPr>
+              <a:t>(?)</a:t>
+            </a:r>
+            <a:endParaRPr lang="en-JP" sz="1200" dirty="0">
+              <a:solidFill>
+                <a:sysClr val="windowText" lastClr="000000"/>
+              </a:solidFill>
+            </a:endParaRPr>
+          </a:p>
+        </p:txBody>
+      </p:sp>
+      <p:sp>
+        <p:nvSpPr>
+          <p:cNvPr id="46" name="TextBox 45">
+            <a:extLst>
+              <a:ext uri="{FF2B5EF4-FFF2-40B4-BE49-F238E27FC236}">
+                <a16:creationId xmlns:a16="http://schemas.microsoft.com/office/drawing/2014/main" id="{D3676FB1-24F6-6245-9945-B7906A49CE54}"/>
+              </a:ext>
+            </a:extLst>
+          </p:cNvPr>
+          <p:cNvSpPr txBox="1"/>
+          <p:nvPr/>
+        </p:nvSpPr>
+        <p:spPr>
+          <a:xfrm>
+            <a:off x="8316306" y="1806974"/>
+            <a:ext cx="580608" cy="261610"/>
+          </a:xfrm>
+          <a:prstGeom prst="rect">
+            <a:avLst/>
+          </a:prstGeom>
+          <a:noFill/>
+        </p:spPr>
+        <p:txBody>
+          <a:bodyPr wrap="none" rtlCol="0">
+            <a:spAutoFit/>
+          </a:bodyPr>
+          <a:lstStyle/>
+          <a:p>
+            <a:pPr algn="ctr"/>
+            <a:r>
+              <a:rPr lang="en-JP" sz="1100" dirty="0"/>
+              <a:t>30.128</a:t>
+            </a:r>
+          </a:p>
+        </p:txBody>
+      </p:sp>
+      <p:sp>
+        <p:nvSpPr>
+          <p:cNvPr id="47" name="Rectangle 46">
+            <a:extLst>
+              <a:ext uri="{FF2B5EF4-FFF2-40B4-BE49-F238E27FC236}">
+                <a16:creationId xmlns:a16="http://schemas.microsoft.com/office/drawing/2014/main" id="{DBA2935F-9F22-9B43-8EF3-47DFCC93BDD7}"/>
+              </a:ext>
+            </a:extLst>
+          </p:cNvPr>
+          <p:cNvSpPr/>
+          <p:nvPr/>
+        </p:nvSpPr>
+        <p:spPr>
+          <a:xfrm>
+            <a:off x="8066610" y="5535403"/>
+            <a:ext cx="1080000" cy="554142"/>
+          </a:xfrm>
+          <a:prstGeom prst="rect">
+            <a:avLst/>
+          </a:prstGeom>
+          <a:solidFill>
+            <a:schemeClr val="bg1"/>
+          </a:solidFill>
+          <a:ln>
+            <a:prstDash val="dash"/>
+          </a:ln>
+        </p:spPr>
+        <p:style>
+          <a:lnRef idx="2">
+            <a:schemeClr val="accent1">
+              <a:shade val="50000"/>
+            </a:schemeClr>
+          </a:lnRef>
+          <a:fillRef idx="1">
+            <a:schemeClr val="accent1"/>
+          </a:fillRef>
+          <a:effectRef idx="0">
+            <a:schemeClr val="accent1"/>
+          </a:effectRef>
+          <a:fontRef idx="minor">
+            <a:schemeClr val="lt1"/>
+          </a:fontRef>
+        </p:style>
+        <p:txBody>
+          <a:bodyPr lIns="0" rIns="0" rtlCol="0" anchor="ctr"/>
+          <a:lstStyle/>
+          <a:p>
+            <a:pPr algn="ctr"/>
+            <a:r>
+              <a:rPr lang="en-US" sz="1200" dirty="0">
+                <a:solidFill>
+                  <a:sysClr val="windowText" lastClr="000000"/>
+                </a:solidFill>
+              </a:rPr>
+              <a:t>(?)</a:t>
+            </a:r>
+          </a:p>
+          <a:p>
+            <a:pPr algn="ctr"/>
+            <a:r>
+              <a:rPr lang="en-US" sz="1200" dirty="0">
+                <a:solidFill>
+                  <a:sysClr val="windowText" lastClr="000000"/>
+                </a:solidFill>
+              </a:rPr>
+              <a:t>(?)</a:t>
+            </a:r>
+            <a:endParaRPr lang="en-JP" sz="1200" dirty="0">
+              <a:solidFill>
+                <a:sysClr val="windowText" lastClr="000000"/>
+              </a:solidFill>
+            </a:endParaRPr>
+          </a:p>
+        </p:txBody>
+      </p:sp>
+      <p:sp>
+        <p:nvSpPr>
+          <p:cNvPr id="48" name="TextBox 47">
+            <a:extLst>
+              <a:ext uri="{FF2B5EF4-FFF2-40B4-BE49-F238E27FC236}">
+                <a16:creationId xmlns:a16="http://schemas.microsoft.com/office/drawing/2014/main" id="{FB8CB0BA-C508-FD44-9494-4F12939397AA}"/>
+              </a:ext>
+            </a:extLst>
+          </p:cNvPr>
+          <p:cNvSpPr txBox="1"/>
+          <p:nvPr/>
+        </p:nvSpPr>
+        <p:spPr>
+          <a:xfrm>
+            <a:off x="8316306" y="6034318"/>
+            <a:ext cx="580608" cy="261610"/>
+          </a:xfrm>
+          <a:prstGeom prst="rect">
+            <a:avLst/>
+          </a:prstGeom>
+          <a:noFill/>
+        </p:spPr>
+        <p:txBody>
+          <a:bodyPr wrap="none" rtlCol="0">
+            <a:spAutoFit/>
+          </a:bodyPr>
+          <a:lstStyle/>
+          <a:p>
+            <a:pPr algn="ctr"/>
+            <a:r>
+              <a:rPr lang="en-JP" sz="1100" dirty="0"/>
+              <a:t>30.133</a:t>
+            </a:r>
+          </a:p>
+        </p:txBody>
+      </p:sp>
+      <p:sp>
+        <p:nvSpPr>
+          <p:cNvPr id="49" name="Rectangle 48">
+            <a:extLst>
+              <a:ext uri="{FF2B5EF4-FFF2-40B4-BE49-F238E27FC236}">
+                <a16:creationId xmlns:a16="http://schemas.microsoft.com/office/drawing/2014/main" id="{F124F1B1-D195-1F4C-9381-F106664662F7}"/>
+              </a:ext>
+            </a:extLst>
+          </p:cNvPr>
+          <p:cNvSpPr/>
+          <p:nvPr/>
+        </p:nvSpPr>
+        <p:spPr>
+          <a:xfrm>
+            <a:off x="9502156" y="5560758"/>
+            <a:ext cx="1080000" cy="554142"/>
+          </a:xfrm>
+          <a:prstGeom prst="rect">
+            <a:avLst/>
+          </a:prstGeom>
+          <a:solidFill>
+            <a:schemeClr val="bg1"/>
+          </a:solidFill>
+        </p:spPr>
+        <p:style>
+          <a:lnRef idx="2">
+            <a:schemeClr val="accent1">
+              <a:shade val="50000"/>
+            </a:schemeClr>
+          </a:lnRef>
+          <a:fillRef idx="1">
+            <a:schemeClr val="accent1"/>
+          </a:fillRef>
+          <a:effectRef idx="0">
+            <a:schemeClr val="accent1"/>
+          </a:effectRef>
+          <a:fontRef idx="minor">
+            <a:schemeClr val="lt1"/>
+          </a:fontRef>
+        </p:style>
+        <p:txBody>
+          <a:bodyPr lIns="0" rIns="0" rtlCol="0" anchor="ctr"/>
+          <a:lstStyle/>
+          <a:p>
+            <a:pPr algn="ctr"/>
+            <a:r>
+              <a:rPr lang="en-US" sz="1200" dirty="0">
+                <a:solidFill>
+                  <a:sysClr val="windowText" lastClr="000000"/>
+                </a:solidFill>
+              </a:rPr>
+              <a:t>(?)</a:t>
+            </a:r>
+          </a:p>
+          <a:p>
+            <a:pPr algn="ctr"/>
+            <a:r>
+              <a:rPr lang="en-US" sz="1200" dirty="0">
+                <a:solidFill>
+                  <a:sysClr val="windowText" lastClr="000000"/>
+                </a:solidFill>
+              </a:rPr>
+              <a:t>(?)</a:t>
+            </a:r>
+            <a:endParaRPr lang="en-JP" sz="1200" dirty="0">
+              <a:solidFill>
+                <a:sysClr val="windowText" lastClr="000000"/>
+              </a:solidFill>
+            </a:endParaRPr>
+          </a:p>
+        </p:txBody>
+      </p:sp>
+      <p:sp>
+        <p:nvSpPr>
+          <p:cNvPr id="50" name="TextBox 49">
+            <a:extLst>
+              <a:ext uri="{FF2B5EF4-FFF2-40B4-BE49-F238E27FC236}">
+                <a16:creationId xmlns:a16="http://schemas.microsoft.com/office/drawing/2014/main" id="{60064178-338F-5C4D-9D86-012D28620A60}"/>
+              </a:ext>
+            </a:extLst>
+          </p:cNvPr>
+          <p:cNvSpPr txBox="1"/>
+          <p:nvPr/>
+        </p:nvSpPr>
+        <p:spPr>
+          <a:xfrm>
+            <a:off x="9751852" y="6059673"/>
+            <a:ext cx="580608" cy="261610"/>
+          </a:xfrm>
+          <a:prstGeom prst="rect">
+            <a:avLst/>
+          </a:prstGeom>
+          <a:noFill/>
+        </p:spPr>
+        <p:txBody>
+          <a:bodyPr wrap="none" rtlCol="0">
+            <a:spAutoFit/>
+          </a:bodyPr>
+          <a:lstStyle/>
+          <a:p>
+            <a:pPr algn="ctr"/>
+            <a:r>
+              <a:rPr lang="en-JP" sz="1100" dirty="0"/>
+              <a:t>30.139</a:t>
+            </a:r>
+          </a:p>
+        </p:txBody>
+      </p:sp>
+      <p:sp>
+        <p:nvSpPr>
+          <p:cNvPr id="51" name="Rectangle 50">
+            <a:extLst>
+              <a:ext uri="{FF2B5EF4-FFF2-40B4-BE49-F238E27FC236}">
+                <a16:creationId xmlns:a16="http://schemas.microsoft.com/office/drawing/2014/main" id="{14A6D950-8D07-8940-A592-4059FB77DD8A}"/>
+              </a:ext>
+            </a:extLst>
+          </p:cNvPr>
+          <p:cNvSpPr/>
+          <p:nvPr/>
+        </p:nvSpPr>
+        <p:spPr>
+          <a:xfrm>
+            <a:off x="8066610" y="3844466"/>
+            <a:ext cx="1080000" cy="554142"/>
+          </a:xfrm>
+          <a:prstGeom prst="rect">
+            <a:avLst/>
+          </a:prstGeom>
+          <a:solidFill>
+            <a:schemeClr val="bg1"/>
+          </a:solidFill>
+          <a:ln>
+            <a:prstDash val="dash"/>
+          </a:ln>
+        </p:spPr>
+        <p:style>
+          <a:lnRef idx="2">
+            <a:schemeClr val="accent1">
+              <a:shade val="50000"/>
+            </a:schemeClr>
+          </a:lnRef>
+          <a:fillRef idx="1">
+            <a:schemeClr val="accent1"/>
+          </a:fillRef>
+          <a:effectRef idx="0">
+            <a:schemeClr val="accent1"/>
+          </a:effectRef>
+          <a:fontRef idx="minor">
+            <a:schemeClr val="lt1"/>
+          </a:fontRef>
+        </p:style>
+        <p:txBody>
+          <a:bodyPr lIns="0" rIns="0" rtlCol="0" anchor="ctr"/>
+          <a:lstStyle/>
+          <a:p>
+            <a:pPr algn="ctr"/>
+            <a:r>
+              <a:rPr lang="en-US" sz="1200" dirty="0">
+                <a:solidFill>
+                  <a:sysClr val="windowText" lastClr="000000"/>
+                </a:solidFill>
+              </a:rPr>
+              <a:t>(?)</a:t>
+            </a:r>
+          </a:p>
+          <a:p>
+            <a:pPr algn="ctr"/>
+            <a:r>
+              <a:rPr lang="en-US" sz="1200" dirty="0">
+                <a:solidFill>
+                  <a:sysClr val="windowText" lastClr="000000"/>
+                </a:solidFill>
+              </a:rPr>
+              <a:t>(?)</a:t>
+            </a:r>
+            <a:endParaRPr lang="en-JP" sz="1200" dirty="0">
+              <a:solidFill>
+                <a:sysClr val="windowText" lastClr="000000"/>
+              </a:solidFill>
+            </a:endParaRPr>
+          </a:p>
+        </p:txBody>
+      </p:sp>
+      <p:sp>
+        <p:nvSpPr>
+          <p:cNvPr id="52" name="TextBox 51">
+            <a:extLst>
+              <a:ext uri="{FF2B5EF4-FFF2-40B4-BE49-F238E27FC236}">
+                <a16:creationId xmlns:a16="http://schemas.microsoft.com/office/drawing/2014/main" id="{411DF97D-2D5D-7A46-BA62-4C65E0164185}"/>
+              </a:ext>
+            </a:extLst>
+          </p:cNvPr>
+          <p:cNvSpPr txBox="1"/>
+          <p:nvPr/>
+        </p:nvSpPr>
+        <p:spPr>
+          <a:xfrm>
+            <a:off x="8316306" y="4343381"/>
+            <a:ext cx="580608" cy="261610"/>
+          </a:xfrm>
+          <a:prstGeom prst="rect">
+            <a:avLst/>
+          </a:prstGeom>
+          <a:noFill/>
+        </p:spPr>
+        <p:txBody>
+          <a:bodyPr wrap="none" rtlCol="0">
+            <a:spAutoFit/>
+          </a:bodyPr>
+          <a:lstStyle/>
+          <a:p>
+            <a:pPr algn="ctr"/>
+            <a:r>
+              <a:rPr lang="en-JP" sz="1100" dirty="0"/>
+              <a:t>30.131</a:t>
+            </a:r>
+          </a:p>
+        </p:txBody>
+      </p:sp>
+      <p:sp>
+        <p:nvSpPr>
+          <p:cNvPr id="53" name="Rectangle 52">
+            <a:extLst>
+              <a:ext uri="{FF2B5EF4-FFF2-40B4-BE49-F238E27FC236}">
+                <a16:creationId xmlns:a16="http://schemas.microsoft.com/office/drawing/2014/main" id="{0B9C857C-5939-AE40-BC17-C74785939DB4}"/>
+              </a:ext>
+            </a:extLst>
+          </p:cNvPr>
+          <p:cNvSpPr/>
+          <p:nvPr/>
+        </p:nvSpPr>
+        <p:spPr>
+          <a:xfrm flipV="1">
+            <a:off x="7914556" y="6449409"/>
+            <a:ext cx="268446" cy="225737"/>
+          </a:xfrm>
+          <a:prstGeom prst="rect">
+            <a:avLst/>
+          </a:prstGeom>
+          <a:solidFill>
+            <a:schemeClr val="bg1"/>
+          </a:solidFill>
+          <a:ln>
+            <a:prstDash val="dash"/>
+          </a:ln>
+        </p:spPr>
+        <p:style>
+          <a:lnRef idx="2">
+            <a:schemeClr val="accent1">
+              <a:shade val="50000"/>
+            </a:schemeClr>
+          </a:lnRef>
+          <a:fillRef idx="1">
+            <a:schemeClr val="accent1"/>
+          </a:fillRef>
+          <a:effectRef idx="0">
+            <a:schemeClr val="accent1"/>
+          </a:effectRef>
+          <a:fontRef idx="minor">
+            <a:schemeClr val="lt1"/>
+          </a:fontRef>
+        </p:style>
+        <p:txBody>
+          <a:bodyPr lIns="0" rIns="0" rtlCol="0" anchor="ctr"/>
+          <a:lstStyle/>
+          <a:p>
+            <a:pPr algn="ctr"/>
+            <a:endParaRPr lang="en-JP" sz="1200" dirty="0">
+              <a:solidFill>
+                <a:sysClr val="windowText" lastClr="000000"/>
+              </a:solidFill>
+            </a:endParaRPr>
+          </a:p>
+        </p:txBody>
+      </p:sp>
+      <p:sp>
+        <p:nvSpPr>
+          <p:cNvPr id="54" name="TextBox 53">
+            <a:extLst>
+              <a:ext uri="{FF2B5EF4-FFF2-40B4-BE49-F238E27FC236}">
+                <a16:creationId xmlns:a16="http://schemas.microsoft.com/office/drawing/2014/main" id="{64B42FA6-B8FF-A546-8B3A-89180EFE2C22}"/>
+              </a:ext>
+            </a:extLst>
+          </p:cNvPr>
+          <p:cNvSpPr txBox="1"/>
+          <p:nvPr/>
+        </p:nvSpPr>
+        <p:spPr>
+          <a:xfrm>
+            <a:off x="8153400" y="6438718"/>
+            <a:ext cx="2694969" cy="261610"/>
+          </a:xfrm>
+          <a:prstGeom prst="rect">
+            <a:avLst/>
+          </a:prstGeom>
+          <a:noFill/>
+        </p:spPr>
+        <p:txBody>
+          <a:bodyPr wrap="none" rtlCol="0">
+            <a:spAutoFit/>
+          </a:bodyPr>
+          <a:lstStyle/>
+          <a:p>
+            <a:r>
+              <a:rPr lang="en-JP" sz="1100" dirty="0"/>
+              <a:t>: has DHCP lease, but don’t respond to ping.</a:t>
+            </a:r>
+          </a:p>
+        </p:txBody>
+      </p:sp>
+      <p:sp>
+        <p:nvSpPr>
+          <p:cNvPr id="56" name="Rectangle 55">
+            <a:extLst>
+              <a:ext uri="{FF2B5EF4-FFF2-40B4-BE49-F238E27FC236}">
+                <a16:creationId xmlns:a16="http://schemas.microsoft.com/office/drawing/2014/main" id="{2933B28A-0AD9-5847-B553-4248B89F01D0}"/>
+              </a:ext>
+            </a:extLst>
+          </p:cNvPr>
+          <p:cNvSpPr/>
+          <p:nvPr/>
+        </p:nvSpPr>
+        <p:spPr>
+          <a:xfrm>
+            <a:off x="10831852" y="1308059"/>
+            <a:ext cx="1080000" cy="554142"/>
+          </a:xfrm>
+          <a:prstGeom prst="rect">
+            <a:avLst/>
+          </a:prstGeom>
+          <a:solidFill>
+            <a:schemeClr val="bg1"/>
+          </a:solidFill>
+          <a:ln>
+            <a:solidFill>
+              <a:schemeClr val="accent1"/>
+            </a:solidFill>
+            <a:prstDash val="solid"/>
+          </a:ln>
+        </p:spPr>
+        <p:style>
+          <a:lnRef idx="2">
+            <a:schemeClr val="accent1">
+              <a:shade val="50000"/>
+            </a:schemeClr>
+          </a:lnRef>
+          <a:fillRef idx="1">
+            <a:schemeClr val="accent1"/>
+          </a:fillRef>
+          <a:effectRef idx="0">
+            <a:schemeClr val="accent1"/>
+          </a:effectRef>
+          <a:fontRef idx="minor">
+            <a:schemeClr val="lt1"/>
+          </a:fontRef>
+        </p:style>
+        <p:txBody>
+          <a:bodyPr lIns="0" rIns="0" rtlCol="0" anchor="ctr"/>
+          <a:lstStyle/>
+          <a:p>
+            <a:pPr algn="ctr"/>
+            <a:r>
+              <a:rPr lang="en-US" sz="1200" dirty="0">
+                <a:solidFill>
+                  <a:sysClr val="windowText" lastClr="000000"/>
+                </a:solidFill>
+              </a:rPr>
+              <a:t>(?)</a:t>
+            </a:r>
+          </a:p>
+          <a:p>
+            <a:pPr algn="ctr"/>
+            <a:r>
+              <a:rPr lang="en-US" sz="1200" dirty="0">
+                <a:solidFill>
+                  <a:sysClr val="windowText" lastClr="000000"/>
+                </a:solidFill>
+              </a:rPr>
+              <a:t>(?)</a:t>
+            </a:r>
+            <a:endParaRPr lang="en-JP" sz="1200" dirty="0">
+              <a:solidFill>
+                <a:sysClr val="windowText" lastClr="000000"/>
+              </a:solidFill>
+            </a:endParaRPr>
+          </a:p>
+        </p:txBody>
+      </p:sp>
+      <p:sp>
+        <p:nvSpPr>
+          <p:cNvPr id="57" name="TextBox 56">
+            <a:extLst>
+              <a:ext uri="{FF2B5EF4-FFF2-40B4-BE49-F238E27FC236}">
+                <a16:creationId xmlns:a16="http://schemas.microsoft.com/office/drawing/2014/main" id="{D05F7CEE-B6D1-6448-8014-124C4416C23A}"/>
+              </a:ext>
+            </a:extLst>
+          </p:cNvPr>
+          <p:cNvSpPr txBox="1"/>
+          <p:nvPr/>
+        </p:nvSpPr>
+        <p:spPr>
+          <a:xfrm>
+            <a:off x="11081547" y="1806974"/>
+            <a:ext cx="580608" cy="261610"/>
+          </a:xfrm>
+          <a:prstGeom prst="rect">
+            <a:avLst/>
+          </a:prstGeom>
+          <a:noFill/>
+        </p:spPr>
+        <p:txBody>
+          <a:bodyPr wrap="none" rtlCol="0">
+            <a:spAutoFit/>
+          </a:bodyPr>
+          <a:lstStyle/>
+          <a:p>
+            <a:pPr algn="ctr"/>
+            <a:r>
+              <a:rPr lang="en-JP" sz="1100" dirty="0"/>
+              <a:t>30.140</a:t>
+            </a:r>
+          </a:p>
+        </p:txBody>
+      </p:sp>
+      <p:sp>
+        <p:nvSpPr>
+          <p:cNvPr id="55" name="Rectangle 54">
+            <a:extLst>
+              <a:ext uri="{FF2B5EF4-FFF2-40B4-BE49-F238E27FC236}">
+                <a16:creationId xmlns:a16="http://schemas.microsoft.com/office/drawing/2014/main" id="{E730CECF-05BE-C749-97BD-CCD784C87136}"/>
+              </a:ext>
+            </a:extLst>
+          </p:cNvPr>
+          <p:cNvSpPr/>
+          <p:nvPr/>
+        </p:nvSpPr>
+        <p:spPr>
+          <a:xfrm>
+            <a:off x="713093" y="5432598"/>
+            <a:ext cx="1080000" cy="554142"/>
+          </a:xfrm>
+          <a:prstGeom prst="rect">
+            <a:avLst/>
+          </a:prstGeom>
+          <a:solidFill>
+            <a:schemeClr val="bg1"/>
+          </a:solidFill>
+        </p:spPr>
+        <p:style>
+          <a:lnRef idx="2">
+            <a:schemeClr val="accent1">
+              <a:shade val="50000"/>
+            </a:schemeClr>
+          </a:lnRef>
+          <a:fillRef idx="1">
+            <a:schemeClr val="accent1"/>
+          </a:fillRef>
+          <a:effectRef idx="0">
+            <a:schemeClr val="accent1"/>
+          </a:effectRef>
+          <a:fontRef idx="minor">
+            <a:schemeClr val="lt1"/>
+          </a:fontRef>
+        </p:style>
+        <p:txBody>
+          <a:bodyPr lIns="0" rIns="0" rtlCol="0" anchor="ctr"/>
+          <a:lstStyle/>
+          <a:p>
+            <a:pPr algn="ctr"/>
+            <a:r>
+              <a:rPr lang="en-US" sz="1200" dirty="0" err="1">
+                <a:solidFill>
+                  <a:sysClr val="windowText" lastClr="000000"/>
+                </a:solidFill>
+              </a:rPr>
+              <a:t>MoSense</a:t>
+            </a:r>
+            <a:r>
+              <a:rPr lang="en-US" sz="1200" dirty="0">
+                <a:solidFill>
+                  <a:sysClr val="windowText" lastClr="000000"/>
+                </a:solidFill>
+              </a:rPr>
+              <a:t> </a:t>
+            </a:r>
+          </a:p>
+          <a:p>
+            <a:pPr algn="ctr"/>
+            <a:r>
+              <a:rPr lang="en-US" sz="1200" dirty="0" err="1">
+                <a:solidFill>
+                  <a:sysClr val="windowText" lastClr="000000"/>
+                </a:solidFill>
+              </a:rPr>
+              <a:t>Sensorboard</a:t>
+            </a:r>
+            <a:endParaRPr lang="en-US" sz="1200" dirty="0">
+              <a:solidFill>
+                <a:sysClr val="windowText" lastClr="000000"/>
+              </a:solidFill>
+            </a:endParaRPr>
+          </a:p>
+          <a:p>
+            <a:pPr algn="ctr"/>
+            <a:r>
+              <a:rPr lang="en-US" sz="1200" dirty="0">
+                <a:solidFill>
+                  <a:sysClr val="windowText" lastClr="000000"/>
+                </a:solidFill>
+              </a:rPr>
+              <a:t>(</a:t>
+            </a:r>
+            <a:r>
+              <a:rPr lang="en-US" sz="1200" dirty="0" err="1">
+                <a:solidFill>
+                  <a:sysClr val="windowText" lastClr="000000"/>
+                </a:solidFill>
+              </a:rPr>
+              <a:t>Motius</a:t>
+            </a:r>
+            <a:r>
+              <a:rPr lang="en-US" sz="1200" dirty="0">
+                <a:solidFill>
+                  <a:sysClr val="windowText" lastClr="000000"/>
+                </a:solidFill>
+              </a:rPr>
+              <a:t>)</a:t>
+            </a:r>
+            <a:endParaRPr lang="en-JP" sz="1200" dirty="0">
+              <a:solidFill>
+                <a:sysClr val="windowText" lastClr="000000"/>
+              </a:solidFill>
+            </a:endParaRPr>
+          </a:p>
+        </p:txBody>
+      </p:sp>
+      <p:sp>
+        <p:nvSpPr>
+          <p:cNvPr id="58" name="Rectangle 57">
+            <a:extLst>
+              <a:ext uri="{FF2B5EF4-FFF2-40B4-BE49-F238E27FC236}">
+                <a16:creationId xmlns:a16="http://schemas.microsoft.com/office/drawing/2014/main" id="{14316AF4-6C5F-7045-98EB-47C3F6017246}"/>
+              </a:ext>
+            </a:extLst>
+          </p:cNvPr>
+          <p:cNvSpPr/>
+          <p:nvPr/>
+        </p:nvSpPr>
+        <p:spPr>
+          <a:xfrm>
+            <a:off x="769628" y="5960371"/>
+            <a:ext cx="960519" cy="246221"/>
+          </a:xfrm>
+          <a:prstGeom prst="rect">
+            <a:avLst/>
+          </a:prstGeom>
+        </p:spPr>
+        <p:txBody>
+          <a:bodyPr wrap="none">
+            <a:spAutoFit/>
+          </a:bodyPr>
+          <a:lstStyle/>
+          <a:p>
+            <a:r>
+              <a:rPr lang="en-US" sz="1000" dirty="0" err="1">
+                <a:solidFill>
+                  <a:sysClr val="windowText" lastClr="000000"/>
+                </a:solidFill>
+              </a:rPr>
+              <a:t>mqtt.motius.io</a:t>
+            </a:r>
+            <a:endParaRPr lang="en-JP" sz="1000" dirty="0">
+              <a:solidFill>
+                <a:sysClr val="windowText" lastClr="000000"/>
+              </a:solidFill>
+            </a:endParaRPr>
+          </a:p>
+        </p:txBody>
+      </p:sp>
+    </p:spTree>
+    <p:extLst>
+      <p:ext uri="{BB962C8B-B14F-4D97-AF65-F5344CB8AC3E}">
+        <p14:creationId xmlns:p14="http://schemas.microsoft.com/office/powerpoint/2010/main" val="24637119"/>
       </p:ext>
     </p:extLst>
   </p:cSld>

</xml_diff>

<commit_message>
added Fujitsu, Siemens, TUM devices
</commit_message>
<xml_diff>
--- a/events/2020.06.Online/plugfestnetwork.pptx
+++ b/events/2020.06.Online/plugfestnetwork.pptx
@@ -209,7 +209,7 @@
           <a:p>
             <a:fld id="{8389B5DD-0274-BF45-B4C5-62E173E8F634}" type="datetimeFigureOut">
               <a:rPr lang="en-US" smtClean="0"/>
-              <a:t>6/17/20</a:t>
+              <a:t>6/18/20</a:t>
             </a:fld>
             <a:endParaRPr lang="en-US"/>
           </a:p>
@@ -825,7 +825,7 @@
           <a:p>
             <a:fld id="{2F93E591-CC8D-C74E-8EED-098A7FB5E64D}" type="datetime1">
               <a:rPr lang="en-CA" smtClean="0"/>
-              <a:t>2020-06-17</a:t>
+              <a:t>2020-06-18</a:t>
             </a:fld>
             <a:endParaRPr lang="en-US"/>
           </a:p>
@@ -1093,7 +1093,7 @@
           <a:p>
             <a:fld id="{2E1BC118-574D-594E-ABEA-A7C82666C9AB}" type="datetime1">
               <a:rPr lang="en-CA" smtClean="0"/>
-              <a:t>2020-06-17</a:t>
+              <a:t>2020-06-18</a:t>
             </a:fld>
             <a:endParaRPr lang="en-US"/>
           </a:p>
@@ -1459,7 +1459,7 @@
           <a:p>
             <a:fld id="{B929AB1E-7FD9-0A40-B7C0-508CCACB3E9A}" type="datetime1">
               <a:rPr lang="en-CA" smtClean="0"/>
-              <a:t>2020-06-17</a:t>
+              <a:t>2020-06-18</a:t>
             </a:fld>
             <a:endParaRPr lang="en-US"/>
           </a:p>
@@ -1691,7 +1691,7 @@
           <a:p>
             <a:fld id="{5AE8723F-57EA-4C47-97B9-92AFDEEF85DC}" type="datetime1">
               <a:rPr lang="en-CA" smtClean="0"/>
-              <a:t>2020-06-17</a:t>
+              <a:t>2020-06-18</a:t>
             </a:fld>
             <a:endParaRPr lang="en-US"/>
           </a:p>
@@ -2021,7 +2021,7 @@
           <a:p>
             <a:fld id="{B2B00E5D-EC04-AA49-8D52-0FCB6E08F63D}" type="datetime1">
               <a:rPr lang="en-CA" smtClean="0"/>
-              <a:t>2020-06-17</a:t>
+              <a:t>2020-06-18</a:t>
             </a:fld>
             <a:endParaRPr lang="en-US"/>
           </a:p>
@@ -2494,7 +2494,7 @@
           <a:p>
             <a:fld id="{FF90905C-10FF-8047-AA7E-6DC7E8B6AF51}" type="datetime1">
               <a:rPr lang="en-CA" smtClean="0"/>
-              <a:t>2020-06-17</a:t>
+              <a:t>2020-06-18</a:t>
             </a:fld>
             <a:endParaRPr lang="en-US"/>
           </a:p>
@@ -2700,7 +2700,7 @@
           <a:p>
             <a:fld id="{D1CE86E2-4400-D342-BEEC-F9C1ADF6F9F7}" type="datetime1">
               <a:rPr lang="en-CA" smtClean="0"/>
-              <a:t>2020-06-17</a:t>
+              <a:t>2020-06-18</a:t>
             </a:fld>
             <a:endParaRPr lang="en-US"/>
           </a:p>
@@ -2870,7 +2870,7 @@
           <a:p>
             <a:fld id="{74358A08-7221-7F45-8378-69D5559861DD}" type="datetime1">
               <a:rPr lang="en-CA" smtClean="0"/>
-              <a:t>2020-06-17</a:t>
+              <a:t>2020-06-18</a:t>
             </a:fld>
             <a:endParaRPr lang="en-US"/>
           </a:p>
@@ -3242,7 +3242,7 @@
           <a:p>
             <a:fld id="{08C20FDB-303D-8A4E-83B7-226DD88B97BD}" type="datetime1">
               <a:rPr lang="en-CA" smtClean="0"/>
-              <a:t>2020-06-17</a:t>
+              <a:t>2020-06-18</a:t>
             </a:fld>
             <a:endParaRPr lang="en-US"/>
           </a:p>
@@ -3594,7 +3594,7 @@
           <a:p>
             <a:fld id="{0A9EBA37-9D18-D34A-A88D-1B00AA06E95C}" type="datetime1">
               <a:rPr lang="en-CA" smtClean="0"/>
-              <a:t>2020-06-17</a:t>
+              <a:t>2020-06-18</a:t>
             </a:fld>
             <a:endParaRPr lang="en-US"/>
           </a:p>
@@ -3934,7 +3934,7 @@
             <a:fld id="{B73A2E78-F38A-E046-ACDB-668F070D1EF6}" type="datetime1">
               <a:rPr lang="en-CA" smtClean="0"/>
               <a:pPr/>
-              <a:t>2020-06-17</a:t>
+              <a:t>2020-06-18</a:t>
             </a:fld>
             <a:endParaRPr lang="en-US" dirty="0"/>
           </a:p>
@@ -4341,7 +4341,7 @@
           <a:p>
             <a:r>
               <a:rPr lang="en-US" dirty="0"/>
-              <a:t>Plugfest network (as of 2020-06-17 1100UTC)</a:t>
+              <a:t>Plugfest network (as of 2020-06-18 0000UTC)</a:t>
             </a:r>
           </a:p>
         </p:txBody>
@@ -4369,7 +4369,7 @@
           <a:p>
             <a:fld id="{BF92DA42-2970-1B4D-9C1F-77F249CD7467}" type="datetime1">
               <a:rPr lang="en-CA" smtClean="0"/>
-              <a:t>2020-06-17</a:t>
+              <a:t>2020-06-18</a:t>
             </a:fld>
             <a:endParaRPr lang="en-US"/>
           </a:p>
@@ -4663,7 +4663,7 @@
         </p:nvSpPr>
         <p:spPr>
           <a:xfrm>
-            <a:off x="9502156" y="2158599"/>
+            <a:off x="9444100" y="2158599"/>
             <a:ext cx="1080000" cy="554142"/>
           </a:xfrm>
           <a:prstGeom prst="rect">
@@ -4735,7 +4735,7 @@
         </p:nvSpPr>
         <p:spPr>
           <a:xfrm>
-            <a:off x="9630025" y="2657514"/>
+            <a:off x="9571969" y="2657514"/>
             <a:ext cx="824264" cy="430887"/>
           </a:xfrm>
           <a:prstGeom prst="rect">
@@ -4778,7 +4778,7 @@
         </p:nvSpPr>
         <p:spPr>
           <a:xfrm>
-            <a:off x="8066610" y="2153528"/>
+            <a:off x="7921470" y="2159850"/>
             <a:ext cx="1080000" cy="554142"/>
           </a:xfrm>
           <a:prstGeom prst="rect">
@@ -4788,7 +4788,7 @@
             <a:schemeClr val="bg1"/>
           </a:solidFill>
           <a:ln>
-            <a:prstDash val="dash"/>
+            <a:prstDash val="solid"/>
           </a:ln>
         </p:spPr>
         <p:style>
@@ -4853,8 +4853,8 @@
         </p:nvSpPr>
         <p:spPr>
           <a:xfrm>
-            <a:off x="8316306" y="2652443"/>
-            <a:ext cx="580607" cy="430887"/>
+            <a:off x="8164754" y="2652443"/>
+            <a:ext cx="593432" cy="430887"/>
           </a:xfrm>
           <a:prstGeom prst="rect">
             <a:avLst/>
@@ -4869,8 +4869,12 @@
           <a:p>
             <a:pPr algn="ctr"/>
             <a:r>
+              <a:rPr lang="en-US" sz="1100" dirty="0"/>
+              <a:t>J</a:t>
+            </a:r>
+            <a:r>
               <a:rPr lang="en-JP" sz="1100" dirty="0"/>
-              <a:t>(jv)</a:t>
+              <a:t>v.local</a:t>
             </a:r>
           </a:p>
           <a:p>
@@ -5439,7 +5443,7 @@
         </p:nvSpPr>
         <p:spPr>
           <a:xfrm>
-            <a:off x="9502156" y="4710219"/>
+            <a:off x="9444100" y="4710219"/>
             <a:ext cx="1080000" cy="554142"/>
           </a:xfrm>
           <a:prstGeom prst="rect">
@@ -5479,7 +5483,7 @@
                   <a:sysClr val="windowText" lastClr="000000"/>
                 </a:solidFill>
               </a:rPr>
-              <a:t>(?)</a:t>
+              <a:t>Sensor Units</a:t>
             </a:r>
           </a:p>
           <a:p>
@@ -5490,7 +5494,7 @@
                   <a:sysClr val="windowText" lastClr="000000"/>
                 </a:solidFill>
               </a:rPr>
-              <a:t>(?)</a:t>
+              <a:t>(Fujitsu)</a:t>
             </a:r>
             <a:endParaRPr lang="en-JP" sz="1200" dirty="0">
               <a:solidFill>
@@ -5514,7 +5518,7 @@
         </p:nvSpPr>
         <p:spPr>
           <a:xfrm>
-            <a:off x="9215651" y="5209134"/>
+            <a:off x="9157595" y="5209134"/>
             <a:ext cx="1653017" cy="430887"/>
           </a:xfrm>
           <a:prstGeom prst="rect">
@@ -5557,7 +5561,7 @@
         </p:nvSpPr>
         <p:spPr>
           <a:xfrm>
-            <a:off x="8066610" y="4689935"/>
+            <a:off x="7921470" y="4715223"/>
             <a:ext cx="1080000" cy="554142"/>
           </a:xfrm>
           <a:prstGeom prst="rect">
@@ -5651,7 +5655,7 @@
         </p:nvSpPr>
         <p:spPr>
           <a:xfrm>
-            <a:off x="7816973" y="5188850"/>
+            <a:off x="7671830" y="5200673"/>
             <a:ext cx="1579279" cy="430887"/>
           </a:xfrm>
           <a:prstGeom prst="rect">
@@ -5695,7 +5699,7 @@
         </p:nvSpPr>
         <p:spPr>
           <a:xfrm>
-            <a:off x="9502156" y="1308059"/>
+            <a:off x="9444100" y="1308059"/>
             <a:ext cx="1080000" cy="554142"/>
           </a:xfrm>
           <a:prstGeom prst="rect">
@@ -5705,7 +5709,7 @@
             <a:schemeClr val="bg1"/>
           </a:solidFill>
           <a:ln>
-            <a:prstDash val="dash"/>
+            <a:prstDash val="solid"/>
           </a:ln>
         </p:spPr>
         <p:style>
@@ -5770,8 +5774,8 @@
         </p:nvSpPr>
         <p:spPr>
           <a:xfrm>
-            <a:off x="9603574" y="1806974"/>
-            <a:ext cx="877164" cy="430887"/>
+            <a:off x="9438919" y="1806974"/>
+            <a:ext cx="1090363" cy="430887"/>
           </a:xfrm>
           <a:prstGeom prst="rect">
             <a:avLst/>
@@ -5786,16 +5790,12 @@
           <a:p>
             <a:pPr algn="ctr"/>
             <a:r>
-              <a:rPr lang="en-JP" sz="1100" dirty="0"/>
-              <a:t>(</a:t>
-            </a:r>
-            <a:r>
               <a:rPr lang="en-US" sz="1100" dirty="0"/>
               <a:t>ryuichi-pi4</a:t>
             </a:r>
             <a:r>
               <a:rPr lang="en-JP" sz="1100" dirty="0"/>
-              <a:t>)</a:t>
+              <a:t>.local</a:t>
             </a:r>
           </a:p>
           <a:p>
@@ -5821,7 +5821,7 @@
         </p:nvSpPr>
         <p:spPr>
           <a:xfrm>
-            <a:off x="8066610" y="2998997"/>
+            <a:off x="7921470" y="3011641"/>
             <a:ext cx="1080000" cy="554142"/>
           </a:xfrm>
           <a:prstGeom prst="rect">
@@ -5896,7 +5896,7 @@
         </p:nvSpPr>
         <p:spPr>
           <a:xfrm>
-            <a:off x="7996507" y="3497912"/>
+            <a:off x="7851367" y="3497912"/>
             <a:ext cx="1220206" cy="430887"/>
           </a:xfrm>
           <a:prstGeom prst="rect">
@@ -5947,7 +5947,7 @@
         </p:nvSpPr>
         <p:spPr>
           <a:xfrm>
-            <a:off x="9502156" y="3009139"/>
+            <a:off x="9444100" y="3009139"/>
             <a:ext cx="1080000" cy="554142"/>
           </a:xfrm>
           <a:prstGeom prst="rect">
@@ -6022,7 +6022,7 @@
         </p:nvSpPr>
         <p:spPr>
           <a:xfrm>
-            <a:off x="9451294" y="3508054"/>
+            <a:off x="9393238" y="3508054"/>
             <a:ext cx="1181734" cy="430887"/>
           </a:xfrm>
           <a:prstGeom prst="rect">
@@ -6065,7 +6065,7 @@
         </p:nvSpPr>
         <p:spPr>
           <a:xfrm>
-            <a:off x="9502156" y="3859679"/>
+            <a:off x="9444100" y="3859679"/>
             <a:ext cx="1080000" cy="554142"/>
           </a:xfrm>
           <a:prstGeom prst="rect">
@@ -6105,7 +6105,7 @@
                   <a:sysClr val="windowText" lastClr="000000"/>
                 </a:solidFill>
               </a:rPr>
-              <a:t>(?)</a:t>
+              <a:t>Hypermedia Control Thing</a:t>
             </a:r>
           </a:p>
           <a:p>
@@ -6116,7 +6116,7 @@
                   <a:sysClr val="windowText" lastClr="000000"/>
                 </a:solidFill>
               </a:rPr>
-              <a:t>(?)</a:t>
+              <a:t>(Siemens)</a:t>
             </a:r>
             <a:endParaRPr lang="en-JP" sz="1200" dirty="0">
               <a:solidFill>
@@ -6140,7 +6140,7 @@
         </p:nvSpPr>
         <p:spPr>
           <a:xfrm>
-            <a:off x="9751852" y="4358594"/>
+            <a:off x="9693796" y="4358594"/>
             <a:ext cx="580608" cy="261610"/>
           </a:xfrm>
           <a:prstGeom prst="rect">
@@ -6176,7 +6176,7 @@
         </p:nvSpPr>
         <p:spPr>
           <a:xfrm>
-            <a:off x="8066610" y="1308059"/>
+            <a:off x="7921470" y="1308059"/>
             <a:ext cx="1080000" cy="554142"/>
           </a:xfrm>
           <a:prstGeom prst="rect">
@@ -6186,7 +6186,7 @@
             <a:schemeClr val="bg1"/>
           </a:solidFill>
           <a:ln>
-            <a:prstDash val="dash"/>
+            <a:prstDash val="solid"/>
           </a:ln>
         </p:spPr>
         <p:style>
@@ -6251,7 +6251,7 @@
         </p:nvSpPr>
         <p:spPr>
           <a:xfrm>
-            <a:off x="8316306" y="1806974"/>
+            <a:off x="8171166" y="1806974"/>
             <a:ext cx="580608" cy="261610"/>
           </a:xfrm>
           <a:prstGeom prst="rect">
@@ -6287,7 +6287,7 @@
         </p:nvSpPr>
         <p:spPr>
           <a:xfrm>
-            <a:off x="8066610" y="5535403"/>
+            <a:off x="7921470" y="5567012"/>
             <a:ext cx="1080000" cy="554142"/>
           </a:xfrm>
           <a:prstGeom prst="rect">
@@ -6362,7 +6362,7 @@
         </p:nvSpPr>
         <p:spPr>
           <a:xfrm>
-            <a:off x="8316306" y="6034318"/>
+            <a:off x="8171166" y="6070603"/>
             <a:ext cx="580608" cy="261610"/>
           </a:xfrm>
           <a:prstGeom prst="rect">
@@ -6398,7 +6398,7 @@
         </p:nvSpPr>
         <p:spPr>
           <a:xfrm>
-            <a:off x="9502156" y="5560758"/>
+            <a:off x="9444100" y="5560758"/>
             <a:ext cx="1080000" cy="554142"/>
           </a:xfrm>
           <a:prstGeom prst="rect">
@@ -6473,7 +6473,7 @@
         </p:nvSpPr>
         <p:spPr>
           <a:xfrm>
-            <a:off x="9731814" y="6059673"/>
+            <a:off x="9673758" y="6059673"/>
             <a:ext cx="620684" cy="430887"/>
           </a:xfrm>
           <a:prstGeom prst="rect">
@@ -6516,7 +6516,7 @@
         </p:nvSpPr>
         <p:spPr>
           <a:xfrm>
-            <a:off x="8066610" y="3844466"/>
+            <a:off x="7921470" y="3863432"/>
             <a:ext cx="1080000" cy="554142"/>
           </a:xfrm>
           <a:prstGeom prst="rect">
@@ -6526,7 +6526,7 @@
             <a:schemeClr val="bg1"/>
           </a:solidFill>
           <a:ln>
-            <a:prstDash val="dash"/>
+            <a:prstDash val="solid"/>
           </a:ln>
         </p:spPr>
         <p:style>
@@ -6591,7 +6591,7 @@
         </p:nvSpPr>
         <p:spPr>
           <a:xfrm>
-            <a:off x="8130358" y="4343381"/>
+            <a:off x="7985218" y="4343381"/>
             <a:ext cx="952505" cy="430887"/>
           </a:xfrm>
           <a:prstGeom prst="rect">
@@ -6980,6 +6980,7 @@
           </a:bodyPr>
           <a:lstStyle/>
           <a:p>
+            <a:pPr algn="ctr"/>
             <a:r>
               <a:rPr lang="en-US" sz="1000" dirty="0" err="1">
                 <a:solidFill>
@@ -7299,7 +7300,7 @@
                   <a:sysClr val="windowText" lastClr="000000"/>
                 </a:solidFill>
               </a:rPr>
-              <a:t>(Local Proxy?)</a:t>
+              <a:t>Local Proxy</a:t>
             </a:r>
           </a:p>
           <a:p>
@@ -7365,6 +7366,122 @@
               <a:rPr lang="en-JP" sz="1100" dirty="0"/>
               <a:t>30.10</a:t>
             </a:r>
+          </a:p>
+        </p:txBody>
+      </p:sp>
+      <p:sp>
+        <p:nvSpPr>
+          <p:cNvPr id="63" name="Rectangle 62">
+            <a:extLst>
+              <a:ext uri="{FF2B5EF4-FFF2-40B4-BE49-F238E27FC236}">
+                <a16:creationId xmlns:a16="http://schemas.microsoft.com/office/drawing/2014/main" id="{22E8E3CE-0BD4-284A-8ADC-ED9055B346BC}"/>
+              </a:ext>
+            </a:extLst>
+          </p:cNvPr>
+          <p:cNvSpPr/>
+          <p:nvPr/>
+        </p:nvSpPr>
+        <p:spPr>
+          <a:xfrm>
+            <a:off x="2578564" y="1476372"/>
+            <a:ext cx="1080000" cy="554142"/>
+          </a:xfrm>
+          <a:prstGeom prst="rect">
+            <a:avLst/>
+          </a:prstGeom>
+          <a:solidFill>
+            <a:schemeClr val="bg1"/>
+          </a:solidFill>
+        </p:spPr>
+        <p:style>
+          <a:lnRef idx="2">
+            <a:schemeClr val="accent1">
+              <a:shade val="50000"/>
+            </a:schemeClr>
+          </a:lnRef>
+          <a:fillRef idx="1">
+            <a:schemeClr val="accent1"/>
+          </a:fillRef>
+          <a:effectRef idx="0">
+            <a:schemeClr val="accent1"/>
+          </a:effectRef>
+          <a:fontRef idx="minor">
+            <a:schemeClr val="lt1"/>
+          </a:fontRef>
+        </p:style>
+        <p:txBody>
+          <a:bodyPr lIns="0" rIns="0" rtlCol="0" anchor="ctr"/>
+          <a:lstStyle/>
+          <a:p>
+            <a:pPr algn="ctr"/>
+            <a:r>
+              <a:rPr lang="en-US" sz="1200" dirty="0">
+                <a:solidFill>
+                  <a:sysClr val="windowText" lastClr="000000"/>
+                </a:solidFill>
+              </a:rPr>
+              <a:t>Virtual Coffee Machine</a:t>
+            </a:r>
+          </a:p>
+          <a:p>
+            <a:pPr algn="ctr"/>
+            <a:r>
+              <a:rPr lang="en-US" sz="1200" dirty="0">
+                <a:solidFill>
+                  <a:sysClr val="windowText" lastClr="000000"/>
+                </a:solidFill>
+              </a:rPr>
+              <a:t>(TUM)</a:t>
+            </a:r>
+            <a:endParaRPr lang="en-JP" sz="1200" dirty="0">
+              <a:solidFill>
+                <a:sysClr val="windowText" lastClr="000000"/>
+              </a:solidFill>
+            </a:endParaRPr>
+          </a:p>
+        </p:txBody>
+      </p:sp>
+      <p:sp>
+        <p:nvSpPr>
+          <p:cNvPr id="66" name="Rectangle 65">
+            <a:extLst>
+              <a:ext uri="{FF2B5EF4-FFF2-40B4-BE49-F238E27FC236}">
+                <a16:creationId xmlns:a16="http://schemas.microsoft.com/office/drawing/2014/main" id="{E57B362C-A50E-EA40-90FC-35B776D5F530}"/>
+              </a:ext>
+            </a:extLst>
+          </p:cNvPr>
+          <p:cNvSpPr/>
+          <p:nvPr/>
+        </p:nvSpPr>
+        <p:spPr>
+          <a:xfrm>
+            <a:off x="2616663" y="2030514"/>
+            <a:ext cx="1003801" cy="246221"/>
+          </a:xfrm>
+          <a:prstGeom prst="rect">
+            <a:avLst/>
+          </a:prstGeom>
+        </p:spPr>
+        <p:txBody>
+          <a:bodyPr wrap="none">
+            <a:spAutoFit/>
+          </a:bodyPr>
+          <a:lstStyle/>
+          <a:p>
+            <a:pPr algn="ctr"/>
+            <a:r>
+              <a:rPr lang="en-US" sz="1000" dirty="0">
+                <a:solidFill>
+                  <a:sysClr val="windowText" lastClr="000000"/>
+                </a:solidFill>
+              </a:rPr>
+              <a:t>129.187.45.174</a:t>
+            </a:r>
+            <a:endParaRPr lang="en-JP" sz="1000" dirty="0">
+              <a:solidFill>
+                <a:sysClr val="windowText" lastClr="000000"/>
+              </a:solidFill>
+            </a:endParaRPr>
           </a:p>
         </p:txBody>
       </p:sp>
@@ -7456,7 +7573,7 @@
           <a:p>
             <a:fld id="{BF92DA42-2970-1B4D-9C1F-77F249CD7467}" type="datetime1">
               <a:rPr lang="en-CA" smtClean="0"/>
-              <a:t>2020-06-17</a:t>
+              <a:t>2020-06-18</a:t>
             </a:fld>
             <a:endParaRPr lang="en-US"/>
           </a:p>

</xml_diff>